<commit_message>
Update pres with unbreaking rules
</commit_message>
<xml_diff>
--- a/SingleTestabilityPrinciple.pptx
+++ b/SingleTestabilityPrinciple.pptx
@@ -9,27 +9,38 @@
     <p:sldId id="257" r:id="rId3"/>
     <p:sldId id="258" r:id="rId4"/>
     <p:sldId id="261" r:id="rId5"/>
-    <p:sldId id="259" r:id="rId6"/>
-    <p:sldId id="264" r:id="rId7"/>
-    <p:sldId id="260" r:id="rId8"/>
-    <p:sldId id="265" r:id="rId9"/>
-    <p:sldId id="267" r:id="rId10"/>
-    <p:sldId id="268" r:id="rId11"/>
-    <p:sldId id="269" r:id="rId12"/>
-    <p:sldId id="266" r:id="rId13"/>
-    <p:sldId id="270" r:id="rId14"/>
-    <p:sldId id="271" r:id="rId15"/>
-    <p:sldId id="272" r:id="rId16"/>
-    <p:sldId id="273" r:id="rId17"/>
-    <p:sldId id="274" r:id="rId18"/>
-    <p:sldId id="275" r:id="rId19"/>
-    <p:sldId id="276" r:id="rId20"/>
-    <p:sldId id="277" r:id="rId21"/>
-    <p:sldId id="278" r:id="rId22"/>
-    <p:sldId id="279" r:id="rId23"/>
-    <p:sldId id="280" r:id="rId24"/>
-    <p:sldId id="281" r:id="rId25"/>
-    <p:sldId id="282" r:id="rId26"/>
+    <p:sldId id="283" r:id="rId6"/>
+    <p:sldId id="259" r:id="rId7"/>
+    <p:sldId id="264" r:id="rId8"/>
+    <p:sldId id="260" r:id="rId9"/>
+    <p:sldId id="284" r:id="rId10"/>
+    <p:sldId id="265" r:id="rId11"/>
+    <p:sldId id="267" r:id="rId12"/>
+    <p:sldId id="268" r:id="rId13"/>
+    <p:sldId id="269" r:id="rId14"/>
+    <p:sldId id="266" r:id="rId15"/>
+    <p:sldId id="285" r:id="rId16"/>
+    <p:sldId id="270" r:id="rId17"/>
+    <p:sldId id="271" r:id="rId18"/>
+    <p:sldId id="272" r:id="rId19"/>
+    <p:sldId id="273" r:id="rId20"/>
+    <p:sldId id="274" r:id="rId21"/>
+    <p:sldId id="275" r:id="rId22"/>
+    <p:sldId id="276" r:id="rId23"/>
+    <p:sldId id="277" r:id="rId24"/>
+    <p:sldId id="278" r:id="rId25"/>
+    <p:sldId id="279" r:id="rId26"/>
+    <p:sldId id="280" r:id="rId27"/>
+    <p:sldId id="286" r:id="rId28"/>
+    <p:sldId id="287" r:id="rId29"/>
+    <p:sldId id="288" r:id="rId30"/>
+    <p:sldId id="289" r:id="rId31"/>
+    <p:sldId id="290" r:id="rId32"/>
+    <p:sldId id="291" r:id="rId33"/>
+    <p:sldId id="292" r:id="rId34"/>
+    <p:sldId id="293" r:id="rId35"/>
+    <p:sldId id="281" r:id="rId36"/>
+    <p:sldId id="282" r:id="rId37"/>
   </p:sldIdLst>
   <p:sldSz cx="12192000" cy="6858000"/>
   <p:notesSz cx="6858000" cy="9144000"/>
@@ -128,6 +139,11 @@
       </a:defRPr>
     </a:lvl9pPr>
   </p:defaultTextStyle>
+  <p:extLst>
+    <p:ext uri="{EFAFB233-063F-42B5-8137-9DF3F51BA10A}">
+      <p15:sldGuideLst xmlns:p15="http://schemas.microsoft.com/office/powerpoint/2012/main"/>
+    </p:ext>
+  </p:extLst>
 </p:presentation>
 </file>
 
@@ -348,7 +364,7 @@
           <a:p>
             <a:fld id="{9AB3A824-1A51-4B26-AD58-A6D8E14F6C04}" type="datetimeFigureOut">
               <a:rPr lang="en-US" dirty="0"/>
-              <a:t>9/19/2019</a:t>
+              <a:t>9/20/2019</a:t>
             </a:fld>
             <a:endParaRPr lang="en-US" dirty="0"/>
           </a:p>
@@ -682,7 +698,7 @@
           <a:p>
             <a:fld id="{D857E33E-8B18-4087-B112-809917729534}" type="datetimeFigureOut">
               <a:rPr lang="en-US" dirty="0"/>
-              <a:t>9/19/2019</a:t>
+              <a:t>9/20/2019</a:t>
             </a:fld>
             <a:endParaRPr lang="en-US" dirty="0"/>
           </a:p>
@@ -984,7 +1000,7 @@
           <a:p>
             <a:fld id="{D3FFE419-2371-464F-8239-3959401C3561}" type="datetimeFigureOut">
               <a:rPr lang="en-US" dirty="0"/>
-              <a:t>9/19/2019</a:t>
+              <a:t>9/20/2019</a:t>
             </a:fld>
             <a:endParaRPr lang="en-US" dirty="0"/>
           </a:p>
@@ -1231,7 +1247,7 @@
           <a:p>
             <a:fld id="{97D162C4-EDD9-4389-A98B-B87ECEA2A816}" type="datetimeFigureOut">
               <a:rPr lang="en-US" dirty="0"/>
-              <a:t>9/19/2019</a:t>
+              <a:t>9/20/2019</a:t>
             </a:fld>
             <a:endParaRPr lang="en-US" dirty="0"/>
           </a:p>
@@ -1638,7 +1654,7 @@
           <a:p>
             <a:fld id="{3E5059C3-6A89-4494-99FF-5A4D6FFD50EB}" type="datetimeFigureOut">
               <a:rPr lang="en-US" dirty="0"/>
-              <a:t>9/19/2019</a:t>
+              <a:t>9/20/2019</a:t>
             </a:fld>
             <a:endParaRPr lang="en-US" dirty="0"/>
           </a:p>
@@ -1952,7 +1968,7 @@
           <a:p>
             <a:fld id="{CA954B2F-12DE-47F5-8894-472B206D2E1E}" type="datetimeFigureOut">
               <a:rPr lang="en-US" dirty="0"/>
-              <a:t>9/19/2019</a:t>
+              <a:t>9/20/2019</a:t>
             </a:fld>
             <a:endParaRPr lang="en-US" dirty="0"/>
           </a:p>
@@ -2496,7 +2512,7 @@
           <a:p>
             <a:fld id="{3F30E46F-7819-4ACF-B48B-48222C2ACC88}" type="datetimeFigureOut">
               <a:rPr lang="en-US" dirty="0"/>
-              <a:t>9/19/2019</a:t>
+              <a:t>9/20/2019</a:t>
             </a:fld>
             <a:endParaRPr lang="en-US" dirty="0"/>
           </a:p>
@@ -2691,7 +2707,7 @@
           <a:p>
             <a:fld id="{1FAF3416-4057-4DAA-829D-4CA07428D088}" type="datetimeFigureOut">
               <a:rPr lang="en-US" dirty="0"/>
-              <a:t>9/19/2019</a:t>
+              <a:t>9/20/2019</a:t>
             </a:fld>
             <a:endParaRPr lang="en-US" dirty="0"/>
           </a:p>
@@ -2904,7 +2920,7 @@
           <a:p>
             <a:fld id="{921D9284-D300-4297-87F7-E791DCC15DB1}" type="datetimeFigureOut">
               <a:rPr lang="en-US" dirty="0"/>
-              <a:t>9/19/2019</a:t>
+              <a:t>9/20/2019</a:t>
             </a:fld>
             <a:endParaRPr lang="en-US" dirty="0"/>
           </a:p>
@@ -3273,7 +3289,7 @@
           <a:p>
             <a:fld id="{37D525BB-DA17-4BA0-B3C8-3AC3ABC827E6}" type="datetimeFigureOut">
               <a:rPr lang="en-US" dirty="0"/>
-              <a:t>9/19/2019</a:t>
+              <a:t>9/20/2019</a:t>
             </a:fld>
             <a:endParaRPr lang="en-US" dirty="0"/>
           </a:p>
@@ -3676,7 +3692,7 @@
           <a:p>
             <a:fld id="{B16C4C9A-3960-41CF-A4E9-2A8FB932454B}" type="datetimeFigureOut">
               <a:rPr lang="en-US" dirty="0"/>
-              <a:t>9/19/2019</a:t>
+              <a:t>9/20/2019</a:t>
             </a:fld>
             <a:endParaRPr lang="en-US" dirty="0"/>
           </a:p>
@@ -3987,7 +4003,7 @@
           <a:p>
             <a:fld id="{3CBC1C18-307B-4F68-A007-B5B542270E8D}" type="datetimeFigureOut">
               <a:rPr lang="en-US" dirty="0"/>
-              <a:t>9/19/2019</a:t>
+              <a:t>9/20/2019</a:t>
             </a:fld>
             <a:endParaRPr lang="en-US" dirty="0"/>
           </a:p>
@@ -4597,6 +4613,269 @@
           <p:cNvPr id="2" name="Title 1">
             <a:extLst>
               <a:ext uri="{FF2B5EF4-FFF2-40B4-BE49-F238E27FC236}">
+                <a16:creationId xmlns:a16="http://schemas.microsoft.com/office/drawing/2014/main" id="{5A01A66A-3BE5-4484-A8FE-3D5D1F1E2D61}"/>
+              </a:ext>
+            </a:extLst>
+          </p:cNvPr>
+          <p:cNvSpPr>
+            <a:spLocks noGrp="1"/>
+          </p:cNvSpPr>
+          <p:nvPr>
+            <p:ph type="title"/>
+          </p:nvPr>
+        </p:nvSpPr>
+        <p:spPr/>
+        <p:txBody>
+          <a:bodyPr/>
+          <a:lstStyle/>
+          <a:p>
+            <a:r>
+              <a:rPr lang="en-US" dirty="0"/>
+              <a:t>Integration Tests</a:t>
+            </a:r>
+          </a:p>
+        </p:txBody>
+      </p:sp>
+      <p:sp>
+        <p:nvSpPr>
+          <p:cNvPr id="3" name="Content Placeholder 2">
+            <a:extLst>
+              <a:ext uri="{FF2B5EF4-FFF2-40B4-BE49-F238E27FC236}">
+                <a16:creationId xmlns:a16="http://schemas.microsoft.com/office/drawing/2014/main" id="{0827A9C9-7D8D-4502-BB63-610CC86C9825}"/>
+              </a:ext>
+            </a:extLst>
+          </p:cNvPr>
+          <p:cNvSpPr>
+            <a:spLocks noGrp="1"/>
+          </p:cNvSpPr>
+          <p:nvPr>
+            <p:ph idx="1"/>
+          </p:nvPr>
+        </p:nvSpPr>
+        <p:spPr/>
+        <p:txBody>
+          <a:bodyPr>
+            <a:normAutofit/>
+          </a:bodyPr>
+          <a:lstStyle/>
+          <a:p>
+            <a:r>
+              <a:rPr lang="en-US" dirty="0"/>
+              <a:t>Use with a unit with a highly complex or opaque dependency</a:t>
+            </a:r>
+          </a:p>
+          <a:p>
+            <a:pPr lvl="1"/>
+            <a:r>
+              <a:rPr lang="en-US" dirty="0"/>
+              <a:t>Database Wrappers (often use inheritance)</a:t>
+            </a:r>
+          </a:p>
+          <a:p>
+            <a:pPr lvl="1"/>
+            <a:r>
+              <a:rPr lang="en-US" dirty="0"/>
+              <a:t>Frameworks</a:t>
+            </a:r>
+          </a:p>
+          <a:p>
+            <a:pPr lvl="1"/>
+            <a:r>
+              <a:rPr lang="en-US" dirty="0"/>
+              <a:t>Http call wrappers</a:t>
+            </a:r>
+          </a:p>
+          <a:p>
+            <a:r>
+              <a:rPr lang="en-US" dirty="0"/>
+              <a:t>Executes the real dependency</a:t>
+            </a:r>
+          </a:p>
+          <a:p>
+            <a:r>
+              <a:rPr lang="en-US" dirty="0"/>
+              <a:t>Faster/Easier than mocking or stubbing (if even possible)</a:t>
+            </a:r>
+          </a:p>
+          <a:p>
+            <a:r>
+              <a:rPr lang="en-US" dirty="0"/>
+              <a:t>Often much less code than layering/abstracting</a:t>
+            </a:r>
+          </a:p>
+        </p:txBody>
+      </p:sp>
+    </p:spTree>
+    <p:extLst>
+      <p:ext uri="{BB962C8B-B14F-4D97-AF65-F5344CB8AC3E}">
+        <p14:creationId xmlns:p14="http://schemas.microsoft.com/office/powerpoint/2010/main" val="1609345674"/>
+      </p:ext>
+    </p:extLst>
+  </p:cSld>
+  <p:clrMapOvr>
+    <a:masterClrMapping/>
+  </p:clrMapOvr>
+</p:sld>
+</file>
+
+<file path=ppt/slides/slide11.xml><?xml version="1.0" encoding="utf-8"?>
+<p:sld xmlns:a="http://schemas.openxmlformats.org/drawingml/2006/main" xmlns:r="http://schemas.openxmlformats.org/officeDocument/2006/relationships" xmlns:p="http://schemas.openxmlformats.org/presentationml/2006/main">
+  <p:cSld>
+    <p:spTree>
+      <p:nvGrpSpPr>
+        <p:cNvPr id="1" name=""/>
+        <p:cNvGrpSpPr/>
+        <p:nvPr/>
+      </p:nvGrpSpPr>
+      <p:grpSpPr>
+        <a:xfrm>
+          <a:off x="0" y="0"/>
+          <a:ext cx="0" cy="0"/>
+          <a:chOff x="0" y="0"/>
+          <a:chExt cx="0" cy="0"/>
+        </a:xfrm>
+      </p:grpSpPr>
+      <p:sp>
+        <p:nvSpPr>
+          <p:cNvPr id="2" name="Title 1">
+            <a:extLst>
+              <a:ext uri="{FF2B5EF4-FFF2-40B4-BE49-F238E27FC236}">
+                <a16:creationId xmlns:a16="http://schemas.microsoft.com/office/drawing/2014/main" id="{436AD186-8536-4BE7-80C9-3A727B181584}"/>
+              </a:ext>
+            </a:extLst>
+          </p:cNvPr>
+          <p:cNvSpPr>
+            <a:spLocks noGrp="1"/>
+          </p:cNvSpPr>
+          <p:nvPr>
+            <p:ph type="title"/>
+          </p:nvPr>
+        </p:nvSpPr>
+        <p:spPr>
+          <a:xfrm>
+            <a:off x="2611808" y="808056"/>
+            <a:ext cx="7958331" cy="1077229"/>
+          </a:xfrm>
+        </p:spPr>
+        <p:txBody>
+          <a:bodyPr/>
+          <a:lstStyle/>
+          <a:p>
+            <a:r>
+              <a:rPr lang="en-US" dirty="0" err="1"/>
+              <a:t>UsageLogger.cs</a:t>
+            </a:r>
+            <a:endParaRPr lang="en-US" dirty="0"/>
+          </a:p>
+        </p:txBody>
+      </p:sp>
+      <p:sp>
+        <p:nvSpPr>
+          <p:cNvPr id="3" name="Content Placeholder 2">
+            <a:extLst>
+              <a:ext uri="{FF2B5EF4-FFF2-40B4-BE49-F238E27FC236}">
+                <a16:creationId xmlns:a16="http://schemas.microsoft.com/office/drawing/2014/main" id="{4B250338-424E-4311-BE00-4794F19C4D8A}"/>
+              </a:ext>
+            </a:extLst>
+          </p:cNvPr>
+          <p:cNvSpPr>
+            <a:spLocks noGrp="1"/>
+          </p:cNvSpPr>
+          <p:nvPr>
+            <p:ph idx="1"/>
+          </p:nvPr>
+        </p:nvSpPr>
+        <p:spPr>
+          <a:xfrm>
+            <a:off x="2692703" y="808056"/>
+            <a:ext cx="7796540" cy="3997828"/>
+          </a:xfrm>
+        </p:spPr>
+        <p:txBody>
+          <a:bodyPr/>
+          <a:lstStyle/>
+          <a:p>
+            <a:r>
+              <a:rPr lang="en-US" dirty="0"/>
+              <a:t>Using the file system, which is an opaque dependency</a:t>
+            </a:r>
+          </a:p>
+          <a:p>
+            <a:endParaRPr lang="en-US" dirty="0"/>
+          </a:p>
+          <a:p>
+            <a:endParaRPr lang="en-US" dirty="0"/>
+          </a:p>
+          <a:p>
+            <a:endParaRPr lang="en-US" dirty="0"/>
+          </a:p>
+        </p:txBody>
+      </p:sp>
+      <p:pic>
+        <p:nvPicPr>
+          <p:cNvPr id="4" name="Picture 3">
+            <a:extLst>
+              <a:ext uri="{FF2B5EF4-FFF2-40B4-BE49-F238E27FC236}">
+                <a16:creationId xmlns:a16="http://schemas.microsoft.com/office/drawing/2014/main" id="{15275675-37AE-4A73-8E0E-6311046A4281}"/>
+              </a:ext>
+            </a:extLst>
+          </p:cNvPr>
+          <p:cNvPicPr>
+            <a:picLocks noChangeAspect="1"/>
+          </p:cNvPicPr>
+          <p:nvPr/>
+        </p:nvPicPr>
+        <p:blipFill>
+          <a:blip r:embed="rId2"/>
+          <a:stretch>
+            <a:fillRect/>
+          </a:stretch>
+        </p:blipFill>
+        <p:spPr>
+          <a:xfrm>
+            <a:off x="1702757" y="2457172"/>
+            <a:ext cx="9050013" cy="3982006"/>
+          </a:xfrm>
+          <a:prstGeom prst="rect">
+            <a:avLst/>
+          </a:prstGeom>
+        </p:spPr>
+      </p:pic>
+    </p:spTree>
+    <p:extLst>
+      <p:ext uri="{BB962C8B-B14F-4D97-AF65-F5344CB8AC3E}">
+        <p14:creationId xmlns:p14="http://schemas.microsoft.com/office/powerpoint/2010/main" val="3846147522"/>
+      </p:ext>
+    </p:extLst>
+  </p:cSld>
+  <p:clrMapOvr>
+    <a:masterClrMapping/>
+  </p:clrMapOvr>
+</p:sld>
+</file>
+
+<file path=ppt/slides/slide12.xml><?xml version="1.0" encoding="utf-8"?>
+<p:sld xmlns:a="http://schemas.openxmlformats.org/drawingml/2006/main" xmlns:r="http://schemas.openxmlformats.org/officeDocument/2006/relationships" xmlns:p="http://schemas.openxmlformats.org/presentationml/2006/main">
+  <p:cSld>
+    <p:spTree>
+      <p:nvGrpSpPr>
+        <p:cNvPr id="1" name=""/>
+        <p:cNvGrpSpPr/>
+        <p:nvPr/>
+      </p:nvGrpSpPr>
+      <p:grpSpPr>
+        <a:xfrm>
+          <a:off x="0" y="0"/>
+          <a:ext cx="0" cy="0"/>
+          <a:chOff x="0" y="0"/>
+          <a:chExt cx="0" cy="0"/>
+        </a:xfrm>
+      </p:grpSpPr>
+      <p:sp>
+        <p:nvSpPr>
+          <p:cNvPr id="2" name="Title 1">
+            <a:extLst>
+              <a:ext uri="{FF2B5EF4-FFF2-40B4-BE49-F238E27FC236}">
                 <a16:creationId xmlns:a16="http://schemas.microsoft.com/office/drawing/2014/main" id="{1B0F2F28-CB34-4CF0-AC1F-25F3FC47007C}"/>
               </a:ext>
             </a:extLst>
@@ -4718,7 +4997,7 @@
 </p:sld>
 </file>
 
-<file path=ppt/slides/slide11.xml><?xml version="1.0" encoding="utf-8"?>
+<file path=ppt/slides/slide13.xml><?xml version="1.0" encoding="utf-8"?>
 <p:sld xmlns:a="http://schemas.openxmlformats.org/drawingml/2006/main" xmlns:r="http://schemas.openxmlformats.org/officeDocument/2006/relationships" xmlns:p="http://schemas.openxmlformats.org/presentationml/2006/main">
   <p:cSld>
     <p:spTree>
@@ -4838,261 +5117,6 @@
 </p:sld>
 </file>
 
-<file path=ppt/slides/slide12.xml><?xml version="1.0" encoding="utf-8"?>
-<p:sld xmlns:a="http://schemas.openxmlformats.org/drawingml/2006/main" xmlns:r="http://schemas.openxmlformats.org/officeDocument/2006/relationships" xmlns:p="http://schemas.openxmlformats.org/presentationml/2006/main">
-  <p:cSld>
-    <p:spTree>
-      <p:nvGrpSpPr>
-        <p:cNvPr id="1" name=""/>
-        <p:cNvGrpSpPr/>
-        <p:nvPr/>
-      </p:nvGrpSpPr>
-      <p:grpSpPr>
-        <a:xfrm>
-          <a:off x="0" y="0"/>
-          <a:ext cx="0" cy="0"/>
-          <a:chOff x="0" y="0"/>
-          <a:chExt cx="0" cy="0"/>
-        </a:xfrm>
-      </p:grpSpPr>
-      <p:sp>
-        <p:nvSpPr>
-          <p:cNvPr id="2" name="Title 1">
-            <a:extLst>
-              <a:ext uri="{FF2B5EF4-FFF2-40B4-BE49-F238E27FC236}">
-                <a16:creationId xmlns:a16="http://schemas.microsoft.com/office/drawing/2014/main" id="{AE15E957-1F9A-42ED-A6CD-8590734646A0}"/>
-              </a:ext>
-            </a:extLst>
-          </p:cNvPr>
-          <p:cNvSpPr>
-            <a:spLocks noGrp="1"/>
-          </p:cNvSpPr>
-          <p:nvPr>
-            <p:ph type="title"/>
-          </p:nvPr>
-        </p:nvSpPr>
-        <p:spPr/>
-        <p:txBody>
-          <a:bodyPr/>
-          <a:lstStyle/>
-          <a:p>
-            <a:r>
-              <a:rPr lang="en-US" dirty="0"/>
-              <a:t>Integration Testing Database Wrappers</a:t>
-            </a:r>
-          </a:p>
-        </p:txBody>
-      </p:sp>
-      <p:sp>
-        <p:nvSpPr>
-          <p:cNvPr id="3" name="Content Placeholder 2">
-            <a:extLst>
-              <a:ext uri="{FF2B5EF4-FFF2-40B4-BE49-F238E27FC236}">
-                <a16:creationId xmlns:a16="http://schemas.microsoft.com/office/drawing/2014/main" id="{949A3F76-958E-4CCA-8CAA-F770E42924F7}"/>
-              </a:ext>
-            </a:extLst>
-          </p:cNvPr>
-          <p:cNvSpPr>
-            <a:spLocks noGrp="1"/>
-          </p:cNvSpPr>
-          <p:nvPr>
-            <p:ph idx="1"/>
-          </p:nvPr>
-        </p:nvSpPr>
-        <p:spPr/>
-        <p:txBody>
-          <a:bodyPr/>
-          <a:lstStyle/>
-          <a:p>
-            <a:r>
-              <a:rPr lang="en-US" dirty="0" err="1"/>
-              <a:t>Sql</a:t>
-            </a:r>
-            <a:r>
-              <a:rPr lang="en-US" dirty="0"/>
-              <a:t> is code. So is what ORM frameworks create.</a:t>
-            </a:r>
-          </a:p>
-          <a:p>
-            <a:r>
-              <a:rPr lang="en-US" dirty="0"/>
-              <a:t>It must be executed to prove it’s right.</a:t>
-            </a:r>
-          </a:p>
-          <a:p>
-            <a:r>
-              <a:rPr lang="en-US" dirty="0"/>
-              <a:t>Start a transaction in test setup, add test data</a:t>
-            </a:r>
-          </a:p>
-          <a:p>
-            <a:r>
-              <a:rPr lang="en-US" dirty="0"/>
-              <a:t>Rollback in the teardown.</a:t>
-            </a:r>
-          </a:p>
-          <a:p>
-            <a:r>
-              <a:rPr lang="en-US" dirty="0"/>
-              <a:t>Transaction free? GIGUGDG!</a:t>
-            </a:r>
-          </a:p>
-          <a:p>
-            <a:pPr lvl="1"/>
-            <a:r>
-              <a:rPr lang="en-US" dirty="0"/>
-              <a:t>Get, Insert, Get, Update, Get, Delete, Get</a:t>
-            </a:r>
-          </a:p>
-        </p:txBody>
-      </p:sp>
-    </p:spTree>
-    <p:extLst>
-      <p:ext uri="{BB962C8B-B14F-4D97-AF65-F5344CB8AC3E}">
-        <p14:creationId xmlns:p14="http://schemas.microsoft.com/office/powerpoint/2010/main" val="1319207513"/>
-      </p:ext>
-    </p:extLst>
-  </p:cSld>
-  <p:clrMapOvr>
-    <a:masterClrMapping/>
-  </p:clrMapOvr>
-</p:sld>
-</file>
-
-<file path=ppt/slides/slide13.xml><?xml version="1.0" encoding="utf-8"?>
-<p:sld xmlns:a="http://schemas.openxmlformats.org/drawingml/2006/main" xmlns:r="http://schemas.openxmlformats.org/officeDocument/2006/relationships" xmlns:p="http://schemas.openxmlformats.org/presentationml/2006/main">
-  <p:cSld>
-    <p:spTree>
-      <p:nvGrpSpPr>
-        <p:cNvPr id="1" name=""/>
-        <p:cNvGrpSpPr/>
-        <p:nvPr/>
-      </p:nvGrpSpPr>
-      <p:grpSpPr>
-        <a:xfrm>
-          <a:off x="0" y="0"/>
-          <a:ext cx="0" cy="0"/>
-          <a:chOff x="0" y="0"/>
-          <a:chExt cx="0" cy="0"/>
-        </a:xfrm>
-      </p:grpSpPr>
-      <p:sp>
-        <p:nvSpPr>
-          <p:cNvPr id="2" name="Title 1">
-            <a:extLst>
-              <a:ext uri="{FF2B5EF4-FFF2-40B4-BE49-F238E27FC236}">
-                <a16:creationId xmlns:a16="http://schemas.microsoft.com/office/drawing/2014/main" id="{AC7913F7-EBE7-4C91-BFF3-DCDE2DAD3CFD}"/>
-              </a:ext>
-            </a:extLst>
-          </p:cNvPr>
-          <p:cNvSpPr>
-            <a:spLocks noGrp="1"/>
-          </p:cNvSpPr>
-          <p:nvPr>
-            <p:ph type="title"/>
-          </p:nvPr>
-        </p:nvSpPr>
-        <p:spPr/>
-        <p:txBody>
-          <a:bodyPr/>
-          <a:lstStyle/>
-          <a:p>
-            <a:r>
-              <a:rPr lang="en-US" dirty="0"/>
-              <a:t>Collaboration Tests</a:t>
-            </a:r>
-          </a:p>
-        </p:txBody>
-      </p:sp>
-      <p:sp>
-        <p:nvSpPr>
-          <p:cNvPr id="3" name="Content Placeholder 2">
-            <a:extLst>
-              <a:ext uri="{FF2B5EF4-FFF2-40B4-BE49-F238E27FC236}">
-                <a16:creationId xmlns:a16="http://schemas.microsoft.com/office/drawing/2014/main" id="{FABB1545-6DE0-4A0B-A257-AC366B06F614}"/>
-              </a:ext>
-            </a:extLst>
-          </p:cNvPr>
-          <p:cNvSpPr>
-            <a:spLocks noGrp="1"/>
-          </p:cNvSpPr>
-          <p:nvPr>
-            <p:ph idx="1"/>
-          </p:nvPr>
-        </p:nvSpPr>
-        <p:spPr/>
-        <p:txBody>
-          <a:bodyPr/>
-          <a:lstStyle/>
-          <a:p>
-            <a:r>
-              <a:rPr lang="en-US" dirty="0"/>
-              <a:t>Validates a unit correctly coordinates work among multiple </a:t>
-            </a:r>
-            <a:r>
-              <a:rPr lang="en-US" dirty="0">
-                <a:sym typeface="Wingdings" panose="05000000000000000000" pitchFamily="2" charset="2"/>
-              </a:rPr>
-              <a:t>Collaborators</a:t>
-            </a:r>
-            <a:endParaRPr lang="en-US" dirty="0"/>
-          </a:p>
-          <a:p>
-            <a:r>
-              <a:rPr lang="en-US" dirty="0"/>
-              <a:t>Dependencies </a:t>
-            </a:r>
-            <a:r>
-              <a:rPr lang="en-US" dirty="0">
-                <a:sym typeface="Wingdings" panose="05000000000000000000" pitchFamily="2" charset="2"/>
-              </a:rPr>
-              <a:t> Collaborators</a:t>
-            </a:r>
-          </a:p>
-          <a:p>
-            <a:r>
-              <a:rPr lang="en-US" dirty="0">
-                <a:sym typeface="Wingdings" panose="05000000000000000000" pitchFamily="2" charset="2"/>
-              </a:rPr>
-              <a:t>Collaborators are usually faked/mocked/stubbed, and injected</a:t>
-            </a:r>
-          </a:p>
-          <a:p>
-            <a:r>
-              <a:rPr lang="en-US" dirty="0">
-                <a:sym typeface="Wingdings" panose="05000000000000000000" pitchFamily="2" charset="2"/>
-              </a:rPr>
-              <a:t>Collaborators are </a:t>
-            </a:r>
-            <a:r>
-              <a:rPr lang="en-US" i="1" dirty="0">
-                <a:sym typeface="Wingdings" panose="05000000000000000000" pitchFamily="2" charset="2"/>
-              </a:rPr>
-              <a:t>usually</a:t>
-            </a:r>
-            <a:r>
-              <a:rPr lang="en-US" dirty="0">
-                <a:sym typeface="Wingdings" panose="05000000000000000000" pitchFamily="2" charset="2"/>
-              </a:rPr>
-              <a:t> Unit or Integration tested.</a:t>
-            </a:r>
-            <a:endParaRPr lang="en-US" dirty="0"/>
-          </a:p>
-        </p:txBody>
-      </p:sp>
-    </p:spTree>
-    <p:extLst>
-      <p:ext uri="{BB962C8B-B14F-4D97-AF65-F5344CB8AC3E}">
-        <p14:creationId xmlns:p14="http://schemas.microsoft.com/office/powerpoint/2010/main" val="2219601847"/>
-      </p:ext>
-    </p:extLst>
-  </p:cSld>
-  <p:clrMapOvr>
-    <a:masterClrMapping/>
-  </p:clrMapOvr>
-</p:sld>
-</file>
-
 <file path=ppt/slides/slide14.xml><?xml version="1.0" encoding="utf-8"?>
 <p:sld xmlns:a="http://schemas.openxmlformats.org/drawingml/2006/main" xmlns:r="http://schemas.openxmlformats.org/officeDocument/2006/relationships" xmlns:p="http://schemas.openxmlformats.org/presentationml/2006/main">
   <p:cSld>
@@ -5115,7 +5139,7 @@
           <p:cNvPr id="2" name="Title 1">
             <a:extLst>
               <a:ext uri="{FF2B5EF4-FFF2-40B4-BE49-F238E27FC236}">
-                <a16:creationId xmlns:a16="http://schemas.microsoft.com/office/drawing/2014/main" id="{B5D2410A-3EE1-4D78-941F-E23CE2FF8CDF}"/>
+                <a16:creationId xmlns:a16="http://schemas.microsoft.com/office/drawing/2014/main" id="{AE15E957-1F9A-42ED-A6CD-8590734646A0}"/>
               </a:ext>
             </a:extLst>
           </p:cNvPr>
@@ -5133,7 +5157,7 @@
           <a:p>
             <a:r>
               <a:rPr lang="en-US" dirty="0"/>
-              <a:t>Example Collaboration Units</a:t>
+              <a:t>Integration Testing Database Wrappers</a:t>
             </a:r>
           </a:p>
         </p:txBody>
@@ -5143,7 +5167,7 @@
           <p:cNvPr id="3" name="Content Placeholder 2">
             <a:extLst>
               <a:ext uri="{FF2B5EF4-FFF2-40B4-BE49-F238E27FC236}">
-                <a16:creationId xmlns:a16="http://schemas.microsoft.com/office/drawing/2014/main" id="{2E691F39-DBC9-484A-893C-9C548E03B262}"/>
+                <a16:creationId xmlns:a16="http://schemas.microsoft.com/office/drawing/2014/main" id="{949A3F76-958E-4CCA-8CAA-F770E42924F7}"/>
               </a:ext>
             </a:extLst>
           </p:cNvPr>
@@ -5160,41 +5184,51 @@
           <a:lstStyle/>
           <a:p>
             <a:r>
-              <a:rPr lang="en-US" dirty="0"/>
-              <a:t>Controllers</a:t>
-            </a:r>
-          </a:p>
-          <a:p>
-            <a:r>
-              <a:rPr lang="en-US" dirty="0"/>
-              <a:t>Presenters</a:t>
-            </a:r>
-          </a:p>
-          <a:p>
-            <a:pPr marL="0" indent="0">
-              <a:buNone/>
-            </a:pPr>
-            <a:endParaRPr lang="en-US" dirty="0"/>
-          </a:p>
-          <a:p>
-            <a:r>
-              <a:rPr lang="en-US" dirty="0"/>
-              <a:t>Any code unit that coordinates work amongst multiple </a:t>
-            </a:r>
-            <a:r>
-              <a:rPr lang="en-US" dirty="0">
-                <a:sym typeface="Wingdings" panose="05000000000000000000" pitchFamily="2" charset="2"/>
-              </a:rPr>
-              <a:t>Collaborators</a:t>
-            </a:r>
-            <a:endParaRPr lang="en-US" dirty="0"/>
+              <a:rPr lang="en-US" dirty="0" err="1"/>
+              <a:t>Sql</a:t>
+            </a:r>
+            <a:r>
+              <a:rPr lang="en-US" dirty="0"/>
+              <a:t> is code. So is what ORM frameworks create.</a:t>
+            </a:r>
+          </a:p>
+          <a:p>
+            <a:r>
+              <a:rPr lang="en-US" dirty="0"/>
+              <a:t>It must be executed to prove it’s right.</a:t>
+            </a:r>
+          </a:p>
+          <a:p>
+            <a:r>
+              <a:rPr lang="en-US" dirty="0"/>
+              <a:t>Start a transaction in test setup, add test data</a:t>
+            </a:r>
+          </a:p>
+          <a:p>
+            <a:r>
+              <a:rPr lang="en-US" dirty="0"/>
+              <a:t>Rollback in the teardown.</a:t>
+            </a:r>
+          </a:p>
+          <a:p>
+            <a:r>
+              <a:rPr lang="en-US" dirty="0"/>
+              <a:t>Transaction free? GIGUGDG!</a:t>
+            </a:r>
+          </a:p>
+          <a:p>
+            <a:pPr lvl="1"/>
+            <a:r>
+              <a:rPr lang="en-US" dirty="0"/>
+              <a:t>Get, Insert, Get, Update, Get, Delete, Get</a:t>
+            </a:r>
           </a:p>
         </p:txBody>
       </p:sp>
     </p:spTree>
     <p:extLst>
       <p:ext uri="{BB962C8B-B14F-4D97-AF65-F5344CB8AC3E}">
-        <p14:creationId xmlns:p14="http://schemas.microsoft.com/office/powerpoint/2010/main" val="3827814809"/>
+        <p14:creationId xmlns:p14="http://schemas.microsoft.com/office/powerpoint/2010/main" val="1319207513"/>
       </p:ext>
     </p:extLst>
   </p:cSld>
@@ -5226,7 +5260,7 @@
           <p:cNvPr id="2" name="Title 1">
             <a:extLst>
               <a:ext uri="{FF2B5EF4-FFF2-40B4-BE49-F238E27FC236}">
-                <a16:creationId xmlns:a16="http://schemas.microsoft.com/office/drawing/2014/main" id="{6AF862F1-745D-4B2B-B647-FB2F7334CD3C}"/>
+                <a16:creationId xmlns:a16="http://schemas.microsoft.com/office/drawing/2014/main" id="{674287CE-7D3A-4D27-A004-BE5039EEAC61}"/>
               </a:ext>
             </a:extLst>
           </p:cNvPr>
@@ -5244,7 +5278,7 @@
           <a:p>
             <a:r>
               <a:rPr lang="en-US" dirty="0"/>
-              <a:t>Important Rule</a:t>
+              <a:t>Collaboration Tests</a:t>
             </a:r>
           </a:p>
         </p:txBody>
@@ -5254,7 +5288,7 @@
           <p:cNvPr id="3" name="Content Placeholder 2">
             <a:extLst>
               <a:ext uri="{FF2B5EF4-FFF2-40B4-BE49-F238E27FC236}">
-                <a16:creationId xmlns:a16="http://schemas.microsoft.com/office/drawing/2014/main" id="{3D696039-BD98-4283-A596-AC6E998D709F}"/>
+                <a16:creationId xmlns:a16="http://schemas.microsoft.com/office/drawing/2014/main" id="{3953BBA2-881B-4EDB-90F5-770B5445FB9E}"/>
               </a:ext>
             </a:extLst>
           </p:cNvPr>
@@ -5272,7 +5306,13 @@
           <a:p>
             <a:r>
               <a:rPr lang="en-US" dirty="0"/>
-              <a:t>Only use conditionals to decide whether to utilize other collaborators.</a:t>
+              <a:t>What is an Collaboration test?</a:t>
+            </a:r>
+          </a:p>
+          <a:p>
+            <a:r>
+              <a:rPr lang="en-US" dirty="0"/>
+              <a:t>What characteristics are true about a unit tested this way?</a:t>
             </a:r>
           </a:p>
         </p:txBody>
@@ -5280,7 +5320,7 @@
     </p:spTree>
     <p:extLst>
       <p:ext uri="{BB962C8B-B14F-4D97-AF65-F5344CB8AC3E}">
-        <p14:creationId xmlns:p14="http://schemas.microsoft.com/office/powerpoint/2010/main" val="727117611"/>
+        <p14:creationId xmlns:p14="http://schemas.microsoft.com/office/powerpoint/2010/main" val="1978997574"/>
       </p:ext>
     </p:extLst>
   </p:cSld>
@@ -5312,6 +5352,337 @@
           <p:cNvPr id="2" name="Title 1">
             <a:extLst>
               <a:ext uri="{FF2B5EF4-FFF2-40B4-BE49-F238E27FC236}">
+                <a16:creationId xmlns:a16="http://schemas.microsoft.com/office/drawing/2014/main" id="{AC7913F7-EBE7-4C91-BFF3-DCDE2DAD3CFD}"/>
+              </a:ext>
+            </a:extLst>
+          </p:cNvPr>
+          <p:cNvSpPr>
+            <a:spLocks noGrp="1"/>
+          </p:cNvSpPr>
+          <p:nvPr>
+            <p:ph type="title"/>
+          </p:nvPr>
+        </p:nvSpPr>
+        <p:spPr/>
+        <p:txBody>
+          <a:bodyPr/>
+          <a:lstStyle/>
+          <a:p>
+            <a:r>
+              <a:rPr lang="en-US" dirty="0"/>
+              <a:t>Collaboration Tests</a:t>
+            </a:r>
+          </a:p>
+        </p:txBody>
+      </p:sp>
+      <p:sp>
+        <p:nvSpPr>
+          <p:cNvPr id="3" name="Content Placeholder 2">
+            <a:extLst>
+              <a:ext uri="{FF2B5EF4-FFF2-40B4-BE49-F238E27FC236}">
+                <a16:creationId xmlns:a16="http://schemas.microsoft.com/office/drawing/2014/main" id="{FABB1545-6DE0-4A0B-A257-AC366B06F614}"/>
+              </a:ext>
+            </a:extLst>
+          </p:cNvPr>
+          <p:cNvSpPr>
+            <a:spLocks noGrp="1"/>
+          </p:cNvSpPr>
+          <p:nvPr>
+            <p:ph idx="1"/>
+          </p:nvPr>
+        </p:nvSpPr>
+        <p:spPr/>
+        <p:txBody>
+          <a:bodyPr/>
+          <a:lstStyle/>
+          <a:p>
+            <a:r>
+              <a:rPr lang="en-US" dirty="0"/>
+              <a:t>Validates a unit correctly coordinates work among multiple </a:t>
+            </a:r>
+            <a:r>
+              <a:rPr lang="en-US" dirty="0">
+                <a:sym typeface="Wingdings" panose="05000000000000000000" pitchFamily="2" charset="2"/>
+              </a:rPr>
+              <a:t>Collaborators</a:t>
+            </a:r>
+            <a:endParaRPr lang="en-US" dirty="0"/>
+          </a:p>
+          <a:p>
+            <a:r>
+              <a:rPr lang="en-US" dirty="0"/>
+              <a:t>Dependencies </a:t>
+            </a:r>
+            <a:r>
+              <a:rPr lang="en-US" dirty="0">
+                <a:sym typeface="Wingdings" panose="05000000000000000000" pitchFamily="2" charset="2"/>
+              </a:rPr>
+              <a:t> Collaborators</a:t>
+            </a:r>
+          </a:p>
+          <a:p>
+            <a:r>
+              <a:rPr lang="en-US" dirty="0">
+                <a:sym typeface="Wingdings" panose="05000000000000000000" pitchFamily="2" charset="2"/>
+              </a:rPr>
+              <a:t>Collaborators are usually faked/mocked/stubbed, and injected</a:t>
+            </a:r>
+          </a:p>
+          <a:p>
+            <a:r>
+              <a:rPr lang="en-US" dirty="0">
+                <a:sym typeface="Wingdings" panose="05000000000000000000" pitchFamily="2" charset="2"/>
+              </a:rPr>
+              <a:t>Collaborators are </a:t>
+            </a:r>
+            <a:r>
+              <a:rPr lang="en-US" i="1" dirty="0">
+                <a:sym typeface="Wingdings" panose="05000000000000000000" pitchFamily="2" charset="2"/>
+              </a:rPr>
+              <a:t>usually</a:t>
+            </a:r>
+            <a:r>
+              <a:rPr lang="en-US" dirty="0">
+                <a:sym typeface="Wingdings" panose="05000000000000000000" pitchFamily="2" charset="2"/>
+              </a:rPr>
+              <a:t> Unit or Integration tested.</a:t>
+            </a:r>
+            <a:endParaRPr lang="en-US" dirty="0"/>
+          </a:p>
+        </p:txBody>
+      </p:sp>
+    </p:spTree>
+    <p:extLst>
+      <p:ext uri="{BB962C8B-B14F-4D97-AF65-F5344CB8AC3E}">
+        <p14:creationId xmlns:p14="http://schemas.microsoft.com/office/powerpoint/2010/main" val="2219601847"/>
+      </p:ext>
+    </p:extLst>
+  </p:cSld>
+  <p:clrMapOvr>
+    <a:masterClrMapping/>
+  </p:clrMapOvr>
+</p:sld>
+</file>
+
+<file path=ppt/slides/slide17.xml><?xml version="1.0" encoding="utf-8"?>
+<p:sld xmlns:a="http://schemas.openxmlformats.org/drawingml/2006/main" xmlns:r="http://schemas.openxmlformats.org/officeDocument/2006/relationships" xmlns:p="http://schemas.openxmlformats.org/presentationml/2006/main">
+  <p:cSld>
+    <p:spTree>
+      <p:nvGrpSpPr>
+        <p:cNvPr id="1" name=""/>
+        <p:cNvGrpSpPr/>
+        <p:nvPr/>
+      </p:nvGrpSpPr>
+      <p:grpSpPr>
+        <a:xfrm>
+          <a:off x="0" y="0"/>
+          <a:ext cx="0" cy="0"/>
+          <a:chOff x="0" y="0"/>
+          <a:chExt cx="0" cy="0"/>
+        </a:xfrm>
+      </p:grpSpPr>
+      <p:sp>
+        <p:nvSpPr>
+          <p:cNvPr id="2" name="Title 1">
+            <a:extLst>
+              <a:ext uri="{FF2B5EF4-FFF2-40B4-BE49-F238E27FC236}">
+                <a16:creationId xmlns:a16="http://schemas.microsoft.com/office/drawing/2014/main" id="{B5D2410A-3EE1-4D78-941F-E23CE2FF8CDF}"/>
+              </a:ext>
+            </a:extLst>
+          </p:cNvPr>
+          <p:cNvSpPr>
+            <a:spLocks noGrp="1"/>
+          </p:cNvSpPr>
+          <p:nvPr>
+            <p:ph type="title"/>
+          </p:nvPr>
+        </p:nvSpPr>
+        <p:spPr/>
+        <p:txBody>
+          <a:bodyPr/>
+          <a:lstStyle/>
+          <a:p>
+            <a:r>
+              <a:rPr lang="en-US" dirty="0"/>
+              <a:t>Example Collaboration Units</a:t>
+            </a:r>
+          </a:p>
+        </p:txBody>
+      </p:sp>
+      <p:sp>
+        <p:nvSpPr>
+          <p:cNvPr id="3" name="Content Placeholder 2">
+            <a:extLst>
+              <a:ext uri="{FF2B5EF4-FFF2-40B4-BE49-F238E27FC236}">
+                <a16:creationId xmlns:a16="http://schemas.microsoft.com/office/drawing/2014/main" id="{2E691F39-DBC9-484A-893C-9C548E03B262}"/>
+              </a:ext>
+            </a:extLst>
+          </p:cNvPr>
+          <p:cNvSpPr>
+            <a:spLocks noGrp="1"/>
+          </p:cNvSpPr>
+          <p:nvPr>
+            <p:ph idx="1"/>
+          </p:nvPr>
+        </p:nvSpPr>
+        <p:spPr/>
+        <p:txBody>
+          <a:bodyPr/>
+          <a:lstStyle/>
+          <a:p>
+            <a:r>
+              <a:rPr lang="en-US" dirty="0"/>
+              <a:t>Controllers</a:t>
+            </a:r>
+          </a:p>
+          <a:p>
+            <a:r>
+              <a:rPr lang="en-US" dirty="0"/>
+              <a:t>Presenters</a:t>
+            </a:r>
+          </a:p>
+          <a:p>
+            <a:pPr marL="0" indent="0">
+              <a:buNone/>
+            </a:pPr>
+            <a:endParaRPr lang="en-US" dirty="0"/>
+          </a:p>
+          <a:p>
+            <a:r>
+              <a:rPr lang="en-US" dirty="0"/>
+              <a:t>Any code unit that coordinates work amongst multiple </a:t>
+            </a:r>
+            <a:r>
+              <a:rPr lang="en-US" dirty="0">
+                <a:sym typeface="Wingdings" panose="05000000000000000000" pitchFamily="2" charset="2"/>
+              </a:rPr>
+              <a:t>Collaborators</a:t>
+            </a:r>
+            <a:endParaRPr lang="en-US" dirty="0"/>
+          </a:p>
+        </p:txBody>
+      </p:sp>
+    </p:spTree>
+    <p:extLst>
+      <p:ext uri="{BB962C8B-B14F-4D97-AF65-F5344CB8AC3E}">
+        <p14:creationId xmlns:p14="http://schemas.microsoft.com/office/powerpoint/2010/main" val="3827814809"/>
+      </p:ext>
+    </p:extLst>
+  </p:cSld>
+  <p:clrMapOvr>
+    <a:masterClrMapping/>
+  </p:clrMapOvr>
+</p:sld>
+</file>
+
+<file path=ppt/slides/slide18.xml><?xml version="1.0" encoding="utf-8"?>
+<p:sld xmlns:a="http://schemas.openxmlformats.org/drawingml/2006/main" xmlns:r="http://schemas.openxmlformats.org/officeDocument/2006/relationships" xmlns:p="http://schemas.openxmlformats.org/presentationml/2006/main">
+  <p:cSld>
+    <p:spTree>
+      <p:nvGrpSpPr>
+        <p:cNvPr id="1" name=""/>
+        <p:cNvGrpSpPr/>
+        <p:nvPr/>
+      </p:nvGrpSpPr>
+      <p:grpSpPr>
+        <a:xfrm>
+          <a:off x="0" y="0"/>
+          <a:ext cx="0" cy="0"/>
+          <a:chOff x="0" y="0"/>
+          <a:chExt cx="0" cy="0"/>
+        </a:xfrm>
+      </p:grpSpPr>
+      <p:sp>
+        <p:nvSpPr>
+          <p:cNvPr id="2" name="Title 1">
+            <a:extLst>
+              <a:ext uri="{FF2B5EF4-FFF2-40B4-BE49-F238E27FC236}">
+                <a16:creationId xmlns:a16="http://schemas.microsoft.com/office/drawing/2014/main" id="{6AF862F1-745D-4B2B-B647-FB2F7334CD3C}"/>
+              </a:ext>
+            </a:extLst>
+          </p:cNvPr>
+          <p:cNvSpPr>
+            <a:spLocks noGrp="1"/>
+          </p:cNvSpPr>
+          <p:nvPr>
+            <p:ph type="title"/>
+          </p:nvPr>
+        </p:nvSpPr>
+        <p:spPr/>
+        <p:txBody>
+          <a:bodyPr/>
+          <a:lstStyle/>
+          <a:p>
+            <a:r>
+              <a:rPr lang="en-US" dirty="0"/>
+              <a:t>Important Rule</a:t>
+            </a:r>
+          </a:p>
+        </p:txBody>
+      </p:sp>
+      <p:sp>
+        <p:nvSpPr>
+          <p:cNvPr id="3" name="Content Placeholder 2">
+            <a:extLst>
+              <a:ext uri="{FF2B5EF4-FFF2-40B4-BE49-F238E27FC236}">
+                <a16:creationId xmlns:a16="http://schemas.microsoft.com/office/drawing/2014/main" id="{3D696039-BD98-4283-A596-AC6E998D709F}"/>
+              </a:ext>
+            </a:extLst>
+          </p:cNvPr>
+          <p:cNvSpPr>
+            <a:spLocks noGrp="1"/>
+          </p:cNvSpPr>
+          <p:nvPr>
+            <p:ph idx="1"/>
+          </p:nvPr>
+        </p:nvSpPr>
+        <p:spPr/>
+        <p:txBody>
+          <a:bodyPr/>
+          <a:lstStyle/>
+          <a:p>
+            <a:r>
+              <a:rPr lang="en-US" dirty="0"/>
+              <a:t>Only use conditionals to decide whether to utilize other collaborators.</a:t>
+            </a:r>
+          </a:p>
+        </p:txBody>
+      </p:sp>
+    </p:spTree>
+    <p:extLst>
+      <p:ext uri="{BB962C8B-B14F-4D97-AF65-F5344CB8AC3E}">
+        <p14:creationId xmlns:p14="http://schemas.microsoft.com/office/powerpoint/2010/main" val="727117611"/>
+      </p:ext>
+    </p:extLst>
+  </p:cSld>
+  <p:clrMapOvr>
+    <a:masterClrMapping/>
+  </p:clrMapOvr>
+</p:sld>
+</file>
+
+<file path=ppt/slides/slide19.xml><?xml version="1.0" encoding="utf-8"?>
+<p:sld xmlns:a="http://schemas.openxmlformats.org/drawingml/2006/main" xmlns:r="http://schemas.openxmlformats.org/officeDocument/2006/relationships" xmlns:p="http://schemas.openxmlformats.org/presentationml/2006/main">
+  <p:cSld>
+    <p:spTree>
+      <p:nvGrpSpPr>
+        <p:cNvPr id="1" name=""/>
+        <p:cNvGrpSpPr/>
+        <p:nvPr/>
+      </p:nvGrpSpPr>
+      <p:grpSpPr>
+        <a:xfrm>
+          <a:off x="0" y="0"/>
+          <a:ext cx="0" cy="0"/>
+          <a:chOff x="0" y="0"/>
+          <a:chExt cx="0" cy="0"/>
+        </a:xfrm>
+      </p:grpSpPr>
+      <p:sp>
+        <p:nvSpPr>
+          <p:cNvPr id="2" name="Title 1">
+            <a:extLst>
+              <a:ext uri="{FF2B5EF4-FFF2-40B4-BE49-F238E27FC236}">
                 <a16:creationId xmlns:a16="http://schemas.microsoft.com/office/drawing/2014/main" id="{0930695A-8B36-4358-A5A6-2D225FF12CA8}"/>
               </a:ext>
             </a:extLst>
@@ -5499,7 +5870,125 @@
 </p:sld>
 </file>
 
-<file path=ppt/slides/slide17.xml><?xml version="1.0" encoding="utf-8"?>
+<file path=ppt/slides/slide2.xml><?xml version="1.0" encoding="utf-8"?>
+<p:sld xmlns:a="http://schemas.openxmlformats.org/drawingml/2006/main" xmlns:r="http://schemas.openxmlformats.org/officeDocument/2006/relationships" xmlns:p="http://schemas.openxmlformats.org/presentationml/2006/main">
+  <p:cSld>
+    <p:spTree>
+      <p:nvGrpSpPr>
+        <p:cNvPr id="1" name=""/>
+        <p:cNvGrpSpPr/>
+        <p:nvPr/>
+      </p:nvGrpSpPr>
+      <p:grpSpPr>
+        <a:xfrm>
+          <a:off x="0" y="0"/>
+          <a:ext cx="0" cy="0"/>
+          <a:chOff x="0" y="0"/>
+          <a:chExt cx="0" cy="0"/>
+        </a:xfrm>
+      </p:grpSpPr>
+      <p:sp>
+        <p:nvSpPr>
+          <p:cNvPr id="2" name="Title 1">
+            <a:extLst>
+              <a:ext uri="{FF2B5EF4-FFF2-40B4-BE49-F238E27FC236}">
+                <a16:creationId xmlns:a16="http://schemas.microsoft.com/office/drawing/2014/main" id="{FE93B04C-D131-430D-A8FB-B7441E7E2F1E}"/>
+              </a:ext>
+            </a:extLst>
+          </p:cNvPr>
+          <p:cNvSpPr>
+            <a:spLocks noGrp="1"/>
+          </p:cNvSpPr>
+          <p:nvPr>
+            <p:ph type="title"/>
+          </p:nvPr>
+        </p:nvSpPr>
+        <p:spPr/>
+        <p:txBody>
+          <a:bodyPr/>
+          <a:lstStyle/>
+          <a:p>
+            <a:r>
+              <a:rPr lang="en-US" dirty="0"/>
+              <a:t>Definition</a:t>
+            </a:r>
+          </a:p>
+        </p:txBody>
+      </p:sp>
+      <p:sp>
+        <p:nvSpPr>
+          <p:cNvPr id="3" name="Content Placeholder 2">
+            <a:extLst>
+              <a:ext uri="{FF2B5EF4-FFF2-40B4-BE49-F238E27FC236}">
+                <a16:creationId xmlns:a16="http://schemas.microsoft.com/office/drawing/2014/main" id="{B12988EF-F01B-4302-AFC3-4BB9D0A82CB8}"/>
+              </a:ext>
+            </a:extLst>
+          </p:cNvPr>
+          <p:cNvSpPr>
+            <a:spLocks noGrp="1"/>
+          </p:cNvSpPr>
+          <p:nvPr>
+            <p:ph idx="1"/>
+          </p:nvPr>
+        </p:nvSpPr>
+        <p:spPr>
+          <a:xfrm>
+            <a:off x="2658326" y="2052116"/>
+            <a:ext cx="7796540" cy="3997828"/>
+          </a:xfrm>
+        </p:spPr>
+        <p:txBody>
+          <a:bodyPr/>
+          <a:lstStyle/>
+          <a:p>
+            <a:r>
+              <a:rPr lang="en-US" dirty="0"/>
+              <a:t>A unit should require only a single mode of testing to be verified.</a:t>
+            </a:r>
+          </a:p>
+          <a:p>
+            <a:endParaRPr lang="en-US" dirty="0"/>
+          </a:p>
+          <a:p>
+            <a:endParaRPr lang="en-US" dirty="0"/>
+          </a:p>
+          <a:p>
+            <a:pPr marL="0" indent="0">
+              <a:buNone/>
+            </a:pPr>
+            <a:endParaRPr lang="en-US" dirty="0"/>
+          </a:p>
+          <a:p>
+            <a:r>
+              <a:rPr lang="en-US" dirty="0"/>
+              <a:t>Multiple modes of testing is an indicator of excessive complexity </a:t>
+            </a:r>
+          </a:p>
+          <a:p>
+            <a:r>
+              <a:rPr lang="en-US" dirty="0"/>
+              <a:t>Indicates the need to decompose a unit</a:t>
+            </a:r>
+          </a:p>
+          <a:p>
+            <a:endParaRPr lang="en-US" dirty="0"/>
+          </a:p>
+        </p:txBody>
+      </p:sp>
+    </p:spTree>
+    <p:extLst>
+      <p:ext uri="{BB962C8B-B14F-4D97-AF65-F5344CB8AC3E}">
+        <p14:creationId xmlns:p14="http://schemas.microsoft.com/office/powerpoint/2010/main" val="1767524376"/>
+      </p:ext>
+    </p:extLst>
+  </p:cSld>
+  <p:clrMapOvr>
+    <a:masterClrMapping/>
+  </p:clrMapOvr>
+</p:sld>
+</file>
+
+<file path=ppt/slides/slide20.xml><?xml version="1.0" encoding="utf-8"?>
 <p:sld xmlns:a="http://schemas.openxmlformats.org/drawingml/2006/main" xmlns:r="http://schemas.openxmlformats.org/officeDocument/2006/relationships" xmlns:p="http://schemas.openxmlformats.org/presentationml/2006/main">
   <p:cSld>
     <p:spTree>
@@ -5634,7 +6123,7 @@
 </p:sld>
 </file>
 
-<file path=ppt/slides/slide18.xml><?xml version="1.0" encoding="utf-8"?>
+<file path=ppt/slides/slide21.xml><?xml version="1.0" encoding="utf-8"?>
 <p:sld xmlns:a="http://schemas.openxmlformats.org/drawingml/2006/main" xmlns:r="http://schemas.openxmlformats.org/officeDocument/2006/relationships" xmlns:p="http://schemas.openxmlformats.org/presentationml/2006/main">
   <p:cSld>
     <p:spTree>
@@ -5774,7 +6263,7 @@
 </p:sld>
 </file>
 
-<file path=ppt/slides/slide19.xml><?xml version="1.0" encoding="utf-8"?>
+<file path=ppt/slides/slide22.xml><?xml version="1.0" encoding="utf-8"?>
 <p:sld xmlns:a="http://schemas.openxmlformats.org/drawingml/2006/main" xmlns:r="http://schemas.openxmlformats.org/officeDocument/2006/relationships" xmlns:p="http://schemas.openxmlformats.org/presentationml/2006/main">
   <p:cSld>
     <p:spTree>
@@ -5914,125 +6403,7 @@
 </p:sld>
 </file>
 
-<file path=ppt/slides/slide2.xml><?xml version="1.0" encoding="utf-8"?>
-<p:sld xmlns:a="http://schemas.openxmlformats.org/drawingml/2006/main" xmlns:r="http://schemas.openxmlformats.org/officeDocument/2006/relationships" xmlns:p="http://schemas.openxmlformats.org/presentationml/2006/main">
-  <p:cSld>
-    <p:spTree>
-      <p:nvGrpSpPr>
-        <p:cNvPr id="1" name=""/>
-        <p:cNvGrpSpPr/>
-        <p:nvPr/>
-      </p:nvGrpSpPr>
-      <p:grpSpPr>
-        <a:xfrm>
-          <a:off x="0" y="0"/>
-          <a:ext cx="0" cy="0"/>
-          <a:chOff x="0" y="0"/>
-          <a:chExt cx="0" cy="0"/>
-        </a:xfrm>
-      </p:grpSpPr>
-      <p:sp>
-        <p:nvSpPr>
-          <p:cNvPr id="2" name="Title 1">
-            <a:extLst>
-              <a:ext uri="{FF2B5EF4-FFF2-40B4-BE49-F238E27FC236}">
-                <a16:creationId xmlns:a16="http://schemas.microsoft.com/office/drawing/2014/main" id="{FE93B04C-D131-430D-A8FB-B7441E7E2F1E}"/>
-              </a:ext>
-            </a:extLst>
-          </p:cNvPr>
-          <p:cNvSpPr>
-            <a:spLocks noGrp="1"/>
-          </p:cNvSpPr>
-          <p:nvPr>
-            <p:ph type="title"/>
-          </p:nvPr>
-        </p:nvSpPr>
-        <p:spPr/>
-        <p:txBody>
-          <a:bodyPr/>
-          <a:lstStyle/>
-          <a:p>
-            <a:r>
-              <a:rPr lang="en-US" dirty="0"/>
-              <a:t>Definition</a:t>
-            </a:r>
-          </a:p>
-        </p:txBody>
-      </p:sp>
-      <p:sp>
-        <p:nvSpPr>
-          <p:cNvPr id="3" name="Content Placeholder 2">
-            <a:extLst>
-              <a:ext uri="{FF2B5EF4-FFF2-40B4-BE49-F238E27FC236}">
-                <a16:creationId xmlns:a16="http://schemas.microsoft.com/office/drawing/2014/main" id="{B12988EF-F01B-4302-AFC3-4BB9D0A82CB8}"/>
-              </a:ext>
-            </a:extLst>
-          </p:cNvPr>
-          <p:cNvSpPr>
-            <a:spLocks noGrp="1"/>
-          </p:cNvSpPr>
-          <p:nvPr>
-            <p:ph idx="1"/>
-          </p:nvPr>
-        </p:nvSpPr>
-        <p:spPr>
-          <a:xfrm>
-            <a:off x="2658326" y="2052116"/>
-            <a:ext cx="7796540" cy="3997828"/>
-          </a:xfrm>
-        </p:spPr>
-        <p:txBody>
-          <a:bodyPr/>
-          <a:lstStyle/>
-          <a:p>
-            <a:r>
-              <a:rPr lang="en-US" dirty="0"/>
-              <a:t>A unit should require only a single mode of testing to be verified.</a:t>
-            </a:r>
-          </a:p>
-          <a:p>
-            <a:endParaRPr lang="en-US" dirty="0"/>
-          </a:p>
-          <a:p>
-            <a:endParaRPr lang="en-US" dirty="0"/>
-          </a:p>
-          <a:p>
-            <a:pPr marL="0" indent="0">
-              <a:buNone/>
-            </a:pPr>
-            <a:endParaRPr lang="en-US" dirty="0"/>
-          </a:p>
-          <a:p>
-            <a:r>
-              <a:rPr lang="en-US" dirty="0"/>
-              <a:t>Multiple modes of testing is an indicator of excessive complexity </a:t>
-            </a:r>
-          </a:p>
-          <a:p>
-            <a:r>
-              <a:rPr lang="en-US" dirty="0"/>
-              <a:t>Indicates the need to decompose a unit</a:t>
-            </a:r>
-          </a:p>
-          <a:p>
-            <a:endParaRPr lang="en-US" dirty="0"/>
-          </a:p>
-        </p:txBody>
-      </p:sp>
-    </p:spTree>
-    <p:extLst>
-      <p:ext uri="{BB962C8B-B14F-4D97-AF65-F5344CB8AC3E}">
-        <p14:creationId xmlns:p14="http://schemas.microsoft.com/office/powerpoint/2010/main" val="1767524376"/>
-      </p:ext>
-    </p:extLst>
-  </p:cSld>
-  <p:clrMapOvr>
-    <a:masterClrMapping/>
-  </p:clrMapOvr>
-</p:sld>
-</file>
-
-<file path=ppt/slides/slide20.xml><?xml version="1.0" encoding="utf-8"?>
+<file path=ppt/slides/slide23.xml><?xml version="1.0" encoding="utf-8"?>
 <p:sld xmlns:a="http://schemas.openxmlformats.org/drawingml/2006/main" xmlns:r="http://schemas.openxmlformats.org/officeDocument/2006/relationships" xmlns:p="http://schemas.openxmlformats.org/presentationml/2006/main">
   <p:cSld>
     <p:spTree>
@@ -6167,7 +6538,7 @@
 </p:sld>
 </file>
 
-<file path=ppt/slides/slide21.xml><?xml version="1.0" encoding="utf-8"?>
+<file path=ppt/slides/slide24.xml><?xml version="1.0" encoding="utf-8"?>
 <p:sld xmlns:a="http://schemas.openxmlformats.org/drawingml/2006/main" xmlns:r="http://schemas.openxmlformats.org/officeDocument/2006/relationships" xmlns:p="http://schemas.openxmlformats.org/presentationml/2006/main">
   <p:cSld>
     <p:spTree>
@@ -6302,7 +6673,7 @@
 </p:sld>
 </file>
 
-<file path=ppt/slides/slide22.xml><?xml version="1.0" encoding="utf-8"?>
+<file path=ppt/slides/slide25.xml><?xml version="1.0" encoding="utf-8"?>
 <p:sld xmlns:a="http://schemas.openxmlformats.org/drawingml/2006/main" xmlns:r="http://schemas.openxmlformats.org/officeDocument/2006/relationships" xmlns:p="http://schemas.openxmlformats.org/presentationml/2006/main">
   <p:cSld>
     <p:spTree>
@@ -6437,7 +6808,7 @@
 </p:sld>
 </file>
 
-<file path=ppt/slides/slide23.xml><?xml version="1.0" encoding="utf-8"?>
+<file path=ppt/slides/slide26.xml><?xml version="1.0" encoding="utf-8"?>
 <p:sld xmlns:a="http://schemas.openxmlformats.org/drawingml/2006/main" xmlns:r="http://schemas.openxmlformats.org/officeDocument/2006/relationships" xmlns:p="http://schemas.openxmlformats.org/presentationml/2006/main">
   <p:cSld>
     <p:spTree>
@@ -6572,7 +6943,7 @@
 </p:sld>
 </file>
 
-<file path=ppt/slides/slide24.xml><?xml version="1.0" encoding="utf-8"?>
+<file path=ppt/slides/slide27.xml><?xml version="1.0" encoding="utf-8"?>
 <p:sld xmlns:a="http://schemas.openxmlformats.org/drawingml/2006/main" xmlns:r="http://schemas.openxmlformats.org/officeDocument/2006/relationships" xmlns:p="http://schemas.openxmlformats.org/presentationml/2006/main">
   <p:cSld>
     <p:spTree>
@@ -6594,7 +6965,7 @@
           <p:cNvPr id="2" name="Title 1">
             <a:extLst>
               <a:ext uri="{FF2B5EF4-FFF2-40B4-BE49-F238E27FC236}">
-                <a16:creationId xmlns:a16="http://schemas.microsoft.com/office/drawing/2014/main" id="{9CE869D5-B174-43EA-BEA2-710CAA298370}"/>
+                <a16:creationId xmlns:a16="http://schemas.microsoft.com/office/drawing/2014/main" id="{303011CE-5A82-41D4-A73E-838B0B4950E3}"/>
               </a:ext>
             </a:extLst>
           </p:cNvPr>
@@ -6612,7 +6983,7 @@
           <a:p>
             <a:r>
               <a:rPr lang="en-US" dirty="0"/>
-              <a:t>Order of development</a:t>
+              <a:t>Did you spot the error?</a:t>
             </a:r>
           </a:p>
         </p:txBody>
@@ -6622,7 +6993,7 @@
           <p:cNvPr id="3" name="Content Placeholder 2">
             <a:extLst>
               <a:ext uri="{FF2B5EF4-FFF2-40B4-BE49-F238E27FC236}">
-                <a16:creationId xmlns:a16="http://schemas.microsoft.com/office/drawing/2014/main" id="{E4BC8F45-D021-4707-B952-B0ED1B9774C6}"/>
+                <a16:creationId xmlns:a16="http://schemas.microsoft.com/office/drawing/2014/main" id="{DE42CD85-1C9F-4BAE-9CE6-42B999EA91BA}"/>
               </a:ext>
             </a:extLst>
           </p:cNvPr>
@@ -6640,25 +7011,13 @@
           <a:p>
             <a:r>
               <a:rPr lang="en-US" dirty="0"/>
-              <a:t>0. Think of the units you will build. </a:t>
-            </a:r>
-          </a:p>
-          <a:p>
-            <a:r>
-              <a:rPr lang="en-US" dirty="0"/>
-              <a:t>1. Unit units first. Isolated == Easy, Fast</a:t>
-            </a:r>
-          </a:p>
-          <a:p>
-            <a:r>
-              <a:rPr lang="en-US" dirty="0"/>
-              <a:t>2. Integration units next. Usually will move data from the Units.</a:t>
-            </a:r>
-          </a:p>
-          <a:p>
-            <a:r>
-              <a:rPr lang="en-US" dirty="0"/>
-              <a:t>3. Collaboration units last. Will accept the Unit and Integration units are Collaborators. Code is usually obvious when collaborators are complete.</a:t>
+              <a:t>We broke the rule!</a:t>
+            </a:r>
+          </a:p>
+          <a:p>
+            <a:r>
+              <a:rPr lang="en-US" dirty="0"/>
+              <a:t>Where?</a:t>
             </a:r>
           </a:p>
         </p:txBody>
@@ -6666,7 +7025,7 @@
     </p:spTree>
     <p:extLst>
       <p:ext uri="{BB962C8B-B14F-4D97-AF65-F5344CB8AC3E}">
-        <p14:creationId xmlns:p14="http://schemas.microsoft.com/office/powerpoint/2010/main" val="2535729040"/>
+        <p14:creationId xmlns:p14="http://schemas.microsoft.com/office/powerpoint/2010/main" val="189141022"/>
       </p:ext>
     </p:extLst>
   </p:cSld>
@@ -6676,7 +7035,7 @@
 </p:sld>
 </file>
 
-<file path=ppt/slides/slide25.xml><?xml version="1.0" encoding="utf-8"?>
+<file path=ppt/slides/slide28.xml><?xml version="1.0" encoding="utf-8"?>
 <p:sld xmlns:a="http://schemas.openxmlformats.org/drawingml/2006/main" xmlns:r="http://schemas.openxmlformats.org/officeDocument/2006/relationships" xmlns:p="http://schemas.openxmlformats.org/presentationml/2006/main">
   <p:cSld>
     <p:spTree>
@@ -6698,7 +7057,7 @@
           <p:cNvPr id="2" name="Title 1">
             <a:extLst>
               <a:ext uri="{FF2B5EF4-FFF2-40B4-BE49-F238E27FC236}">
-                <a16:creationId xmlns:a16="http://schemas.microsoft.com/office/drawing/2014/main" id="{5DD8BA46-DB8E-4F19-BF68-5617238AB18F}"/>
+                <a16:creationId xmlns:a16="http://schemas.microsoft.com/office/drawing/2014/main" id="{8D43A6A4-2176-469B-9BE7-2741C9569268}"/>
               </a:ext>
             </a:extLst>
           </p:cNvPr>
@@ -6716,7 +7075,7 @@
           <a:p>
             <a:r>
               <a:rPr lang="en-US" dirty="0"/>
-              <a:t>Reference</a:t>
+              <a:t>We broke the rules!</a:t>
             </a:r>
           </a:p>
         </p:txBody>
@@ -6726,7 +7085,7 @@
           <p:cNvPr id="3" name="Content Placeholder 2">
             <a:extLst>
               <a:ext uri="{FF2B5EF4-FFF2-40B4-BE49-F238E27FC236}">
-                <a16:creationId xmlns:a16="http://schemas.microsoft.com/office/drawing/2014/main" id="{E7582A84-F78B-44B5-88FC-91910C2DF35B}"/>
+                <a16:creationId xmlns:a16="http://schemas.microsoft.com/office/drawing/2014/main" id="{DBDAC322-1D9B-472F-A67C-C3EA961BEB53}"/>
               </a:ext>
             </a:extLst>
           </p:cNvPr>
@@ -6742,23 +7101,158 @@
           <a:bodyPr/>
           <a:lstStyle/>
           <a:p>
-            <a:r>
-              <a:rPr lang="en-US" dirty="0">
-                <a:hlinkClick r:id="rId2"/>
-              </a:rPr>
-              <a:t>https://github.com/mvphelps</a:t>
-            </a:r>
-            <a:endParaRPr lang="en-US" dirty="0"/>
-          </a:p>
-          <a:p>
-            <a:endParaRPr lang="en-US" dirty="0"/>
-          </a:p>
-        </p:txBody>
-      </p:sp>
+            <a:endParaRPr lang="en-US" dirty="0"/>
+          </a:p>
+        </p:txBody>
+      </p:sp>
+      <p:pic>
+        <p:nvPicPr>
+          <p:cNvPr id="4" name="Picture 3">
+            <a:extLst>
+              <a:ext uri="{FF2B5EF4-FFF2-40B4-BE49-F238E27FC236}">
+                <a16:creationId xmlns:a16="http://schemas.microsoft.com/office/drawing/2014/main" id="{EC869F65-E53A-4907-9970-0C9DFDD10B57}"/>
+              </a:ext>
+            </a:extLst>
+          </p:cNvPr>
+          <p:cNvPicPr>
+            <a:picLocks noChangeAspect="1"/>
+          </p:cNvPicPr>
+          <p:nvPr/>
+        </p:nvPicPr>
+        <p:blipFill>
+          <a:blip r:embed="rId2"/>
+          <a:stretch>
+            <a:fillRect/>
+          </a:stretch>
+        </p:blipFill>
+        <p:spPr>
+          <a:xfrm>
+            <a:off x="2518863" y="2033273"/>
+            <a:ext cx="7154273" cy="4505954"/>
+          </a:xfrm>
+          <a:prstGeom prst="rect">
+            <a:avLst/>
+          </a:prstGeom>
+        </p:spPr>
+      </p:pic>
     </p:spTree>
     <p:extLst>
       <p:ext uri="{BB962C8B-B14F-4D97-AF65-F5344CB8AC3E}">
-        <p14:creationId xmlns:p14="http://schemas.microsoft.com/office/powerpoint/2010/main" val="3254126608"/>
+        <p14:creationId xmlns:p14="http://schemas.microsoft.com/office/powerpoint/2010/main" val="2747066352"/>
+      </p:ext>
+    </p:extLst>
+  </p:cSld>
+  <p:clrMapOvr>
+    <a:masterClrMapping/>
+  </p:clrMapOvr>
+</p:sld>
+</file>
+
+<file path=ppt/slides/slide29.xml><?xml version="1.0" encoding="utf-8"?>
+<p:sld xmlns:a="http://schemas.openxmlformats.org/drawingml/2006/main" xmlns:r="http://schemas.openxmlformats.org/officeDocument/2006/relationships" xmlns:p="http://schemas.openxmlformats.org/presentationml/2006/main">
+  <p:cSld>
+    <p:spTree>
+      <p:nvGrpSpPr>
+        <p:cNvPr id="1" name=""/>
+        <p:cNvGrpSpPr/>
+        <p:nvPr/>
+      </p:nvGrpSpPr>
+      <p:grpSpPr>
+        <a:xfrm>
+          <a:off x="0" y="0"/>
+          <a:ext cx="0" cy="0"/>
+          <a:chOff x="0" y="0"/>
+          <a:chExt cx="0" cy="0"/>
+        </a:xfrm>
+      </p:grpSpPr>
+      <p:sp>
+        <p:nvSpPr>
+          <p:cNvPr id="2" name="Title 1">
+            <a:extLst>
+              <a:ext uri="{FF2B5EF4-FFF2-40B4-BE49-F238E27FC236}">
+                <a16:creationId xmlns:a16="http://schemas.microsoft.com/office/drawing/2014/main" id="{A5F1D11D-630A-4A9C-8AF2-CAD4856C5F23}"/>
+              </a:ext>
+            </a:extLst>
+          </p:cNvPr>
+          <p:cNvSpPr>
+            <a:spLocks noGrp="1"/>
+          </p:cNvSpPr>
+          <p:nvPr>
+            <p:ph type="title"/>
+          </p:nvPr>
+        </p:nvSpPr>
+        <p:spPr/>
+        <p:txBody>
+          <a:bodyPr/>
+          <a:lstStyle/>
+          <a:p>
+            <a:r>
+              <a:rPr lang="en-US" dirty="0" err="1"/>
+              <a:t>UserInput.cs</a:t>
+            </a:r>
+            <a:endParaRPr lang="en-US" dirty="0"/>
+          </a:p>
+        </p:txBody>
+      </p:sp>
+      <p:sp>
+        <p:nvSpPr>
+          <p:cNvPr id="3" name="Content Placeholder 2">
+            <a:extLst>
+              <a:ext uri="{FF2B5EF4-FFF2-40B4-BE49-F238E27FC236}">
+                <a16:creationId xmlns:a16="http://schemas.microsoft.com/office/drawing/2014/main" id="{2937BBD7-B383-4377-A59E-E4D2F756C24B}"/>
+              </a:ext>
+            </a:extLst>
+          </p:cNvPr>
+          <p:cNvSpPr>
+            <a:spLocks noGrp="1"/>
+          </p:cNvSpPr>
+          <p:nvPr>
+            <p:ph idx="1"/>
+          </p:nvPr>
+        </p:nvSpPr>
+        <p:spPr/>
+        <p:txBody>
+          <a:bodyPr/>
+          <a:lstStyle/>
+          <a:p>
+            <a:endParaRPr lang="en-US"/>
+          </a:p>
+        </p:txBody>
+      </p:sp>
+      <p:pic>
+        <p:nvPicPr>
+          <p:cNvPr id="4" name="Picture 3">
+            <a:extLst>
+              <a:ext uri="{FF2B5EF4-FFF2-40B4-BE49-F238E27FC236}">
+                <a16:creationId xmlns:a16="http://schemas.microsoft.com/office/drawing/2014/main" id="{140F7DE7-8119-4DF2-93D4-B35DC58C7BA4}"/>
+              </a:ext>
+            </a:extLst>
+          </p:cNvPr>
+          <p:cNvPicPr>
+            <a:picLocks noChangeAspect="1"/>
+          </p:cNvPicPr>
+          <p:nvPr/>
+        </p:nvPicPr>
+        <p:blipFill>
+          <a:blip r:embed="rId2"/>
+          <a:stretch>
+            <a:fillRect/>
+          </a:stretch>
+        </p:blipFill>
+        <p:spPr>
+          <a:xfrm>
+            <a:off x="3242864" y="1459868"/>
+            <a:ext cx="5706271" cy="5182323"/>
+          </a:xfrm>
+          <a:prstGeom prst="rect">
+            <a:avLst/>
+          </a:prstGeom>
+        </p:spPr>
+      </p:pic>
+    </p:spTree>
+    <p:extLst>
+      <p:ext uri="{BB962C8B-B14F-4D97-AF65-F5344CB8AC3E}">
+        <p14:creationId xmlns:p14="http://schemas.microsoft.com/office/powerpoint/2010/main" val="1368232786"/>
       </p:ext>
     </p:extLst>
   </p:cSld>
@@ -6872,6 +7366,817 @@
     <p:extLst>
       <p:ext uri="{BB962C8B-B14F-4D97-AF65-F5344CB8AC3E}">
         <p14:creationId xmlns:p14="http://schemas.microsoft.com/office/powerpoint/2010/main" val="229029854"/>
+      </p:ext>
+    </p:extLst>
+  </p:cSld>
+  <p:clrMapOvr>
+    <a:masterClrMapping/>
+  </p:clrMapOvr>
+</p:sld>
+</file>
+
+<file path=ppt/slides/slide30.xml><?xml version="1.0" encoding="utf-8"?>
+<p:sld xmlns:a="http://schemas.openxmlformats.org/drawingml/2006/main" xmlns:r="http://schemas.openxmlformats.org/officeDocument/2006/relationships" xmlns:p="http://schemas.openxmlformats.org/presentationml/2006/main">
+  <p:cSld>
+    <p:spTree>
+      <p:nvGrpSpPr>
+        <p:cNvPr id="1" name=""/>
+        <p:cNvGrpSpPr/>
+        <p:nvPr/>
+      </p:nvGrpSpPr>
+      <p:grpSpPr>
+        <a:xfrm>
+          <a:off x="0" y="0"/>
+          <a:ext cx="0" cy="0"/>
+          <a:chOff x="0" y="0"/>
+          <a:chExt cx="0" cy="0"/>
+        </a:xfrm>
+      </p:grpSpPr>
+      <p:sp>
+        <p:nvSpPr>
+          <p:cNvPr id="2" name="Title 1">
+            <a:extLst>
+              <a:ext uri="{FF2B5EF4-FFF2-40B4-BE49-F238E27FC236}">
+                <a16:creationId xmlns:a16="http://schemas.microsoft.com/office/drawing/2014/main" id="{518B974D-03EB-465F-AF81-14C9D353C04F}"/>
+              </a:ext>
+            </a:extLst>
+          </p:cNvPr>
+          <p:cNvSpPr>
+            <a:spLocks noGrp="1"/>
+          </p:cNvSpPr>
+          <p:nvPr>
+            <p:ph type="title"/>
+          </p:nvPr>
+        </p:nvSpPr>
+        <p:spPr/>
+        <p:txBody>
+          <a:bodyPr/>
+          <a:lstStyle/>
+          <a:p>
+            <a:r>
+              <a:rPr lang="en-US" dirty="0" err="1"/>
+              <a:t>UserInputTests.cs</a:t>
+            </a:r>
+            <a:endParaRPr lang="en-US" dirty="0"/>
+          </a:p>
+        </p:txBody>
+      </p:sp>
+      <p:sp>
+        <p:nvSpPr>
+          <p:cNvPr id="3" name="Content Placeholder 2">
+            <a:extLst>
+              <a:ext uri="{FF2B5EF4-FFF2-40B4-BE49-F238E27FC236}">
+                <a16:creationId xmlns:a16="http://schemas.microsoft.com/office/drawing/2014/main" id="{3F868D6C-C7A2-4AB3-AE6E-32FD155C49DE}"/>
+              </a:ext>
+            </a:extLst>
+          </p:cNvPr>
+          <p:cNvSpPr>
+            <a:spLocks noGrp="1"/>
+          </p:cNvSpPr>
+          <p:nvPr>
+            <p:ph idx="1"/>
+          </p:nvPr>
+        </p:nvSpPr>
+        <p:spPr/>
+        <p:txBody>
+          <a:bodyPr/>
+          <a:lstStyle/>
+          <a:p>
+            <a:endParaRPr lang="en-US"/>
+          </a:p>
+        </p:txBody>
+      </p:sp>
+      <p:pic>
+        <p:nvPicPr>
+          <p:cNvPr id="4" name="Picture 3">
+            <a:extLst>
+              <a:ext uri="{FF2B5EF4-FFF2-40B4-BE49-F238E27FC236}">
+                <a16:creationId xmlns:a16="http://schemas.microsoft.com/office/drawing/2014/main" id="{1A4464A6-9353-4F4F-866D-FCD371B76BA1}"/>
+              </a:ext>
+            </a:extLst>
+          </p:cNvPr>
+          <p:cNvPicPr>
+            <a:picLocks noChangeAspect="1"/>
+          </p:cNvPicPr>
+          <p:nvPr/>
+        </p:nvPicPr>
+        <p:blipFill>
+          <a:blip r:embed="rId2"/>
+          <a:stretch>
+            <a:fillRect/>
+          </a:stretch>
+        </p:blipFill>
+        <p:spPr>
+          <a:xfrm>
+            <a:off x="2773599" y="1755184"/>
+            <a:ext cx="7344800" cy="4591691"/>
+          </a:xfrm>
+          <a:prstGeom prst="rect">
+            <a:avLst/>
+          </a:prstGeom>
+        </p:spPr>
+      </p:pic>
+    </p:spTree>
+    <p:extLst>
+      <p:ext uri="{BB962C8B-B14F-4D97-AF65-F5344CB8AC3E}">
+        <p14:creationId xmlns:p14="http://schemas.microsoft.com/office/powerpoint/2010/main" val="4146131762"/>
+      </p:ext>
+    </p:extLst>
+  </p:cSld>
+  <p:clrMapOvr>
+    <a:masterClrMapping/>
+  </p:clrMapOvr>
+</p:sld>
+</file>
+
+<file path=ppt/slides/slide31.xml><?xml version="1.0" encoding="utf-8"?>
+<p:sld xmlns:a="http://schemas.openxmlformats.org/drawingml/2006/main" xmlns:r="http://schemas.openxmlformats.org/officeDocument/2006/relationships" xmlns:p="http://schemas.openxmlformats.org/presentationml/2006/main">
+  <p:cSld>
+    <p:spTree>
+      <p:nvGrpSpPr>
+        <p:cNvPr id="1" name=""/>
+        <p:cNvGrpSpPr/>
+        <p:nvPr/>
+      </p:nvGrpSpPr>
+      <p:grpSpPr>
+        <a:xfrm>
+          <a:off x="0" y="0"/>
+          <a:ext cx="0" cy="0"/>
+          <a:chOff x="0" y="0"/>
+          <a:chExt cx="0" cy="0"/>
+        </a:xfrm>
+      </p:grpSpPr>
+      <p:sp>
+        <p:nvSpPr>
+          <p:cNvPr id="2" name="Title 1">
+            <a:extLst>
+              <a:ext uri="{FF2B5EF4-FFF2-40B4-BE49-F238E27FC236}">
+                <a16:creationId xmlns:a16="http://schemas.microsoft.com/office/drawing/2014/main" id="{51A481F4-DDC1-4F25-868F-97C9F3C5AC44}"/>
+              </a:ext>
+            </a:extLst>
+          </p:cNvPr>
+          <p:cNvSpPr>
+            <a:spLocks noGrp="1"/>
+          </p:cNvSpPr>
+          <p:nvPr>
+            <p:ph type="title"/>
+          </p:nvPr>
+        </p:nvSpPr>
+        <p:spPr/>
+        <p:txBody>
+          <a:bodyPr/>
+          <a:lstStyle/>
+          <a:p>
+            <a:r>
+              <a:rPr lang="en-US" dirty="0" err="1"/>
+              <a:t>Presenter.cs</a:t>
+            </a:r>
+            <a:endParaRPr lang="en-US" dirty="0"/>
+          </a:p>
+        </p:txBody>
+      </p:sp>
+      <p:sp>
+        <p:nvSpPr>
+          <p:cNvPr id="3" name="Content Placeholder 2">
+            <a:extLst>
+              <a:ext uri="{FF2B5EF4-FFF2-40B4-BE49-F238E27FC236}">
+                <a16:creationId xmlns:a16="http://schemas.microsoft.com/office/drawing/2014/main" id="{C0A52106-6A5C-48A9-A7F8-D752E20FA059}"/>
+              </a:ext>
+            </a:extLst>
+          </p:cNvPr>
+          <p:cNvSpPr>
+            <a:spLocks noGrp="1"/>
+          </p:cNvSpPr>
+          <p:nvPr>
+            <p:ph idx="1"/>
+          </p:nvPr>
+        </p:nvSpPr>
+        <p:spPr/>
+        <p:txBody>
+          <a:bodyPr/>
+          <a:lstStyle/>
+          <a:p>
+            <a:endParaRPr lang="en-US"/>
+          </a:p>
+        </p:txBody>
+      </p:sp>
+      <p:pic>
+        <p:nvPicPr>
+          <p:cNvPr id="4" name="Picture 3">
+            <a:extLst>
+              <a:ext uri="{FF2B5EF4-FFF2-40B4-BE49-F238E27FC236}">
+                <a16:creationId xmlns:a16="http://schemas.microsoft.com/office/drawing/2014/main" id="{3D354040-C537-46F7-8041-E6A1E08A7BA5}"/>
+              </a:ext>
+            </a:extLst>
+          </p:cNvPr>
+          <p:cNvPicPr>
+            <a:picLocks noChangeAspect="1"/>
+          </p:cNvPicPr>
+          <p:nvPr/>
+        </p:nvPicPr>
+        <p:blipFill>
+          <a:blip r:embed="rId2"/>
+          <a:stretch>
+            <a:fillRect/>
+          </a:stretch>
+        </p:blipFill>
+        <p:spPr>
+          <a:xfrm>
+            <a:off x="3342891" y="2334676"/>
+            <a:ext cx="5506218" cy="3715268"/>
+          </a:xfrm>
+          <a:prstGeom prst="rect">
+            <a:avLst/>
+          </a:prstGeom>
+        </p:spPr>
+      </p:pic>
+    </p:spTree>
+    <p:extLst>
+      <p:ext uri="{BB962C8B-B14F-4D97-AF65-F5344CB8AC3E}">
+        <p14:creationId xmlns:p14="http://schemas.microsoft.com/office/powerpoint/2010/main" val="709623956"/>
+      </p:ext>
+    </p:extLst>
+  </p:cSld>
+  <p:clrMapOvr>
+    <a:masterClrMapping/>
+  </p:clrMapOvr>
+</p:sld>
+</file>
+
+<file path=ppt/slides/slide32.xml><?xml version="1.0" encoding="utf-8"?>
+<p:sld xmlns:a="http://schemas.openxmlformats.org/drawingml/2006/main" xmlns:r="http://schemas.openxmlformats.org/officeDocument/2006/relationships" xmlns:p="http://schemas.openxmlformats.org/presentationml/2006/main">
+  <p:cSld>
+    <p:spTree>
+      <p:nvGrpSpPr>
+        <p:cNvPr id="1" name=""/>
+        <p:cNvGrpSpPr/>
+        <p:nvPr/>
+      </p:nvGrpSpPr>
+      <p:grpSpPr>
+        <a:xfrm>
+          <a:off x="0" y="0"/>
+          <a:ext cx="0" cy="0"/>
+          <a:chOff x="0" y="0"/>
+          <a:chExt cx="0" cy="0"/>
+        </a:xfrm>
+      </p:grpSpPr>
+      <p:sp>
+        <p:nvSpPr>
+          <p:cNvPr id="2" name="Title 1">
+            <a:extLst>
+              <a:ext uri="{FF2B5EF4-FFF2-40B4-BE49-F238E27FC236}">
+                <a16:creationId xmlns:a16="http://schemas.microsoft.com/office/drawing/2014/main" id="{51A481F4-DDC1-4F25-868F-97C9F3C5AC44}"/>
+              </a:ext>
+            </a:extLst>
+          </p:cNvPr>
+          <p:cNvSpPr>
+            <a:spLocks noGrp="1"/>
+          </p:cNvSpPr>
+          <p:nvPr>
+            <p:ph type="title"/>
+          </p:nvPr>
+        </p:nvSpPr>
+        <p:spPr/>
+        <p:txBody>
+          <a:bodyPr/>
+          <a:lstStyle/>
+          <a:p>
+            <a:r>
+              <a:rPr lang="en-US" dirty="0" err="1"/>
+              <a:t>Presenter.cs</a:t>
+            </a:r>
+            <a:endParaRPr lang="en-US" dirty="0"/>
+          </a:p>
+        </p:txBody>
+      </p:sp>
+      <p:sp>
+        <p:nvSpPr>
+          <p:cNvPr id="3" name="Content Placeholder 2">
+            <a:extLst>
+              <a:ext uri="{FF2B5EF4-FFF2-40B4-BE49-F238E27FC236}">
+                <a16:creationId xmlns:a16="http://schemas.microsoft.com/office/drawing/2014/main" id="{C0A52106-6A5C-48A9-A7F8-D752E20FA059}"/>
+              </a:ext>
+            </a:extLst>
+          </p:cNvPr>
+          <p:cNvSpPr>
+            <a:spLocks noGrp="1"/>
+          </p:cNvSpPr>
+          <p:nvPr>
+            <p:ph idx="1"/>
+          </p:nvPr>
+        </p:nvSpPr>
+        <p:spPr/>
+        <p:txBody>
+          <a:bodyPr/>
+          <a:lstStyle/>
+          <a:p>
+            <a:endParaRPr lang="en-US"/>
+          </a:p>
+        </p:txBody>
+      </p:sp>
+      <p:pic>
+        <p:nvPicPr>
+          <p:cNvPr id="5" name="Picture 4">
+            <a:extLst>
+              <a:ext uri="{FF2B5EF4-FFF2-40B4-BE49-F238E27FC236}">
+                <a16:creationId xmlns:a16="http://schemas.microsoft.com/office/drawing/2014/main" id="{F32D2BC0-5280-4A5E-8B91-0F2B9B42EAE5}"/>
+              </a:ext>
+            </a:extLst>
+          </p:cNvPr>
+          <p:cNvPicPr>
+            <a:picLocks noChangeAspect="1"/>
+          </p:cNvPicPr>
+          <p:nvPr/>
+        </p:nvPicPr>
+        <p:blipFill>
+          <a:blip r:embed="rId2"/>
+          <a:stretch>
+            <a:fillRect/>
+          </a:stretch>
+        </p:blipFill>
+        <p:spPr>
+          <a:xfrm>
+            <a:off x="3652460" y="2633444"/>
+            <a:ext cx="5401429" cy="3134162"/>
+          </a:xfrm>
+          <a:prstGeom prst="rect">
+            <a:avLst/>
+          </a:prstGeom>
+        </p:spPr>
+      </p:pic>
+    </p:spTree>
+    <p:extLst>
+      <p:ext uri="{BB962C8B-B14F-4D97-AF65-F5344CB8AC3E}">
+        <p14:creationId xmlns:p14="http://schemas.microsoft.com/office/powerpoint/2010/main" val="4090741937"/>
+      </p:ext>
+    </p:extLst>
+  </p:cSld>
+  <p:clrMapOvr>
+    <a:masterClrMapping/>
+  </p:clrMapOvr>
+</p:sld>
+</file>
+
+<file path=ppt/slides/slide33.xml><?xml version="1.0" encoding="utf-8"?>
+<p:sld xmlns:a="http://schemas.openxmlformats.org/drawingml/2006/main" xmlns:r="http://schemas.openxmlformats.org/officeDocument/2006/relationships" xmlns:p="http://schemas.openxmlformats.org/presentationml/2006/main">
+  <p:cSld>
+    <p:spTree>
+      <p:nvGrpSpPr>
+        <p:cNvPr id="1" name=""/>
+        <p:cNvGrpSpPr/>
+        <p:nvPr/>
+      </p:nvGrpSpPr>
+      <p:grpSpPr>
+        <a:xfrm>
+          <a:off x="0" y="0"/>
+          <a:ext cx="0" cy="0"/>
+          <a:chOff x="0" y="0"/>
+          <a:chExt cx="0" cy="0"/>
+        </a:xfrm>
+      </p:grpSpPr>
+      <p:sp>
+        <p:nvSpPr>
+          <p:cNvPr id="2" name="Title 1">
+            <a:extLst>
+              <a:ext uri="{FF2B5EF4-FFF2-40B4-BE49-F238E27FC236}">
+                <a16:creationId xmlns:a16="http://schemas.microsoft.com/office/drawing/2014/main" id="{02750C56-7F61-4778-998C-66806C5692CF}"/>
+              </a:ext>
+            </a:extLst>
+          </p:cNvPr>
+          <p:cNvSpPr>
+            <a:spLocks noGrp="1"/>
+          </p:cNvSpPr>
+          <p:nvPr>
+            <p:ph type="title"/>
+          </p:nvPr>
+        </p:nvSpPr>
+        <p:spPr/>
+        <p:txBody>
+          <a:bodyPr/>
+          <a:lstStyle/>
+          <a:p>
+            <a:r>
+              <a:rPr lang="en-US" dirty="0" err="1"/>
+              <a:t>PresenterTests.cs</a:t>
+            </a:r>
+            <a:endParaRPr lang="en-US" dirty="0"/>
+          </a:p>
+        </p:txBody>
+      </p:sp>
+      <p:sp>
+        <p:nvSpPr>
+          <p:cNvPr id="3" name="Content Placeholder 2">
+            <a:extLst>
+              <a:ext uri="{FF2B5EF4-FFF2-40B4-BE49-F238E27FC236}">
+                <a16:creationId xmlns:a16="http://schemas.microsoft.com/office/drawing/2014/main" id="{209DB3F2-5A67-4434-A939-B38810525CFF}"/>
+              </a:ext>
+            </a:extLst>
+          </p:cNvPr>
+          <p:cNvSpPr>
+            <a:spLocks noGrp="1"/>
+          </p:cNvSpPr>
+          <p:nvPr>
+            <p:ph idx="1"/>
+          </p:nvPr>
+        </p:nvSpPr>
+        <p:spPr/>
+        <p:txBody>
+          <a:bodyPr/>
+          <a:lstStyle/>
+          <a:p>
+            <a:r>
+              <a:rPr lang="en-US" dirty="0"/>
+              <a:t>Another Mock!</a:t>
+            </a:r>
+          </a:p>
+          <a:p>
+            <a:endParaRPr lang="en-US" dirty="0"/>
+          </a:p>
+          <a:p>
+            <a:endParaRPr lang="en-US" dirty="0"/>
+          </a:p>
+          <a:p>
+            <a:endParaRPr lang="en-US" dirty="0"/>
+          </a:p>
+          <a:p>
+            <a:endParaRPr lang="en-US" dirty="0"/>
+          </a:p>
+          <a:p>
+            <a:endParaRPr lang="en-US" dirty="0"/>
+          </a:p>
+          <a:p>
+            <a:endParaRPr lang="en-US" dirty="0"/>
+          </a:p>
+        </p:txBody>
+      </p:sp>
+      <p:pic>
+        <p:nvPicPr>
+          <p:cNvPr id="4" name="Picture 3">
+            <a:extLst>
+              <a:ext uri="{FF2B5EF4-FFF2-40B4-BE49-F238E27FC236}">
+                <a16:creationId xmlns:a16="http://schemas.microsoft.com/office/drawing/2014/main" id="{21A19074-A166-4462-9594-8F801C2B6052}"/>
+              </a:ext>
+            </a:extLst>
+          </p:cNvPr>
+          <p:cNvPicPr>
+            <a:picLocks noChangeAspect="1"/>
+          </p:cNvPicPr>
+          <p:nvPr/>
+        </p:nvPicPr>
+        <p:blipFill>
+          <a:blip r:embed="rId2"/>
+          <a:stretch>
+            <a:fillRect/>
+          </a:stretch>
+        </p:blipFill>
+        <p:spPr>
+          <a:xfrm>
+            <a:off x="1737720" y="3262152"/>
+            <a:ext cx="8487960" cy="2295845"/>
+          </a:xfrm>
+          <a:prstGeom prst="rect">
+            <a:avLst/>
+          </a:prstGeom>
+        </p:spPr>
+      </p:pic>
+    </p:spTree>
+    <p:extLst>
+      <p:ext uri="{BB962C8B-B14F-4D97-AF65-F5344CB8AC3E}">
+        <p14:creationId xmlns:p14="http://schemas.microsoft.com/office/powerpoint/2010/main" val="352553129"/>
+      </p:ext>
+    </p:extLst>
+  </p:cSld>
+  <p:clrMapOvr>
+    <a:masterClrMapping/>
+  </p:clrMapOvr>
+</p:sld>
+</file>
+
+<file path=ppt/slides/slide34.xml><?xml version="1.0" encoding="utf-8"?>
+<p:sld xmlns:a="http://schemas.openxmlformats.org/drawingml/2006/main" xmlns:r="http://schemas.openxmlformats.org/officeDocument/2006/relationships" xmlns:p="http://schemas.openxmlformats.org/presentationml/2006/main">
+  <p:cSld>
+    <p:spTree>
+      <p:nvGrpSpPr>
+        <p:cNvPr id="1" name=""/>
+        <p:cNvGrpSpPr/>
+        <p:nvPr/>
+      </p:nvGrpSpPr>
+      <p:grpSpPr>
+        <a:xfrm>
+          <a:off x="0" y="0"/>
+          <a:ext cx="0" cy="0"/>
+          <a:chOff x="0" y="0"/>
+          <a:chExt cx="0" cy="0"/>
+        </a:xfrm>
+      </p:grpSpPr>
+      <p:sp>
+        <p:nvSpPr>
+          <p:cNvPr id="2" name="Title 1">
+            <a:extLst>
+              <a:ext uri="{FF2B5EF4-FFF2-40B4-BE49-F238E27FC236}">
+                <a16:creationId xmlns:a16="http://schemas.microsoft.com/office/drawing/2014/main" id="{02750C56-7F61-4778-998C-66806C5692CF}"/>
+              </a:ext>
+            </a:extLst>
+          </p:cNvPr>
+          <p:cNvSpPr>
+            <a:spLocks noGrp="1"/>
+          </p:cNvSpPr>
+          <p:nvPr>
+            <p:ph type="title"/>
+          </p:nvPr>
+        </p:nvSpPr>
+        <p:spPr/>
+        <p:txBody>
+          <a:bodyPr/>
+          <a:lstStyle/>
+          <a:p>
+            <a:r>
+              <a:rPr lang="en-US" dirty="0" err="1"/>
+              <a:t>PresenterTests.cs</a:t>
+            </a:r>
+            <a:endParaRPr lang="en-US" dirty="0"/>
+          </a:p>
+        </p:txBody>
+      </p:sp>
+      <p:sp>
+        <p:nvSpPr>
+          <p:cNvPr id="3" name="Content Placeholder 2">
+            <a:extLst>
+              <a:ext uri="{FF2B5EF4-FFF2-40B4-BE49-F238E27FC236}">
+                <a16:creationId xmlns:a16="http://schemas.microsoft.com/office/drawing/2014/main" id="{209DB3F2-5A67-4434-A939-B38810525CFF}"/>
+              </a:ext>
+            </a:extLst>
+          </p:cNvPr>
+          <p:cNvSpPr>
+            <a:spLocks noGrp="1"/>
+          </p:cNvSpPr>
+          <p:nvPr>
+            <p:ph idx="1"/>
+          </p:nvPr>
+        </p:nvSpPr>
+        <p:spPr/>
+        <p:txBody>
+          <a:bodyPr/>
+          <a:lstStyle/>
+          <a:p>
+            <a:endParaRPr lang="en-US" dirty="0"/>
+          </a:p>
+          <a:p>
+            <a:endParaRPr lang="en-US" dirty="0"/>
+          </a:p>
+          <a:p>
+            <a:endParaRPr lang="en-US" dirty="0"/>
+          </a:p>
+          <a:p>
+            <a:endParaRPr lang="en-US" dirty="0"/>
+          </a:p>
+          <a:p>
+            <a:endParaRPr lang="en-US" dirty="0"/>
+          </a:p>
+          <a:p>
+            <a:endParaRPr lang="en-US" dirty="0"/>
+          </a:p>
+          <a:p>
+            <a:endParaRPr lang="en-US" dirty="0"/>
+          </a:p>
+        </p:txBody>
+      </p:sp>
+      <p:pic>
+        <p:nvPicPr>
+          <p:cNvPr id="6" name="Picture 5">
+            <a:extLst>
+              <a:ext uri="{FF2B5EF4-FFF2-40B4-BE49-F238E27FC236}">
+                <a16:creationId xmlns:a16="http://schemas.microsoft.com/office/drawing/2014/main" id="{22D79485-B36E-4071-AA3A-71A0A7FBCD3F}"/>
+              </a:ext>
+            </a:extLst>
+          </p:cNvPr>
+          <p:cNvPicPr>
+            <a:picLocks noChangeAspect="1"/>
+          </p:cNvPicPr>
+          <p:nvPr/>
+        </p:nvPicPr>
+        <p:blipFill>
+          <a:blip r:embed="rId2"/>
+          <a:stretch>
+            <a:fillRect/>
+          </a:stretch>
+        </p:blipFill>
+        <p:spPr>
+          <a:xfrm>
+            <a:off x="2009204" y="1885285"/>
+            <a:ext cx="8173591" cy="4382112"/>
+          </a:xfrm>
+          <a:prstGeom prst="rect">
+            <a:avLst/>
+          </a:prstGeom>
+        </p:spPr>
+      </p:pic>
+    </p:spTree>
+    <p:extLst>
+      <p:ext uri="{BB962C8B-B14F-4D97-AF65-F5344CB8AC3E}">
+        <p14:creationId xmlns:p14="http://schemas.microsoft.com/office/powerpoint/2010/main" val="3960643044"/>
+      </p:ext>
+    </p:extLst>
+  </p:cSld>
+  <p:clrMapOvr>
+    <a:masterClrMapping/>
+  </p:clrMapOvr>
+</p:sld>
+</file>
+
+<file path=ppt/slides/slide35.xml><?xml version="1.0" encoding="utf-8"?>
+<p:sld xmlns:a="http://schemas.openxmlformats.org/drawingml/2006/main" xmlns:r="http://schemas.openxmlformats.org/officeDocument/2006/relationships" xmlns:p="http://schemas.openxmlformats.org/presentationml/2006/main">
+  <p:cSld>
+    <p:spTree>
+      <p:nvGrpSpPr>
+        <p:cNvPr id="1" name=""/>
+        <p:cNvGrpSpPr/>
+        <p:nvPr/>
+      </p:nvGrpSpPr>
+      <p:grpSpPr>
+        <a:xfrm>
+          <a:off x="0" y="0"/>
+          <a:ext cx="0" cy="0"/>
+          <a:chOff x="0" y="0"/>
+          <a:chExt cx="0" cy="0"/>
+        </a:xfrm>
+      </p:grpSpPr>
+      <p:sp>
+        <p:nvSpPr>
+          <p:cNvPr id="2" name="Title 1">
+            <a:extLst>
+              <a:ext uri="{FF2B5EF4-FFF2-40B4-BE49-F238E27FC236}">
+                <a16:creationId xmlns:a16="http://schemas.microsoft.com/office/drawing/2014/main" id="{9CE869D5-B174-43EA-BEA2-710CAA298370}"/>
+              </a:ext>
+            </a:extLst>
+          </p:cNvPr>
+          <p:cNvSpPr>
+            <a:spLocks noGrp="1"/>
+          </p:cNvSpPr>
+          <p:nvPr>
+            <p:ph type="title"/>
+          </p:nvPr>
+        </p:nvSpPr>
+        <p:spPr/>
+        <p:txBody>
+          <a:bodyPr/>
+          <a:lstStyle/>
+          <a:p>
+            <a:r>
+              <a:rPr lang="en-US" dirty="0"/>
+              <a:t>Order of development</a:t>
+            </a:r>
+          </a:p>
+        </p:txBody>
+      </p:sp>
+      <p:sp>
+        <p:nvSpPr>
+          <p:cNvPr id="3" name="Content Placeholder 2">
+            <a:extLst>
+              <a:ext uri="{FF2B5EF4-FFF2-40B4-BE49-F238E27FC236}">
+                <a16:creationId xmlns:a16="http://schemas.microsoft.com/office/drawing/2014/main" id="{E4BC8F45-D021-4707-B952-B0ED1B9774C6}"/>
+              </a:ext>
+            </a:extLst>
+          </p:cNvPr>
+          <p:cNvSpPr>
+            <a:spLocks noGrp="1"/>
+          </p:cNvSpPr>
+          <p:nvPr>
+            <p:ph idx="1"/>
+          </p:nvPr>
+        </p:nvSpPr>
+        <p:spPr/>
+        <p:txBody>
+          <a:bodyPr/>
+          <a:lstStyle/>
+          <a:p>
+            <a:r>
+              <a:rPr lang="en-US" dirty="0"/>
+              <a:t>0. Think of the units you will build. </a:t>
+            </a:r>
+          </a:p>
+          <a:p>
+            <a:r>
+              <a:rPr lang="en-US" dirty="0"/>
+              <a:t>1. Unit units first. Isolated == Easy, Fast</a:t>
+            </a:r>
+          </a:p>
+          <a:p>
+            <a:r>
+              <a:rPr lang="en-US" dirty="0"/>
+              <a:t>2. Integration units next. Usually will move data from the Units.</a:t>
+            </a:r>
+          </a:p>
+          <a:p>
+            <a:r>
+              <a:rPr lang="en-US" dirty="0"/>
+              <a:t>3. Collaboration units last. Will accept the Unit and Integration units are Collaborators. Code is usually obvious when collaborators are complete.</a:t>
+            </a:r>
+          </a:p>
+          <a:p>
+            <a:r>
+              <a:rPr lang="en-US" dirty="0"/>
+              <a:t>4. Find where you broken the rule!</a:t>
+            </a:r>
+          </a:p>
+        </p:txBody>
+      </p:sp>
+    </p:spTree>
+    <p:extLst>
+      <p:ext uri="{BB962C8B-B14F-4D97-AF65-F5344CB8AC3E}">
+        <p14:creationId xmlns:p14="http://schemas.microsoft.com/office/powerpoint/2010/main" val="2535729040"/>
+      </p:ext>
+    </p:extLst>
+  </p:cSld>
+  <p:clrMapOvr>
+    <a:masterClrMapping/>
+  </p:clrMapOvr>
+</p:sld>
+</file>
+
+<file path=ppt/slides/slide36.xml><?xml version="1.0" encoding="utf-8"?>
+<p:sld xmlns:a="http://schemas.openxmlformats.org/drawingml/2006/main" xmlns:r="http://schemas.openxmlformats.org/officeDocument/2006/relationships" xmlns:p="http://schemas.openxmlformats.org/presentationml/2006/main">
+  <p:cSld>
+    <p:spTree>
+      <p:nvGrpSpPr>
+        <p:cNvPr id="1" name=""/>
+        <p:cNvGrpSpPr/>
+        <p:nvPr/>
+      </p:nvGrpSpPr>
+      <p:grpSpPr>
+        <a:xfrm>
+          <a:off x="0" y="0"/>
+          <a:ext cx="0" cy="0"/>
+          <a:chOff x="0" y="0"/>
+          <a:chExt cx="0" cy="0"/>
+        </a:xfrm>
+      </p:grpSpPr>
+      <p:sp>
+        <p:nvSpPr>
+          <p:cNvPr id="2" name="Title 1">
+            <a:extLst>
+              <a:ext uri="{FF2B5EF4-FFF2-40B4-BE49-F238E27FC236}">
+                <a16:creationId xmlns:a16="http://schemas.microsoft.com/office/drawing/2014/main" id="{5DD8BA46-DB8E-4F19-BF68-5617238AB18F}"/>
+              </a:ext>
+            </a:extLst>
+          </p:cNvPr>
+          <p:cNvSpPr>
+            <a:spLocks noGrp="1"/>
+          </p:cNvSpPr>
+          <p:nvPr>
+            <p:ph type="title"/>
+          </p:nvPr>
+        </p:nvSpPr>
+        <p:spPr/>
+        <p:txBody>
+          <a:bodyPr/>
+          <a:lstStyle/>
+          <a:p>
+            <a:r>
+              <a:rPr lang="en-US" dirty="0"/>
+              <a:t>Reference</a:t>
+            </a:r>
+          </a:p>
+        </p:txBody>
+      </p:sp>
+      <p:sp>
+        <p:nvSpPr>
+          <p:cNvPr id="3" name="Content Placeholder 2">
+            <a:extLst>
+              <a:ext uri="{FF2B5EF4-FFF2-40B4-BE49-F238E27FC236}">
+                <a16:creationId xmlns:a16="http://schemas.microsoft.com/office/drawing/2014/main" id="{E7582A84-F78B-44B5-88FC-91910C2DF35B}"/>
+              </a:ext>
+            </a:extLst>
+          </p:cNvPr>
+          <p:cNvSpPr>
+            <a:spLocks noGrp="1"/>
+          </p:cNvSpPr>
+          <p:nvPr>
+            <p:ph idx="1"/>
+          </p:nvPr>
+        </p:nvSpPr>
+        <p:spPr/>
+        <p:txBody>
+          <a:bodyPr/>
+          <a:lstStyle/>
+          <a:p>
+            <a:r>
+              <a:rPr lang="en-US" dirty="0">
+                <a:hlinkClick r:id="rId2"/>
+              </a:rPr>
+              <a:t>https://github.com/mvphelps</a:t>
+            </a:r>
+            <a:endParaRPr lang="en-US" dirty="0"/>
+          </a:p>
+          <a:p>
+            <a:endParaRPr lang="en-US" dirty="0"/>
+          </a:p>
+        </p:txBody>
+      </p:sp>
+    </p:spTree>
+    <p:extLst>
+      <p:ext uri="{BB962C8B-B14F-4D97-AF65-F5344CB8AC3E}">
+        <p14:creationId xmlns:p14="http://schemas.microsoft.com/office/powerpoint/2010/main" val="3254126608"/>
       </p:ext>
     </p:extLst>
   </p:cSld>
@@ -7001,6 +8306,98 @@
           <p:cNvPr id="2" name="Title 1">
             <a:extLst>
               <a:ext uri="{FF2B5EF4-FFF2-40B4-BE49-F238E27FC236}">
+                <a16:creationId xmlns:a16="http://schemas.microsoft.com/office/drawing/2014/main" id="{674287CE-7D3A-4D27-A004-BE5039EEAC61}"/>
+              </a:ext>
+            </a:extLst>
+          </p:cNvPr>
+          <p:cNvSpPr>
+            <a:spLocks noGrp="1"/>
+          </p:cNvSpPr>
+          <p:nvPr>
+            <p:ph type="title"/>
+          </p:nvPr>
+        </p:nvSpPr>
+        <p:spPr/>
+        <p:txBody>
+          <a:bodyPr/>
+          <a:lstStyle/>
+          <a:p>
+            <a:r>
+              <a:rPr lang="en-US" dirty="0"/>
+              <a:t>Unit Tests</a:t>
+            </a:r>
+          </a:p>
+        </p:txBody>
+      </p:sp>
+      <p:sp>
+        <p:nvSpPr>
+          <p:cNvPr id="3" name="Content Placeholder 2">
+            <a:extLst>
+              <a:ext uri="{FF2B5EF4-FFF2-40B4-BE49-F238E27FC236}">
+                <a16:creationId xmlns:a16="http://schemas.microsoft.com/office/drawing/2014/main" id="{3953BBA2-881B-4EDB-90F5-770B5445FB9E}"/>
+              </a:ext>
+            </a:extLst>
+          </p:cNvPr>
+          <p:cNvSpPr>
+            <a:spLocks noGrp="1"/>
+          </p:cNvSpPr>
+          <p:nvPr>
+            <p:ph idx="1"/>
+          </p:nvPr>
+        </p:nvSpPr>
+        <p:spPr/>
+        <p:txBody>
+          <a:bodyPr/>
+          <a:lstStyle/>
+          <a:p>
+            <a:r>
+              <a:rPr lang="en-US" dirty="0"/>
+              <a:t>What is a unit test?</a:t>
+            </a:r>
+          </a:p>
+          <a:p>
+            <a:r>
+              <a:rPr lang="en-US" dirty="0"/>
+              <a:t>What characteristics are true about a unit tested this way?</a:t>
+            </a:r>
+          </a:p>
+        </p:txBody>
+      </p:sp>
+    </p:spTree>
+    <p:extLst>
+      <p:ext uri="{BB962C8B-B14F-4D97-AF65-F5344CB8AC3E}">
+        <p14:creationId xmlns:p14="http://schemas.microsoft.com/office/powerpoint/2010/main" val="2631178314"/>
+      </p:ext>
+    </p:extLst>
+  </p:cSld>
+  <p:clrMapOvr>
+    <a:masterClrMapping/>
+  </p:clrMapOvr>
+</p:sld>
+</file>
+
+<file path=ppt/slides/slide6.xml><?xml version="1.0" encoding="utf-8"?>
+<p:sld xmlns:a="http://schemas.openxmlformats.org/drawingml/2006/main" xmlns:r="http://schemas.openxmlformats.org/officeDocument/2006/relationships" xmlns:p="http://schemas.openxmlformats.org/presentationml/2006/main">
+  <p:cSld>
+    <p:spTree>
+      <p:nvGrpSpPr>
+        <p:cNvPr id="1" name=""/>
+        <p:cNvGrpSpPr/>
+        <p:nvPr/>
+      </p:nvGrpSpPr>
+      <p:grpSpPr>
+        <a:xfrm>
+          <a:off x="0" y="0"/>
+          <a:ext cx="0" cy="0"/>
+          <a:chOff x="0" y="0"/>
+          <a:chExt cx="0" cy="0"/>
+        </a:xfrm>
+      </p:grpSpPr>
+      <p:sp>
+        <p:nvSpPr>
+          <p:cNvPr id="2" name="Title 1">
+            <a:extLst>
+              <a:ext uri="{FF2B5EF4-FFF2-40B4-BE49-F238E27FC236}">
                 <a16:creationId xmlns:a16="http://schemas.microsoft.com/office/drawing/2014/main" id="{13050053-F526-48B8-BA1A-1A23280F8C81}"/>
               </a:ext>
             </a:extLst>
@@ -7089,7 +8486,7 @@
 </p:sld>
 </file>
 
-<file path=ppt/slides/slide6.xml><?xml version="1.0" encoding="utf-8"?>
+<file path=ppt/slides/slide7.xml><?xml version="1.0" encoding="utf-8"?>
 <p:sld xmlns:a="http://schemas.openxmlformats.org/drawingml/2006/main" xmlns:r="http://schemas.openxmlformats.org/officeDocument/2006/relationships" xmlns:p="http://schemas.openxmlformats.org/presentationml/2006/main">
   <p:cSld>
     <p:spTree>
@@ -7221,7 +8618,7 @@
 </p:sld>
 </file>
 
-<file path=ppt/slides/slide7.xml><?xml version="1.0" encoding="utf-8"?>
+<file path=ppt/slides/slide8.xml><?xml version="1.0" encoding="utf-8"?>
 <p:sld xmlns:a="http://schemas.openxmlformats.org/drawingml/2006/main" xmlns:r="http://schemas.openxmlformats.org/officeDocument/2006/relationships" xmlns:p="http://schemas.openxmlformats.org/presentationml/2006/main">
   <p:cSld>
     <p:spTree>
@@ -7310,133 +8707,6 @@
 </p:sld>
 </file>
 
-<file path=ppt/slides/slide8.xml><?xml version="1.0" encoding="utf-8"?>
-<p:sld xmlns:a="http://schemas.openxmlformats.org/drawingml/2006/main" xmlns:r="http://schemas.openxmlformats.org/officeDocument/2006/relationships" xmlns:p="http://schemas.openxmlformats.org/presentationml/2006/main">
-  <p:cSld>
-    <p:spTree>
-      <p:nvGrpSpPr>
-        <p:cNvPr id="1" name=""/>
-        <p:cNvGrpSpPr/>
-        <p:nvPr/>
-      </p:nvGrpSpPr>
-      <p:grpSpPr>
-        <a:xfrm>
-          <a:off x="0" y="0"/>
-          <a:ext cx="0" cy="0"/>
-          <a:chOff x="0" y="0"/>
-          <a:chExt cx="0" cy="0"/>
-        </a:xfrm>
-      </p:grpSpPr>
-      <p:sp>
-        <p:nvSpPr>
-          <p:cNvPr id="2" name="Title 1">
-            <a:extLst>
-              <a:ext uri="{FF2B5EF4-FFF2-40B4-BE49-F238E27FC236}">
-                <a16:creationId xmlns:a16="http://schemas.microsoft.com/office/drawing/2014/main" id="{5A01A66A-3BE5-4484-A8FE-3D5D1F1E2D61}"/>
-              </a:ext>
-            </a:extLst>
-          </p:cNvPr>
-          <p:cNvSpPr>
-            <a:spLocks noGrp="1"/>
-          </p:cNvSpPr>
-          <p:nvPr>
-            <p:ph type="title"/>
-          </p:nvPr>
-        </p:nvSpPr>
-        <p:spPr/>
-        <p:txBody>
-          <a:bodyPr/>
-          <a:lstStyle/>
-          <a:p>
-            <a:r>
-              <a:rPr lang="en-US" dirty="0"/>
-              <a:t>Integration Tests</a:t>
-            </a:r>
-          </a:p>
-        </p:txBody>
-      </p:sp>
-      <p:sp>
-        <p:nvSpPr>
-          <p:cNvPr id="3" name="Content Placeholder 2">
-            <a:extLst>
-              <a:ext uri="{FF2B5EF4-FFF2-40B4-BE49-F238E27FC236}">
-                <a16:creationId xmlns:a16="http://schemas.microsoft.com/office/drawing/2014/main" id="{0827A9C9-7D8D-4502-BB63-610CC86C9825}"/>
-              </a:ext>
-            </a:extLst>
-          </p:cNvPr>
-          <p:cNvSpPr>
-            <a:spLocks noGrp="1"/>
-          </p:cNvSpPr>
-          <p:nvPr>
-            <p:ph idx="1"/>
-          </p:nvPr>
-        </p:nvSpPr>
-        <p:spPr/>
-        <p:txBody>
-          <a:bodyPr>
-            <a:normAutofit/>
-          </a:bodyPr>
-          <a:lstStyle/>
-          <a:p>
-            <a:r>
-              <a:rPr lang="en-US" dirty="0"/>
-              <a:t>Use with a unit with a highly complex or opaque dependency</a:t>
-            </a:r>
-          </a:p>
-          <a:p>
-            <a:pPr lvl="1"/>
-            <a:r>
-              <a:rPr lang="en-US" dirty="0"/>
-              <a:t>Database Wrappers (often use inheritance)</a:t>
-            </a:r>
-          </a:p>
-          <a:p>
-            <a:pPr lvl="1"/>
-            <a:r>
-              <a:rPr lang="en-US" dirty="0"/>
-              <a:t>Frameworks</a:t>
-            </a:r>
-          </a:p>
-          <a:p>
-            <a:pPr lvl="1"/>
-            <a:r>
-              <a:rPr lang="en-US" dirty="0"/>
-              <a:t>Http call wrappers</a:t>
-            </a:r>
-          </a:p>
-          <a:p>
-            <a:r>
-              <a:rPr lang="en-US" dirty="0"/>
-              <a:t>Executes the real dependency</a:t>
-            </a:r>
-          </a:p>
-          <a:p>
-            <a:r>
-              <a:rPr lang="en-US" dirty="0"/>
-              <a:t>Faster/Easier than mocking or stubbing (if even possible)</a:t>
-            </a:r>
-          </a:p>
-          <a:p>
-            <a:r>
-              <a:rPr lang="en-US" dirty="0"/>
-              <a:t>Often much less code than layering/abstracting</a:t>
-            </a:r>
-          </a:p>
-        </p:txBody>
-      </p:sp>
-    </p:spTree>
-    <p:extLst>
-      <p:ext uri="{BB962C8B-B14F-4D97-AF65-F5344CB8AC3E}">
-        <p14:creationId xmlns:p14="http://schemas.microsoft.com/office/powerpoint/2010/main" val="1609345674"/>
-      </p:ext>
-    </p:extLst>
-  </p:cSld>
-  <p:clrMapOvr>
-    <a:masterClrMapping/>
-  </p:clrMapOvr>
-</p:sld>
-</file>
-
 <file path=ppt/slides/slide9.xml><?xml version="1.0" encoding="utf-8"?>
 <p:sld xmlns:a="http://schemas.openxmlformats.org/drawingml/2006/main" xmlns:r="http://schemas.openxmlformats.org/officeDocument/2006/relationships" xmlns:p="http://schemas.openxmlformats.org/presentationml/2006/main">
   <p:cSld>
@@ -7459,7 +8729,7 @@
           <p:cNvPr id="2" name="Title 1">
             <a:extLst>
               <a:ext uri="{FF2B5EF4-FFF2-40B4-BE49-F238E27FC236}">
-                <a16:creationId xmlns:a16="http://schemas.microsoft.com/office/drawing/2014/main" id="{436AD186-8536-4BE7-80C9-3A727B181584}"/>
+                <a16:creationId xmlns:a16="http://schemas.microsoft.com/office/drawing/2014/main" id="{674287CE-7D3A-4D27-A004-BE5039EEAC61}"/>
               </a:ext>
             </a:extLst>
           </p:cNvPr>
@@ -7470,21 +8740,15 @@
             <p:ph type="title"/>
           </p:nvPr>
         </p:nvSpPr>
-        <p:spPr>
-          <a:xfrm>
-            <a:off x="2611808" y="808056"/>
-            <a:ext cx="7958331" cy="1077229"/>
-          </a:xfrm>
-        </p:spPr>
-        <p:txBody>
-          <a:bodyPr/>
-          <a:lstStyle/>
-          <a:p>
-            <a:r>
-              <a:rPr lang="en-US" dirty="0" err="1"/>
-              <a:t>UsageLogger.cs</a:t>
-            </a:r>
-            <a:endParaRPr lang="en-US" dirty="0"/>
+        <p:spPr/>
+        <p:txBody>
+          <a:bodyPr/>
+          <a:lstStyle/>
+          <a:p>
+            <a:r>
+              <a:rPr lang="en-US" dirty="0"/>
+              <a:t>Integration Tests</a:t>
+            </a:r>
           </a:p>
         </p:txBody>
       </p:sp>
@@ -7493,7 +8757,7 @@
           <p:cNvPr id="3" name="Content Placeholder 2">
             <a:extLst>
               <a:ext uri="{FF2B5EF4-FFF2-40B4-BE49-F238E27FC236}">
-                <a16:creationId xmlns:a16="http://schemas.microsoft.com/office/drawing/2014/main" id="{4B250338-424E-4311-BE00-4794F19C4D8A}"/>
+                <a16:creationId xmlns:a16="http://schemas.microsoft.com/office/drawing/2014/main" id="{3953BBA2-881B-4EDB-90F5-770B5445FB9E}"/>
               </a:ext>
             </a:extLst>
           </p:cNvPr>
@@ -7504,66 +8768,28 @@
             <p:ph idx="1"/>
           </p:nvPr>
         </p:nvSpPr>
-        <p:spPr>
-          <a:xfrm>
-            <a:off x="2692703" y="808056"/>
-            <a:ext cx="7796540" cy="3997828"/>
-          </a:xfrm>
-        </p:spPr>
-        <p:txBody>
-          <a:bodyPr/>
-          <a:lstStyle/>
-          <a:p>
-            <a:r>
-              <a:rPr lang="en-US" dirty="0"/>
-              <a:t>Using the file system, which is an opaque dependency</a:t>
-            </a:r>
-          </a:p>
-          <a:p>
-            <a:endParaRPr lang="en-US" dirty="0"/>
-          </a:p>
-          <a:p>
-            <a:endParaRPr lang="en-US" dirty="0"/>
-          </a:p>
-          <a:p>
-            <a:endParaRPr lang="en-US" dirty="0"/>
-          </a:p>
-        </p:txBody>
-      </p:sp>
-      <p:pic>
-        <p:nvPicPr>
-          <p:cNvPr id="4" name="Picture 3">
-            <a:extLst>
-              <a:ext uri="{FF2B5EF4-FFF2-40B4-BE49-F238E27FC236}">
-                <a16:creationId xmlns:a16="http://schemas.microsoft.com/office/drawing/2014/main" id="{15275675-37AE-4A73-8E0E-6311046A4281}"/>
-              </a:ext>
-            </a:extLst>
-          </p:cNvPr>
-          <p:cNvPicPr>
-            <a:picLocks noChangeAspect="1"/>
-          </p:cNvPicPr>
-          <p:nvPr/>
-        </p:nvPicPr>
-        <p:blipFill>
-          <a:blip r:embed="rId2"/>
-          <a:stretch>
-            <a:fillRect/>
-          </a:stretch>
-        </p:blipFill>
-        <p:spPr>
-          <a:xfrm>
-            <a:off x="1702757" y="2457172"/>
-            <a:ext cx="9050013" cy="3982006"/>
-          </a:xfrm>
-          <a:prstGeom prst="rect">
-            <a:avLst/>
-          </a:prstGeom>
-        </p:spPr>
-      </p:pic>
+        <p:spPr/>
+        <p:txBody>
+          <a:bodyPr/>
+          <a:lstStyle/>
+          <a:p>
+            <a:r>
+              <a:rPr lang="en-US" dirty="0"/>
+              <a:t>What is an Integration test?</a:t>
+            </a:r>
+          </a:p>
+          <a:p>
+            <a:r>
+              <a:rPr lang="en-US" dirty="0"/>
+              <a:t>What characteristics are true about a unit tested this way?</a:t>
+            </a:r>
+          </a:p>
+        </p:txBody>
+      </p:sp>
     </p:spTree>
     <p:extLst>
       <p:ext uri="{BB962C8B-B14F-4D97-AF65-F5344CB8AC3E}">
-        <p14:creationId xmlns:p14="http://schemas.microsoft.com/office/powerpoint/2010/main" val="3846147522"/>
+        <p14:creationId xmlns:p14="http://schemas.microsoft.com/office/powerpoint/2010/main" val="1229073609"/>
       </p:ext>
     </p:extLst>
   </p:cSld>

</xml_diff>

<commit_message>
Update presentation to show KB book
</commit_message>
<xml_diff>
--- a/SingleTestabilityPrinciple.pptx
+++ b/SingleTestabilityPrinciple.pptx
@@ -6,42 +6,45 @@
   </p:sldMasterIdLst>
   <p:sldIdLst>
     <p:sldId id="256" r:id="rId2"/>
-    <p:sldId id="257" r:id="rId3"/>
-    <p:sldId id="258" r:id="rId4"/>
-    <p:sldId id="261" r:id="rId5"/>
-    <p:sldId id="283" r:id="rId6"/>
-    <p:sldId id="259" r:id="rId7"/>
-    <p:sldId id="264" r:id="rId8"/>
-    <p:sldId id="260" r:id="rId9"/>
-    <p:sldId id="284" r:id="rId10"/>
-    <p:sldId id="265" r:id="rId11"/>
-    <p:sldId id="267" r:id="rId12"/>
-    <p:sldId id="268" r:id="rId13"/>
-    <p:sldId id="269" r:id="rId14"/>
-    <p:sldId id="266" r:id="rId15"/>
-    <p:sldId id="285" r:id="rId16"/>
-    <p:sldId id="270" r:id="rId17"/>
-    <p:sldId id="271" r:id="rId18"/>
-    <p:sldId id="272" r:id="rId19"/>
-    <p:sldId id="273" r:id="rId20"/>
-    <p:sldId id="274" r:id="rId21"/>
-    <p:sldId id="275" r:id="rId22"/>
-    <p:sldId id="276" r:id="rId23"/>
-    <p:sldId id="277" r:id="rId24"/>
-    <p:sldId id="278" r:id="rId25"/>
-    <p:sldId id="279" r:id="rId26"/>
-    <p:sldId id="280" r:id="rId27"/>
-    <p:sldId id="286" r:id="rId28"/>
-    <p:sldId id="287" r:id="rId29"/>
-    <p:sldId id="294" r:id="rId30"/>
-    <p:sldId id="288" r:id="rId31"/>
+    <p:sldId id="295" r:id="rId3"/>
+    <p:sldId id="296" r:id="rId4"/>
+    <p:sldId id="258" r:id="rId5"/>
+    <p:sldId id="261" r:id="rId6"/>
+    <p:sldId id="283" r:id="rId7"/>
+    <p:sldId id="259" r:id="rId8"/>
+    <p:sldId id="264" r:id="rId9"/>
+    <p:sldId id="260" r:id="rId10"/>
+    <p:sldId id="284" r:id="rId11"/>
+    <p:sldId id="265" r:id="rId12"/>
+    <p:sldId id="267" r:id="rId13"/>
+    <p:sldId id="268" r:id="rId14"/>
+    <p:sldId id="269" r:id="rId15"/>
+    <p:sldId id="266" r:id="rId16"/>
+    <p:sldId id="285" r:id="rId17"/>
+    <p:sldId id="270" r:id="rId18"/>
+    <p:sldId id="271" r:id="rId19"/>
+    <p:sldId id="272" r:id="rId20"/>
+    <p:sldId id="273" r:id="rId21"/>
+    <p:sldId id="277" r:id="rId22"/>
+    <p:sldId id="278" r:id="rId23"/>
+    <p:sldId id="279" r:id="rId24"/>
+    <p:sldId id="280" r:id="rId25"/>
+    <p:sldId id="274" r:id="rId26"/>
+    <p:sldId id="275" r:id="rId27"/>
+    <p:sldId id="276" r:id="rId28"/>
+    <p:sldId id="286" r:id="rId29"/>
+    <p:sldId id="287" r:id="rId30"/>
+    <p:sldId id="294" r:id="rId31"/>
     <p:sldId id="289" r:id="rId32"/>
-    <p:sldId id="290" r:id="rId33"/>
-    <p:sldId id="291" r:id="rId34"/>
-    <p:sldId id="292" r:id="rId35"/>
-    <p:sldId id="293" r:id="rId36"/>
-    <p:sldId id="281" r:id="rId37"/>
-    <p:sldId id="282" r:id="rId38"/>
+    <p:sldId id="288" r:id="rId33"/>
+    <p:sldId id="290" r:id="rId34"/>
+    <p:sldId id="291" r:id="rId35"/>
+    <p:sldId id="292" r:id="rId36"/>
+    <p:sldId id="293" r:id="rId37"/>
+    <p:sldId id="281" r:id="rId38"/>
+    <p:sldId id="282" r:id="rId39"/>
+    <p:sldId id="297" r:id="rId40"/>
+    <p:sldId id="298" r:id="rId41"/>
   </p:sldIdLst>
   <p:sldSz cx="12192000" cy="6858000"/>
   <p:notesSz cx="6858000" cy="9144000"/>
@@ -365,7 +368,7 @@
           <a:p>
             <a:fld id="{9AB3A824-1A51-4B26-AD58-A6D8E14F6C04}" type="datetimeFigureOut">
               <a:rPr lang="en-US" dirty="0"/>
-              <a:t>9/20/2019</a:t>
+              <a:t>5/10/2020</a:t>
             </a:fld>
             <a:endParaRPr lang="en-US" dirty="0"/>
           </a:p>
@@ -699,7 +702,7 @@
           <a:p>
             <a:fld id="{D857E33E-8B18-4087-B112-809917729534}" type="datetimeFigureOut">
               <a:rPr lang="en-US" dirty="0"/>
-              <a:t>9/20/2019</a:t>
+              <a:t>5/10/2020</a:t>
             </a:fld>
             <a:endParaRPr lang="en-US" dirty="0"/>
           </a:p>
@@ -1001,7 +1004,7 @@
           <a:p>
             <a:fld id="{D3FFE419-2371-464F-8239-3959401C3561}" type="datetimeFigureOut">
               <a:rPr lang="en-US" dirty="0"/>
-              <a:t>9/20/2019</a:t>
+              <a:t>5/10/2020</a:t>
             </a:fld>
             <a:endParaRPr lang="en-US" dirty="0"/>
           </a:p>
@@ -1248,7 +1251,7 @@
           <a:p>
             <a:fld id="{97D162C4-EDD9-4389-A98B-B87ECEA2A816}" type="datetimeFigureOut">
               <a:rPr lang="en-US" dirty="0"/>
-              <a:t>9/20/2019</a:t>
+              <a:t>5/10/2020</a:t>
             </a:fld>
             <a:endParaRPr lang="en-US" dirty="0"/>
           </a:p>
@@ -1655,7 +1658,7 @@
           <a:p>
             <a:fld id="{3E5059C3-6A89-4494-99FF-5A4D6FFD50EB}" type="datetimeFigureOut">
               <a:rPr lang="en-US" dirty="0"/>
-              <a:t>9/20/2019</a:t>
+              <a:t>5/10/2020</a:t>
             </a:fld>
             <a:endParaRPr lang="en-US" dirty="0"/>
           </a:p>
@@ -1969,7 +1972,7 @@
           <a:p>
             <a:fld id="{CA954B2F-12DE-47F5-8894-472B206D2E1E}" type="datetimeFigureOut">
               <a:rPr lang="en-US" dirty="0"/>
-              <a:t>9/20/2019</a:t>
+              <a:t>5/10/2020</a:t>
             </a:fld>
             <a:endParaRPr lang="en-US" dirty="0"/>
           </a:p>
@@ -2513,7 +2516,7 @@
           <a:p>
             <a:fld id="{3F30E46F-7819-4ACF-B48B-48222C2ACC88}" type="datetimeFigureOut">
               <a:rPr lang="en-US" dirty="0"/>
-              <a:t>9/20/2019</a:t>
+              <a:t>5/10/2020</a:t>
             </a:fld>
             <a:endParaRPr lang="en-US" dirty="0"/>
           </a:p>
@@ -2708,7 +2711,7 @@
           <a:p>
             <a:fld id="{1FAF3416-4057-4DAA-829D-4CA07428D088}" type="datetimeFigureOut">
               <a:rPr lang="en-US" dirty="0"/>
-              <a:t>9/20/2019</a:t>
+              <a:t>5/10/2020</a:t>
             </a:fld>
             <a:endParaRPr lang="en-US" dirty="0"/>
           </a:p>
@@ -2921,7 +2924,7 @@
           <a:p>
             <a:fld id="{921D9284-D300-4297-87F7-E791DCC15DB1}" type="datetimeFigureOut">
               <a:rPr lang="en-US" dirty="0"/>
-              <a:t>9/20/2019</a:t>
+              <a:t>5/10/2020</a:t>
             </a:fld>
             <a:endParaRPr lang="en-US" dirty="0"/>
           </a:p>
@@ -3290,7 +3293,7 @@
           <a:p>
             <a:fld id="{37D525BB-DA17-4BA0-B3C8-3AC3ABC827E6}" type="datetimeFigureOut">
               <a:rPr lang="en-US" dirty="0"/>
-              <a:t>9/20/2019</a:t>
+              <a:t>5/10/2020</a:t>
             </a:fld>
             <a:endParaRPr lang="en-US" dirty="0"/>
           </a:p>
@@ -3693,7 +3696,7 @@
           <a:p>
             <a:fld id="{B16C4C9A-3960-41CF-A4E9-2A8FB932454B}" type="datetimeFigureOut">
               <a:rPr lang="en-US" dirty="0"/>
-              <a:t>9/20/2019</a:t>
+              <a:t>5/10/2020</a:t>
             </a:fld>
             <a:endParaRPr lang="en-US" dirty="0"/>
           </a:p>
@@ -4004,7 +4007,7 @@
           <a:p>
             <a:fld id="{3CBC1C18-307B-4F68-A007-B5B542270E8D}" type="datetimeFigureOut">
               <a:rPr lang="en-US" dirty="0"/>
-              <a:t>9/20/2019</a:t>
+              <a:t>5/10/2020</a:t>
             </a:fld>
             <a:endParaRPr lang="en-US" dirty="0"/>
           </a:p>
@@ -4614,6 +4617,98 @@
           <p:cNvPr id="2" name="Title 1">
             <a:extLst>
               <a:ext uri="{FF2B5EF4-FFF2-40B4-BE49-F238E27FC236}">
+                <a16:creationId xmlns:a16="http://schemas.microsoft.com/office/drawing/2014/main" id="{674287CE-7D3A-4D27-A004-BE5039EEAC61}"/>
+              </a:ext>
+            </a:extLst>
+          </p:cNvPr>
+          <p:cNvSpPr>
+            <a:spLocks noGrp="1"/>
+          </p:cNvSpPr>
+          <p:nvPr>
+            <p:ph type="title"/>
+          </p:nvPr>
+        </p:nvSpPr>
+        <p:spPr/>
+        <p:txBody>
+          <a:bodyPr/>
+          <a:lstStyle/>
+          <a:p>
+            <a:r>
+              <a:rPr lang="en-US" dirty="0"/>
+              <a:t>Integration Tests</a:t>
+            </a:r>
+          </a:p>
+        </p:txBody>
+      </p:sp>
+      <p:sp>
+        <p:nvSpPr>
+          <p:cNvPr id="3" name="Content Placeholder 2">
+            <a:extLst>
+              <a:ext uri="{FF2B5EF4-FFF2-40B4-BE49-F238E27FC236}">
+                <a16:creationId xmlns:a16="http://schemas.microsoft.com/office/drawing/2014/main" id="{3953BBA2-881B-4EDB-90F5-770B5445FB9E}"/>
+              </a:ext>
+            </a:extLst>
+          </p:cNvPr>
+          <p:cNvSpPr>
+            <a:spLocks noGrp="1"/>
+          </p:cNvSpPr>
+          <p:nvPr>
+            <p:ph idx="1"/>
+          </p:nvPr>
+        </p:nvSpPr>
+        <p:spPr/>
+        <p:txBody>
+          <a:bodyPr/>
+          <a:lstStyle/>
+          <a:p>
+            <a:r>
+              <a:rPr lang="en-US" dirty="0"/>
+              <a:t>What is an Integration test?</a:t>
+            </a:r>
+          </a:p>
+          <a:p>
+            <a:r>
+              <a:rPr lang="en-US" dirty="0"/>
+              <a:t>What characteristics are true about a unit tested this way?</a:t>
+            </a:r>
+          </a:p>
+        </p:txBody>
+      </p:sp>
+    </p:spTree>
+    <p:extLst>
+      <p:ext uri="{BB962C8B-B14F-4D97-AF65-F5344CB8AC3E}">
+        <p14:creationId xmlns:p14="http://schemas.microsoft.com/office/powerpoint/2010/main" val="1229073609"/>
+      </p:ext>
+    </p:extLst>
+  </p:cSld>
+  <p:clrMapOvr>
+    <a:masterClrMapping/>
+  </p:clrMapOvr>
+</p:sld>
+</file>
+
+<file path=ppt/slides/slide11.xml><?xml version="1.0" encoding="utf-8"?>
+<p:sld xmlns:a="http://schemas.openxmlformats.org/drawingml/2006/main" xmlns:r="http://schemas.openxmlformats.org/officeDocument/2006/relationships" xmlns:p="http://schemas.openxmlformats.org/presentationml/2006/main">
+  <p:cSld>
+    <p:spTree>
+      <p:nvGrpSpPr>
+        <p:cNvPr id="1" name=""/>
+        <p:cNvGrpSpPr/>
+        <p:nvPr/>
+      </p:nvGrpSpPr>
+      <p:grpSpPr>
+        <a:xfrm>
+          <a:off x="0" y="0"/>
+          <a:ext cx="0" cy="0"/>
+          <a:chOff x="0" y="0"/>
+          <a:chExt cx="0" cy="0"/>
+        </a:xfrm>
+      </p:grpSpPr>
+      <p:sp>
+        <p:nvSpPr>
+          <p:cNvPr id="2" name="Title 1">
+            <a:extLst>
+              <a:ext uri="{FF2B5EF4-FFF2-40B4-BE49-F238E27FC236}">
                 <a16:creationId xmlns:a16="http://schemas.microsoft.com/office/drawing/2014/main" id="{5A01A66A-3BE5-4484-A8FE-3D5D1F1E2D61}"/>
               </a:ext>
             </a:extLst>
@@ -4719,7 +4814,7 @@
 </p:sld>
 </file>
 
-<file path=ppt/slides/slide11.xml><?xml version="1.0" encoding="utf-8"?>
+<file path=ppt/slides/slide12.xml><?xml version="1.0" encoding="utf-8"?>
 <p:sld xmlns:a="http://schemas.openxmlformats.org/drawingml/2006/main" xmlns:r="http://schemas.openxmlformats.org/officeDocument/2006/relationships" xmlns:p="http://schemas.openxmlformats.org/presentationml/2006/main">
   <p:cSld>
     <p:spTree>
@@ -4855,7 +4950,7 @@
 </p:sld>
 </file>
 
-<file path=ppt/slides/slide12.xml><?xml version="1.0" encoding="utf-8"?>
+<file path=ppt/slides/slide13.xml><?xml version="1.0" encoding="utf-8"?>
 <p:sld xmlns:a="http://schemas.openxmlformats.org/drawingml/2006/main" xmlns:r="http://schemas.openxmlformats.org/officeDocument/2006/relationships" xmlns:p="http://schemas.openxmlformats.org/presentationml/2006/main">
   <p:cSld>
     <p:spTree>
@@ -4998,7 +5093,7 @@
 </p:sld>
 </file>
 
-<file path=ppt/slides/slide13.xml><?xml version="1.0" encoding="utf-8"?>
+<file path=ppt/slides/slide14.xml><?xml version="1.0" encoding="utf-8"?>
 <p:sld xmlns:a="http://schemas.openxmlformats.org/drawingml/2006/main" xmlns:r="http://schemas.openxmlformats.org/officeDocument/2006/relationships" xmlns:p="http://schemas.openxmlformats.org/presentationml/2006/main">
   <p:cSld>
     <p:spTree>
@@ -5118,127 +5213,6 @@
 </p:sld>
 </file>
 
-<file path=ppt/slides/slide14.xml><?xml version="1.0" encoding="utf-8"?>
-<p:sld xmlns:a="http://schemas.openxmlformats.org/drawingml/2006/main" xmlns:r="http://schemas.openxmlformats.org/officeDocument/2006/relationships" xmlns:p="http://schemas.openxmlformats.org/presentationml/2006/main">
-  <p:cSld>
-    <p:spTree>
-      <p:nvGrpSpPr>
-        <p:cNvPr id="1" name=""/>
-        <p:cNvGrpSpPr/>
-        <p:nvPr/>
-      </p:nvGrpSpPr>
-      <p:grpSpPr>
-        <a:xfrm>
-          <a:off x="0" y="0"/>
-          <a:ext cx="0" cy="0"/>
-          <a:chOff x="0" y="0"/>
-          <a:chExt cx="0" cy="0"/>
-        </a:xfrm>
-      </p:grpSpPr>
-      <p:sp>
-        <p:nvSpPr>
-          <p:cNvPr id="2" name="Title 1">
-            <a:extLst>
-              <a:ext uri="{FF2B5EF4-FFF2-40B4-BE49-F238E27FC236}">
-                <a16:creationId xmlns:a16="http://schemas.microsoft.com/office/drawing/2014/main" id="{AE15E957-1F9A-42ED-A6CD-8590734646A0}"/>
-              </a:ext>
-            </a:extLst>
-          </p:cNvPr>
-          <p:cNvSpPr>
-            <a:spLocks noGrp="1"/>
-          </p:cNvSpPr>
-          <p:nvPr>
-            <p:ph type="title"/>
-          </p:nvPr>
-        </p:nvSpPr>
-        <p:spPr/>
-        <p:txBody>
-          <a:bodyPr/>
-          <a:lstStyle/>
-          <a:p>
-            <a:r>
-              <a:rPr lang="en-US" dirty="0"/>
-              <a:t>Integration Testing Database Wrappers</a:t>
-            </a:r>
-          </a:p>
-        </p:txBody>
-      </p:sp>
-      <p:sp>
-        <p:nvSpPr>
-          <p:cNvPr id="3" name="Content Placeholder 2">
-            <a:extLst>
-              <a:ext uri="{FF2B5EF4-FFF2-40B4-BE49-F238E27FC236}">
-                <a16:creationId xmlns:a16="http://schemas.microsoft.com/office/drawing/2014/main" id="{949A3F76-958E-4CCA-8CAA-F770E42924F7}"/>
-              </a:ext>
-            </a:extLst>
-          </p:cNvPr>
-          <p:cNvSpPr>
-            <a:spLocks noGrp="1"/>
-          </p:cNvSpPr>
-          <p:nvPr>
-            <p:ph idx="1"/>
-          </p:nvPr>
-        </p:nvSpPr>
-        <p:spPr/>
-        <p:txBody>
-          <a:bodyPr/>
-          <a:lstStyle/>
-          <a:p>
-            <a:r>
-              <a:rPr lang="en-US" dirty="0" err="1"/>
-              <a:t>Sql</a:t>
-            </a:r>
-            <a:r>
-              <a:rPr lang="en-US" dirty="0"/>
-              <a:t> is code. So is what ORM frameworks create.</a:t>
-            </a:r>
-          </a:p>
-          <a:p>
-            <a:r>
-              <a:rPr lang="en-US" dirty="0"/>
-              <a:t>It must be executed to prove it’s right.</a:t>
-            </a:r>
-          </a:p>
-          <a:p>
-            <a:r>
-              <a:rPr lang="en-US" dirty="0"/>
-              <a:t>Start a transaction in test setup, add test data</a:t>
-            </a:r>
-          </a:p>
-          <a:p>
-            <a:r>
-              <a:rPr lang="en-US" dirty="0"/>
-              <a:t>Rollback in the teardown.</a:t>
-            </a:r>
-          </a:p>
-          <a:p>
-            <a:r>
-              <a:rPr lang="en-US" dirty="0"/>
-              <a:t>Transaction free? GIGUGDG!</a:t>
-            </a:r>
-          </a:p>
-          <a:p>
-            <a:pPr lvl="1"/>
-            <a:r>
-              <a:rPr lang="en-US" dirty="0"/>
-              <a:t>Get, Insert, Get, Update, Get, Delete, Get</a:t>
-            </a:r>
-          </a:p>
-        </p:txBody>
-      </p:sp>
-    </p:spTree>
-    <p:extLst>
-      <p:ext uri="{BB962C8B-B14F-4D97-AF65-F5344CB8AC3E}">
-        <p14:creationId xmlns:p14="http://schemas.microsoft.com/office/powerpoint/2010/main" val="1319207513"/>
-      </p:ext>
-    </p:extLst>
-  </p:cSld>
-  <p:clrMapOvr>
-    <a:masterClrMapping/>
-  </p:clrMapOvr>
-</p:sld>
-</file>
-
 <file path=ppt/slides/slide15.xml><?xml version="1.0" encoding="utf-8"?>
 <p:sld xmlns:a="http://schemas.openxmlformats.org/drawingml/2006/main" xmlns:r="http://schemas.openxmlformats.org/officeDocument/2006/relationships" xmlns:p="http://schemas.openxmlformats.org/presentationml/2006/main">
   <p:cSld>
@@ -5261,7 +5235,7 @@
           <p:cNvPr id="2" name="Title 1">
             <a:extLst>
               <a:ext uri="{FF2B5EF4-FFF2-40B4-BE49-F238E27FC236}">
-                <a16:creationId xmlns:a16="http://schemas.microsoft.com/office/drawing/2014/main" id="{674287CE-7D3A-4D27-A004-BE5039EEAC61}"/>
+                <a16:creationId xmlns:a16="http://schemas.microsoft.com/office/drawing/2014/main" id="{AE15E957-1F9A-42ED-A6CD-8590734646A0}"/>
               </a:ext>
             </a:extLst>
           </p:cNvPr>
@@ -5279,7 +5253,7 @@
           <a:p>
             <a:r>
               <a:rPr lang="en-US" dirty="0"/>
-              <a:t>Collaboration Tests</a:t>
+              <a:t>Integration Testing Database Wrappers</a:t>
             </a:r>
           </a:p>
         </p:txBody>
@@ -5289,7 +5263,7 @@
           <p:cNvPr id="3" name="Content Placeholder 2">
             <a:extLst>
               <a:ext uri="{FF2B5EF4-FFF2-40B4-BE49-F238E27FC236}">
-                <a16:creationId xmlns:a16="http://schemas.microsoft.com/office/drawing/2014/main" id="{3953BBA2-881B-4EDB-90F5-770B5445FB9E}"/>
+                <a16:creationId xmlns:a16="http://schemas.microsoft.com/office/drawing/2014/main" id="{949A3F76-958E-4CCA-8CAA-F770E42924F7}"/>
               </a:ext>
             </a:extLst>
           </p:cNvPr>
@@ -5306,14 +5280,43 @@
           <a:lstStyle/>
           <a:p>
             <a:r>
-              <a:rPr lang="en-US" dirty="0"/>
-              <a:t>What is an Collaboration test?</a:t>
-            </a:r>
-          </a:p>
-          <a:p>
-            <a:r>
-              <a:rPr lang="en-US" dirty="0"/>
-              <a:t>What characteristics are true about a unit tested this way?</a:t>
+              <a:rPr lang="en-US" dirty="0" err="1"/>
+              <a:t>Sql</a:t>
+            </a:r>
+            <a:r>
+              <a:rPr lang="en-US" dirty="0"/>
+              <a:t> is code. So is what ORM frameworks create.</a:t>
+            </a:r>
+          </a:p>
+          <a:p>
+            <a:r>
+              <a:rPr lang="en-US" dirty="0"/>
+              <a:t>It must be executed to prove it’s right.</a:t>
+            </a:r>
+          </a:p>
+          <a:p>
+            <a:r>
+              <a:rPr lang="en-US" dirty="0"/>
+              <a:t>Start a transaction in test setup, add test data</a:t>
+            </a:r>
+          </a:p>
+          <a:p>
+            <a:r>
+              <a:rPr lang="en-US" dirty="0"/>
+              <a:t>Rollback in the teardown.</a:t>
+            </a:r>
+          </a:p>
+          <a:p>
+            <a:r>
+              <a:rPr lang="en-US" dirty="0"/>
+              <a:t>Transaction free? GIGUGDG!</a:t>
+            </a:r>
+          </a:p>
+          <a:p>
+            <a:pPr lvl="1"/>
+            <a:r>
+              <a:rPr lang="en-US" dirty="0"/>
+              <a:t>Get, Insert, Get, Update, Get, Delete, Get</a:t>
             </a:r>
           </a:p>
         </p:txBody>
@@ -5321,7 +5324,7 @@
     </p:spTree>
     <p:extLst>
       <p:ext uri="{BB962C8B-B14F-4D97-AF65-F5344CB8AC3E}">
-        <p14:creationId xmlns:p14="http://schemas.microsoft.com/office/powerpoint/2010/main" val="1978997574"/>
+        <p14:creationId xmlns:p14="http://schemas.microsoft.com/office/powerpoint/2010/main" val="1319207513"/>
       </p:ext>
     </p:extLst>
   </p:cSld>
@@ -5353,7 +5356,7 @@
           <p:cNvPr id="2" name="Title 1">
             <a:extLst>
               <a:ext uri="{FF2B5EF4-FFF2-40B4-BE49-F238E27FC236}">
-                <a16:creationId xmlns:a16="http://schemas.microsoft.com/office/drawing/2014/main" id="{AC7913F7-EBE7-4C91-BFF3-DCDE2DAD3CFD}"/>
+                <a16:creationId xmlns:a16="http://schemas.microsoft.com/office/drawing/2014/main" id="{674287CE-7D3A-4D27-A004-BE5039EEAC61}"/>
               </a:ext>
             </a:extLst>
           </p:cNvPr>
@@ -5381,7 +5384,7 @@
           <p:cNvPr id="3" name="Content Placeholder 2">
             <a:extLst>
               <a:ext uri="{FF2B5EF4-FFF2-40B4-BE49-F238E27FC236}">
-                <a16:creationId xmlns:a16="http://schemas.microsoft.com/office/drawing/2014/main" id="{FABB1545-6DE0-4A0B-A257-AC366B06F614}"/>
+                <a16:creationId xmlns:a16="http://schemas.microsoft.com/office/drawing/2014/main" id="{3953BBA2-881B-4EDB-90F5-770B5445FB9E}"/>
               </a:ext>
             </a:extLst>
           </p:cNvPr>
@@ -5399,63 +5402,21 @@
           <a:p>
             <a:r>
               <a:rPr lang="en-US" dirty="0"/>
-              <a:t>Validates a unit correctly coordinates work among multiple </a:t>
-            </a:r>
-            <a:r>
-              <a:rPr lang="en-US" dirty="0">
-                <a:sym typeface="Wingdings" panose="05000000000000000000" pitchFamily="2" charset="2"/>
-              </a:rPr>
-              <a:t>Collaborators</a:t>
-            </a:r>
-            <a:endParaRPr lang="en-US" dirty="0"/>
-          </a:p>
-          <a:p>
-            <a:r>
-              <a:rPr lang="en-US" dirty="0"/>
-              <a:t>Dependencies </a:t>
-            </a:r>
-            <a:r>
-              <a:rPr lang="en-US" dirty="0">
-                <a:sym typeface="Wingdings" panose="05000000000000000000" pitchFamily="2" charset="2"/>
-              </a:rPr>
-              <a:t> Collaborators</a:t>
-            </a:r>
-          </a:p>
-          <a:p>
-            <a:r>
-              <a:rPr lang="en-US" dirty="0">
-                <a:sym typeface="Wingdings" panose="05000000000000000000" pitchFamily="2" charset="2"/>
-              </a:rPr>
-              <a:t>Collaborators are usually faked/mocked/stubbed, and injected</a:t>
-            </a:r>
-          </a:p>
-          <a:p>
-            <a:r>
-              <a:rPr lang="en-US" dirty="0">
-                <a:sym typeface="Wingdings" panose="05000000000000000000" pitchFamily="2" charset="2"/>
-              </a:rPr>
-              <a:t>Collaborators are </a:t>
-            </a:r>
-            <a:r>
-              <a:rPr lang="en-US" i="1" dirty="0">
-                <a:sym typeface="Wingdings" panose="05000000000000000000" pitchFamily="2" charset="2"/>
-              </a:rPr>
-              <a:t>usually</a:t>
-            </a:r>
-            <a:r>
-              <a:rPr lang="en-US" dirty="0">
-                <a:sym typeface="Wingdings" panose="05000000000000000000" pitchFamily="2" charset="2"/>
-              </a:rPr>
-              <a:t> Unit or Integration tested.</a:t>
-            </a:r>
-            <a:endParaRPr lang="en-US" dirty="0"/>
+              <a:t>What is an Collaboration test?</a:t>
+            </a:r>
+          </a:p>
+          <a:p>
+            <a:r>
+              <a:rPr lang="en-US" dirty="0"/>
+              <a:t>What characteristics are true about a unit tested this way?</a:t>
+            </a:r>
           </a:p>
         </p:txBody>
       </p:sp>
     </p:spTree>
     <p:extLst>
       <p:ext uri="{BB962C8B-B14F-4D97-AF65-F5344CB8AC3E}">
-        <p14:creationId xmlns:p14="http://schemas.microsoft.com/office/powerpoint/2010/main" val="2219601847"/>
+        <p14:creationId xmlns:p14="http://schemas.microsoft.com/office/powerpoint/2010/main" val="1978997574"/>
       </p:ext>
     </p:extLst>
   </p:cSld>
@@ -5487,7 +5448,7 @@
           <p:cNvPr id="2" name="Title 1">
             <a:extLst>
               <a:ext uri="{FF2B5EF4-FFF2-40B4-BE49-F238E27FC236}">
-                <a16:creationId xmlns:a16="http://schemas.microsoft.com/office/drawing/2014/main" id="{B5D2410A-3EE1-4D78-941F-E23CE2FF8CDF}"/>
+                <a16:creationId xmlns:a16="http://schemas.microsoft.com/office/drawing/2014/main" id="{AC7913F7-EBE7-4C91-BFF3-DCDE2DAD3CFD}"/>
               </a:ext>
             </a:extLst>
           </p:cNvPr>
@@ -5505,7 +5466,7 @@
           <a:p>
             <a:r>
               <a:rPr lang="en-US" dirty="0"/>
-              <a:t>Example Collaboration Units</a:t>
+              <a:t>Collaboration Tests</a:t>
             </a:r>
           </a:p>
         </p:txBody>
@@ -5515,7 +5476,7 @@
           <p:cNvPr id="3" name="Content Placeholder 2">
             <a:extLst>
               <a:ext uri="{FF2B5EF4-FFF2-40B4-BE49-F238E27FC236}">
-                <a16:creationId xmlns:a16="http://schemas.microsoft.com/office/drawing/2014/main" id="{2E691F39-DBC9-484A-893C-9C548E03B262}"/>
+                <a16:creationId xmlns:a16="http://schemas.microsoft.com/office/drawing/2014/main" id="{FABB1545-6DE0-4A0B-A257-AC366B06F614}"/>
               </a:ext>
             </a:extLst>
           </p:cNvPr>
@@ -5533,25 +5494,7 @@
           <a:p>
             <a:r>
               <a:rPr lang="en-US" dirty="0"/>
-              <a:t>Controllers</a:t>
-            </a:r>
-          </a:p>
-          <a:p>
-            <a:r>
-              <a:rPr lang="en-US" dirty="0"/>
-              <a:t>Presenters</a:t>
-            </a:r>
-          </a:p>
-          <a:p>
-            <a:pPr marL="0" indent="0">
-              <a:buNone/>
-            </a:pPr>
-            <a:endParaRPr lang="en-US" dirty="0"/>
-          </a:p>
-          <a:p>
-            <a:r>
-              <a:rPr lang="en-US" dirty="0"/>
-              <a:t>Any code unit that coordinates work amongst multiple </a:t>
+              <a:t>Validates a unit correctly coordinates work among multiple </a:t>
             </a:r>
             <a:r>
               <a:rPr lang="en-US" dirty="0">
@@ -5561,12 +5504,53 @@
             </a:r>
             <a:endParaRPr lang="en-US" dirty="0"/>
           </a:p>
+          <a:p>
+            <a:r>
+              <a:rPr lang="en-US" dirty="0"/>
+              <a:t>Dependencies </a:t>
+            </a:r>
+            <a:r>
+              <a:rPr lang="en-US" dirty="0">
+                <a:sym typeface="Wingdings" panose="05000000000000000000" pitchFamily="2" charset="2"/>
+              </a:rPr>
+              <a:t> Collaborators</a:t>
+            </a:r>
+          </a:p>
+          <a:p>
+            <a:r>
+              <a:rPr lang="en-US" dirty="0">
+                <a:sym typeface="Wingdings" panose="05000000000000000000" pitchFamily="2" charset="2"/>
+              </a:rPr>
+              <a:t>Collaborators are usually faked/mocked/stubbed, and injected</a:t>
+            </a:r>
+          </a:p>
+          <a:p>
+            <a:r>
+              <a:rPr lang="en-US" dirty="0">
+                <a:sym typeface="Wingdings" panose="05000000000000000000" pitchFamily="2" charset="2"/>
+              </a:rPr>
+              <a:t>Collaborators are </a:t>
+            </a:r>
+            <a:r>
+              <a:rPr lang="en-US" i="1" dirty="0">
+                <a:sym typeface="Wingdings" panose="05000000000000000000" pitchFamily="2" charset="2"/>
+              </a:rPr>
+              <a:t>usually</a:t>
+            </a:r>
+            <a:r>
+              <a:rPr lang="en-US" dirty="0">
+                <a:sym typeface="Wingdings" panose="05000000000000000000" pitchFamily="2" charset="2"/>
+              </a:rPr>
+              <a:t> Unit or Integration tested.</a:t>
+            </a:r>
+            <a:endParaRPr lang="en-US" dirty="0"/>
+          </a:p>
         </p:txBody>
       </p:sp>
     </p:spTree>
     <p:extLst>
       <p:ext uri="{BB962C8B-B14F-4D97-AF65-F5344CB8AC3E}">
-        <p14:creationId xmlns:p14="http://schemas.microsoft.com/office/powerpoint/2010/main" val="3827814809"/>
+        <p14:creationId xmlns:p14="http://schemas.microsoft.com/office/powerpoint/2010/main" val="2219601847"/>
       </p:ext>
     </p:extLst>
   </p:cSld>
@@ -5598,7 +5582,7 @@
           <p:cNvPr id="2" name="Title 1">
             <a:extLst>
               <a:ext uri="{FF2B5EF4-FFF2-40B4-BE49-F238E27FC236}">
-                <a16:creationId xmlns:a16="http://schemas.microsoft.com/office/drawing/2014/main" id="{6AF862F1-745D-4B2B-B647-FB2F7334CD3C}"/>
+                <a16:creationId xmlns:a16="http://schemas.microsoft.com/office/drawing/2014/main" id="{B5D2410A-3EE1-4D78-941F-E23CE2FF8CDF}"/>
               </a:ext>
             </a:extLst>
           </p:cNvPr>
@@ -5616,7 +5600,7 @@
           <a:p>
             <a:r>
               <a:rPr lang="en-US" dirty="0"/>
-              <a:t>Important Rule</a:t>
+              <a:t>Example Collaboration Units</a:t>
             </a:r>
           </a:p>
         </p:txBody>
@@ -5626,7 +5610,7 @@
           <p:cNvPr id="3" name="Content Placeholder 2">
             <a:extLst>
               <a:ext uri="{FF2B5EF4-FFF2-40B4-BE49-F238E27FC236}">
-                <a16:creationId xmlns:a16="http://schemas.microsoft.com/office/drawing/2014/main" id="{3D696039-BD98-4283-A596-AC6E998D709F}"/>
+                <a16:creationId xmlns:a16="http://schemas.microsoft.com/office/drawing/2014/main" id="{2E691F39-DBC9-484A-893C-9C548E03B262}"/>
               </a:ext>
             </a:extLst>
           </p:cNvPr>
@@ -5644,15 +5628,40 @@
           <a:p>
             <a:r>
               <a:rPr lang="en-US" dirty="0"/>
-              <a:t>Only use conditionals to decide whether to utilize other collaborators.</a:t>
-            </a:r>
+              <a:t>Controllers</a:t>
+            </a:r>
+          </a:p>
+          <a:p>
+            <a:r>
+              <a:rPr lang="en-US" dirty="0"/>
+              <a:t>Presenters</a:t>
+            </a:r>
+          </a:p>
+          <a:p>
+            <a:pPr marL="0" indent="0">
+              <a:buNone/>
+            </a:pPr>
+            <a:endParaRPr lang="en-US" dirty="0"/>
+          </a:p>
+          <a:p>
+            <a:r>
+              <a:rPr lang="en-US" dirty="0"/>
+              <a:t>Any code unit that coordinates work amongst multiple </a:t>
+            </a:r>
+            <a:r>
+              <a:rPr lang="en-US" dirty="0">
+                <a:sym typeface="Wingdings" panose="05000000000000000000" pitchFamily="2" charset="2"/>
+              </a:rPr>
+              <a:t>Collaborators</a:t>
+            </a:r>
+            <a:endParaRPr lang="en-US" dirty="0"/>
           </a:p>
         </p:txBody>
       </p:sp>
     </p:spTree>
     <p:extLst>
       <p:ext uri="{BB962C8B-B14F-4D97-AF65-F5344CB8AC3E}">
-        <p14:creationId xmlns:p14="http://schemas.microsoft.com/office/powerpoint/2010/main" val="727117611"/>
+        <p14:creationId xmlns:p14="http://schemas.microsoft.com/office/powerpoint/2010/main" val="3827814809"/>
       </p:ext>
     </p:extLst>
   </p:cSld>
@@ -5684,7 +5693,7 @@
           <p:cNvPr id="2" name="Title 1">
             <a:extLst>
               <a:ext uri="{FF2B5EF4-FFF2-40B4-BE49-F238E27FC236}">
-                <a16:creationId xmlns:a16="http://schemas.microsoft.com/office/drawing/2014/main" id="{0930695A-8B36-4358-A5A6-2D225FF12CA8}"/>
+                <a16:creationId xmlns:a16="http://schemas.microsoft.com/office/drawing/2014/main" id="{6AF862F1-745D-4B2B-B647-FB2F7334CD3C}"/>
               </a:ext>
             </a:extLst>
           </p:cNvPr>
@@ -5702,7 +5711,7 @@
           <a:p>
             <a:r>
               <a:rPr lang="en-US" dirty="0"/>
-              <a:t>Conditionals Rule Example</a:t>
+              <a:t>Important Rule</a:t>
             </a:r>
           </a:p>
         </p:txBody>
@@ -5712,156 +5721,33 @@
           <p:cNvPr id="3" name="Content Placeholder 2">
             <a:extLst>
               <a:ext uri="{FF2B5EF4-FFF2-40B4-BE49-F238E27FC236}">
-                <a16:creationId xmlns:a16="http://schemas.microsoft.com/office/drawing/2014/main" id="{599DF28E-7732-471F-8344-DD5CF0101ABA}"/>
-              </a:ext>
-            </a:extLst>
-          </p:cNvPr>
-          <p:cNvSpPr>
-            <a:spLocks noGrp="1"/>
-          </p:cNvSpPr>
-          <p:nvPr>
-            <p:ph sz="half" idx="1"/>
-          </p:nvPr>
-        </p:nvSpPr>
-        <p:spPr/>
-        <p:txBody>
-          <a:bodyPr>
-            <a:normAutofit fontScale="92500"/>
-          </a:bodyPr>
-          <a:lstStyle/>
-          <a:p>
-            <a:r>
-              <a:rPr lang="en-US" dirty="0"/>
-              <a:t>Yes</a:t>
-            </a:r>
-          </a:p>
-          <a:p>
-            <a:pPr marL="0" indent="0">
-              <a:buNone/>
-            </a:pPr>
-            <a:r>
-              <a:rPr lang="en-US" dirty="0"/>
-              <a:t>If (collaborator1.X)  	collaborator2.Y() </a:t>
-            </a:r>
-          </a:p>
-          <a:p>
-            <a:pPr marL="0" indent="0">
-              <a:buNone/>
-            </a:pPr>
-            <a:r>
-              <a:rPr lang="en-US" dirty="0"/>
-              <a:t>else </a:t>
-            </a:r>
-          </a:p>
-          <a:p>
-            <a:pPr marL="0" indent="0">
-              <a:buNone/>
-            </a:pPr>
-            <a:r>
-              <a:rPr lang="en-US" dirty="0"/>
-              <a:t>	collaborator3.Z();</a:t>
-            </a:r>
-          </a:p>
-        </p:txBody>
-      </p:sp>
-      <p:sp>
-        <p:nvSpPr>
-          <p:cNvPr id="4" name="Content Placeholder 3">
-            <a:extLst>
-              <a:ext uri="{FF2B5EF4-FFF2-40B4-BE49-F238E27FC236}">
-                <a16:creationId xmlns:a16="http://schemas.microsoft.com/office/drawing/2014/main" id="{7507C80F-3250-4A16-8BF1-FD2C5F8F5CAA}"/>
-              </a:ext>
-            </a:extLst>
-          </p:cNvPr>
-          <p:cNvSpPr>
-            <a:spLocks noGrp="1"/>
-          </p:cNvSpPr>
-          <p:nvPr>
-            <p:ph sz="half" idx="2"/>
-          </p:nvPr>
-        </p:nvSpPr>
-        <p:spPr/>
-        <p:txBody>
-          <a:bodyPr>
-            <a:normAutofit fontScale="92500"/>
-          </a:bodyPr>
-          <a:lstStyle/>
-          <a:p>
-            <a:r>
-              <a:rPr lang="en-US" dirty="0"/>
-              <a:t>No!</a:t>
-            </a:r>
-          </a:p>
-          <a:p>
-            <a:pPr marL="0" indent="0">
-              <a:buNone/>
-            </a:pPr>
-            <a:r>
-              <a:rPr lang="en-US" dirty="0"/>
-              <a:t>If (collaborator1.X)</a:t>
-            </a:r>
-          </a:p>
-          <a:p>
-            <a:pPr marL="457200" lvl="1" indent="0">
-              <a:buNone/>
-            </a:pPr>
-            <a:r>
-              <a:rPr lang="en-US" dirty="0"/>
-              <a:t>	_</a:t>
-            </a:r>
-            <a:r>
-              <a:rPr lang="en-US" dirty="0" err="1"/>
-              <a:t>fieldZ</a:t>
-            </a:r>
-            <a:r>
-              <a:rPr lang="en-US" dirty="0"/>
-              <a:t> = </a:t>
-            </a:r>
-            <a:r>
-              <a:rPr lang="en-US" dirty="0" err="1"/>
-              <a:t>DateTime.Now</a:t>
-            </a:r>
-            <a:r>
-              <a:rPr lang="en-US" dirty="0"/>
-              <a:t>()</a:t>
-            </a:r>
-          </a:p>
-          <a:p>
-            <a:pPr marL="457200" lvl="1" indent="0">
-              <a:buNone/>
-            </a:pPr>
-            <a:endParaRPr lang="en-US" dirty="0"/>
-          </a:p>
-          <a:p>
-            <a:r>
-              <a:rPr lang="en-US" dirty="0"/>
-              <a:t>Violates STP, requires Unit testing. Beware test factorials!</a:t>
-            </a:r>
-          </a:p>
-          <a:p>
-            <a:r>
-              <a:rPr lang="en-US" dirty="0"/>
-              <a:t>Move this state assignment into another collaborator.</a:t>
-            </a:r>
-          </a:p>
-          <a:p>
-            <a:pPr marL="0" indent="0">
-              <a:buNone/>
-            </a:pPr>
-            <a:endParaRPr lang="en-US" dirty="0"/>
-          </a:p>
-          <a:p>
-            <a:pPr marL="0" indent="0">
-              <a:buNone/>
-            </a:pPr>
-            <a:endParaRPr lang="en-US" dirty="0"/>
+                <a16:creationId xmlns:a16="http://schemas.microsoft.com/office/drawing/2014/main" id="{3D696039-BD98-4283-A596-AC6E998D709F}"/>
+              </a:ext>
+            </a:extLst>
+          </p:cNvPr>
+          <p:cNvSpPr>
+            <a:spLocks noGrp="1"/>
+          </p:cNvSpPr>
+          <p:nvPr>
+            <p:ph idx="1"/>
+          </p:nvPr>
+        </p:nvSpPr>
+        <p:spPr/>
+        <p:txBody>
+          <a:bodyPr/>
+          <a:lstStyle/>
+          <a:p>
+            <a:r>
+              <a:rPr lang="en-US" dirty="0"/>
+              <a:t>Only use conditionals to decide whether to utilize other collaborators.</a:t>
+            </a:r>
           </a:p>
         </p:txBody>
       </p:sp>
     </p:spTree>
     <p:extLst>
       <p:ext uri="{BB962C8B-B14F-4D97-AF65-F5344CB8AC3E}">
-        <p14:creationId xmlns:p14="http://schemas.microsoft.com/office/powerpoint/2010/main" val="1364466075"/>
+        <p14:creationId xmlns:p14="http://schemas.microsoft.com/office/powerpoint/2010/main" val="727117611"/>
       </p:ext>
     </p:extLst>
   </p:cSld>
@@ -5911,7 +5797,7 @@
           <a:p>
             <a:r>
               <a:rPr lang="en-US" dirty="0"/>
-              <a:t>Definition</a:t>
+              <a:t>TDD Foundation</a:t>
             </a:r>
           </a:p>
         </p:txBody>
@@ -5929,57 +5815,80 @@
             <a:spLocks noGrp="1"/>
           </p:cNvSpPr>
           <p:nvPr>
-            <p:ph idx="1"/>
-          </p:nvPr>
-        </p:nvSpPr>
+            <p:ph sz="half" idx="1"/>
+          </p:nvPr>
+        </p:nvSpPr>
+        <p:spPr/>
+        <p:txBody>
+          <a:bodyPr>
+            <a:normAutofit/>
+          </a:bodyPr>
+          <a:lstStyle/>
+          <a:p>
+            <a:r>
+              <a:rPr lang="en-US" dirty="0"/>
+              <a:t>Kent Beck, Test Driven Development: By Example</a:t>
+            </a:r>
+          </a:p>
+          <a:p>
+            <a:r>
+              <a:rPr lang="en-US" dirty="0">
+                <a:hlinkClick r:id="rId2"/>
+              </a:rPr>
+              <a:t>https://smile.amazon.com/Test-Driven-Development-Kent-Beck/dp/0321146530</a:t>
+            </a:r>
+            <a:endParaRPr lang="en-US" dirty="0"/>
+          </a:p>
+          <a:p>
+            <a:r>
+              <a:rPr lang="en-US" dirty="0"/>
+              <a:t>Internal thought process of doing TDD.</a:t>
+            </a:r>
+          </a:p>
+          <a:p>
+            <a:r>
+              <a:rPr lang="en-US" dirty="0"/>
+              <a:t>Best $40 you could ever spend on your career.</a:t>
+            </a:r>
+          </a:p>
+        </p:txBody>
+      </p:sp>
+      <p:pic>
+        <p:nvPicPr>
+          <p:cNvPr id="6" name="Content Placeholder 5">
+            <a:extLst>
+              <a:ext uri="{FF2B5EF4-FFF2-40B4-BE49-F238E27FC236}">
+                <a16:creationId xmlns:a16="http://schemas.microsoft.com/office/drawing/2014/main" id="{AEDBE544-18C6-4CB4-8265-5E622E11F92E}"/>
+              </a:ext>
+            </a:extLst>
+          </p:cNvPr>
+          <p:cNvPicPr>
+            <a:picLocks noGrp="1" noChangeAspect="1"/>
+          </p:cNvPicPr>
+          <p:nvPr>
+            <p:ph sz="half" idx="2"/>
+          </p:nvPr>
+        </p:nvPicPr>
+        <p:blipFill>
+          <a:blip r:embed="rId3"/>
+          <a:stretch>
+            <a:fillRect/>
+          </a:stretch>
+        </p:blipFill>
         <p:spPr>
           <a:xfrm>
-            <a:off x="2658326" y="2052116"/>
-            <a:ext cx="7796540" cy="3997828"/>
+            <a:off x="7375352" y="2503272"/>
+            <a:ext cx="2476846" cy="3096057"/>
           </a:xfrm>
+          <a:prstGeom prst="rect">
+            <a:avLst/>
+          </a:prstGeom>
         </p:spPr>
-        <p:txBody>
-          <a:bodyPr/>
-          <a:lstStyle/>
-          <a:p>
-            <a:r>
-              <a:rPr lang="en-US" dirty="0"/>
-              <a:t>A unit should require only a single mode of testing to be verified.</a:t>
-            </a:r>
-          </a:p>
-          <a:p>
-            <a:endParaRPr lang="en-US" dirty="0"/>
-          </a:p>
-          <a:p>
-            <a:endParaRPr lang="en-US" dirty="0"/>
-          </a:p>
-          <a:p>
-            <a:pPr marL="0" indent="0">
-              <a:buNone/>
-            </a:pPr>
-            <a:endParaRPr lang="en-US" dirty="0"/>
-          </a:p>
-          <a:p>
-            <a:r>
-              <a:rPr lang="en-US" dirty="0"/>
-              <a:t>Multiple modes of testing is an indicator of excessive complexity </a:t>
-            </a:r>
-          </a:p>
-          <a:p>
-            <a:r>
-              <a:rPr lang="en-US" dirty="0"/>
-              <a:t>Indicates the need to decompose a unit</a:t>
-            </a:r>
-          </a:p>
-          <a:p>
-            <a:endParaRPr lang="en-US" dirty="0"/>
-          </a:p>
-        </p:txBody>
-      </p:sp>
+      </p:pic>
     </p:spTree>
     <p:extLst>
       <p:ext uri="{BB962C8B-B14F-4D97-AF65-F5344CB8AC3E}">
-        <p14:creationId xmlns:p14="http://schemas.microsoft.com/office/powerpoint/2010/main" val="1767524376"/>
+        <p14:creationId xmlns:p14="http://schemas.microsoft.com/office/powerpoint/2010/main" val="1373096241"/>
       </p:ext>
     </p:extLst>
   </p:cSld>
@@ -5990,6 +5899,755 @@
 </file>
 
 <file path=ppt/slides/slide20.xml><?xml version="1.0" encoding="utf-8"?>
+<p:sld xmlns:a="http://schemas.openxmlformats.org/drawingml/2006/main" xmlns:r="http://schemas.openxmlformats.org/officeDocument/2006/relationships" xmlns:p="http://schemas.openxmlformats.org/presentationml/2006/main">
+  <p:cSld>
+    <p:spTree>
+      <p:nvGrpSpPr>
+        <p:cNvPr id="1" name=""/>
+        <p:cNvGrpSpPr/>
+        <p:nvPr/>
+      </p:nvGrpSpPr>
+      <p:grpSpPr>
+        <a:xfrm>
+          <a:off x="0" y="0"/>
+          <a:ext cx="0" cy="0"/>
+          <a:chOff x="0" y="0"/>
+          <a:chExt cx="0" cy="0"/>
+        </a:xfrm>
+      </p:grpSpPr>
+      <p:sp>
+        <p:nvSpPr>
+          <p:cNvPr id="2" name="Title 1">
+            <a:extLst>
+              <a:ext uri="{FF2B5EF4-FFF2-40B4-BE49-F238E27FC236}">
+                <a16:creationId xmlns:a16="http://schemas.microsoft.com/office/drawing/2014/main" id="{0930695A-8B36-4358-A5A6-2D225FF12CA8}"/>
+              </a:ext>
+            </a:extLst>
+          </p:cNvPr>
+          <p:cNvSpPr>
+            <a:spLocks noGrp="1"/>
+          </p:cNvSpPr>
+          <p:nvPr>
+            <p:ph type="title"/>
+          </p:nvPr>
+        </p:nvSpPr>
+        <p:spPr/>
+        <p:txBody>
+          <a:bodyPr/>
+          <a:lstStyle/>
+          <a:p>
+            <a:r>
+              <a:rPr lang="en-US" dirty="0"/>
+              <a:t>Conditionals Rule Example</a:t>
+            </a:r>
+          </a:p>
+        </p:txBody>
+      </p:sp>
+      <p:sp>
+        <p:nvSpPr>
+          <p:cNvPr id="3" name="Content Placeholder 2">
+            <a:extLst>
+              <a:ext uri="{FF2B5EF4-FFF2-40B4-BE49-F238E27FC236}">
+                <a16:creationId xmlns:a16="http://schemas.microsoft.com/office/drawing/2014/main" id="{599DF28E-7732-471F-8344-DD5CF0101ABA}"/>
+              </a:ext>
+            </a:extLst>
+          </p:cNvPr>
+          <p:cNvSpPr>
+            <a:spLocks noGrp="1"/>
+          </p:cNvSpPr>
+          <p:nvPr>
+            <p:ph sz="half" idx="1"/>
+          </p:nvPr>
+        </p:nvSpPr>
+        <p:spPr/>
+        <p:txBody>
+          <a:bodyPr>
+            <a:normAutofit fontScale="92500"/>
+          </a:bodyPr>
+          <a:lstStyle/>
+          <a:p>
+            <a:r>
+              <a:rPr lang="en-US" dirty="0"/>
+              <a:t>Yes</a:t>
+            </a:r>
+          </a:p>
+          <a:p>
+            <a:pPr marL="0" indent="0">
+              <a:buNone/>
+            </a:pPr>
+            <a:r>
+              <a:rPr lang="en-US" dirty="0"/>
+              <a:t>If (collaborator1.X)  	collaborator2.Y() </a:t>
+            </a:r>
+          </a:p>
+          <a:p>
+            <a:pPr marL="0" indent="0">
+              <a:buNone/>
+            </a:pPr>
+            <a:r>
+              <a:rPr lang="en-US" dirty="0"/>
+              <a:t>else </a:t>
+            </a:r>
+          </a:p>
+          <a:p>
+            <a:pPr marL="0" indent="0">
+              <a:buNone/>
+            </a:pPr>
+            <a:r>
+              <a:rPr lang="en-US" dirty="0"/>
+              <a:t>	collaborator3.Z();</a:t>
+            </a:r>
+          </a:p>
+        </p:txBody>
+      </p:sp>
+      <p:sp>
+        <p:nvSpPr>
+          <p:cNvPr id="4" name="Content Placeholder 3">
+            <a:extLst>
+              <a:ext uri="{FF2B5EF4-FFF2-40B4-BE49-F238E27FC236}">
+                <a16:creationId xmlns:a16="http://schemas.microsoft.com/office/drawing/2014/main" id="{7507C80F-3250-4A16-8BF1-FD2C5F8F5CAA}"/>
+              </a:ext>
+            </a:extLst>
+          </p:cNvPr>
+          <p:cNvSpPr>
+            <a:spLocks noGrp="1"/>
+          </p:cNvSpPr>
+          <p:nvPr>
+            <p:ph sz="half" idx="2"/>
+          </p:nvPr>
+        </p:nvSpPr>
+        <p:spPr/>
+        <p:txBody>
+          <a:bodyPr>
+            <a:normAutofit fontScale="92500"/>
+          </a:bodyPr>
+          <a:lstStyle/>
+          <a:p>
+            <a:r>
+              <a:rPr lang="en-US" dirty="0"/>
+              <a:t>No!</a:t>
+            </a:r>
+          </a:p>
+          <a:p>
+            <a:pPr marL="0" indent="0">
+              <a:buNone/>
+            </a:pPr>
+            <a:r>
+              <a:rPr lang="en-US" dirty="0"/>
+              <a:t>If (collaborator1.X)</a:t>
+            </a:r>
+          </a:p>
+          <a:p>
+            <a:pPr marL="457200" lvl="1" indent="0">
+              <a:buNone/>
+            </a:pPr>
+            <a:r>
+              <a:rPr lang="en-US" dirty="0"/>
+              <a:t>	_</a:t>
+            </a:r>
+            <a:r>
+              <a:rPr lang="en-US" dirty="0" err="1"/>
+              <a:t>fieldZ</a:t>
+            </a:r>
+            <a:r>
+              <a:rPr lang="en-US" dirty="0"/>
+              <a:t> = </a:t>
+            </a:r>
+            <a:r>
+              <a:rPr lang="en-US" dirty="0" err="1"/>
+              <a:t>DateTime.Now</a:t>
+            </a:r>
+            <a:r>
+              <a:rPr lang="en-US" dirty="0"/>
+              <a:t>()</a:t>
+            </a:r>
+          </a:p>
+          <a:p>
+            <a:pPr marL="457200" lvl="1" indent="0">
+              <a:buNone/>
+            </a:pPr>
+            <a:endParaRPr lang="en-US" dirty="0"/>
+          </a:p>
+          <a:p>
+            <a:r>
+              <a:rPr lang="en-US" dirty="0"/>
+              <a:t>Violates STP, requires Unit testing. Beware test factorials!</a:t>
+            </a:r>
+          </a:p>
+          <a:p>
+            <a:r>
+              <a:rPr lang="en-US" dirty="0"/>
+              <a:t>Move this state assignment into another collaborator.</a:t>
+            </a:r>
+          </a:p>
+          <a:p>
+            <a:pPr marL="0" indent="0">
+              <a:buNone/>
+            </a:pPr>
+            <a:endParaRPr lang="en-US" dirty="0"/>
+          </a:p>
+          <a:p>
+            <a:pPr marL="0" indent="0">
+              <a:buNone/>
+            </a:pPr>
+            <a:endParaRPr lang="en-US" dirty="0"/>
+          </a:p>
+        </p:txBody>
+      </p:sp>
+    </p:spTree>
+    <p:extLst>
+      <p:ext uri="{BB962C8B-B14F-4D97-AF65-F5344CB8AC3E}">
+        <p14:creationId xmlns:p14="http://schemas.microsoft.com/office/powerpoint/2010/main" val="1364466075"/>
+      </p:ext>
+    </p:extLst>
+  </p:cSld>
+  <p:clrMapOvr>
+    <a:masterClrMapping/>
+  </p:clrMapOvr>
+</p:sld>
+</file>
+
+<file path=ppt/slides/slide21.xml><?xml version="1.0" encoding="utf-8"?>
+<p:sld xmlns:a="http://schemas.openxmlformats.org/drawingml/2006/main" xmlns:r="http://schemas.openxmlformats.org/officeDocument/2006/relationships" xmlns:p="http://schemas.openxmlformats.org/presentationml/2006/main">
+  <p:cSld>
+    <p:spTree>
+      <p:nvGrpSpPr>
+        <p:cNvPr id="1" name=""/>
+        <p:cNvGrpSpPr/>
+        <p:nvPr/>
+      </p:nvGrpSpPr>
+      <p:grpSpPr>
+        <a:xfrm>
+          <a:off x="0" y="0"/>
+          <a:ext cx="0" cy="0"/>
+          <a:chOff x="0" y="0"/>
+          <a:chExt cx="0" cy="0"/>
+        </a:xfrm>
+      </p:grpSpPr>
+      <p:sp>
+        <p:nvSpPr>
+          <p:cNvPr id="2" name="Title 1">
+            <a:extLst>
+              <a:ext uri="{FF2B5EF4-FFF2-40B4-BE49-F238E27FC236}">
+                <a16:creationId xmlns:a16="http://schemas.microsoft.com/office/drawing/2014/main" id="{6E93C8A4-71B9-479F-AC09-EA28529B66E3}"/>
+              </a:ext>
+            </a:extLst>
+          </p:cNvPr>
+          <p:cNvSpPr>
+            <a:spLocks noGrp="1"/>
+          </p:cNvSpPr>
+          <p:nvPr>
+            <p:ph type="title"/>
+          </p:nvPr>
+        </p:nvSpPr>
+        <p:spPr/>
+        <p:txBody>
+          <a:bodyPr/>
+          <a:lstStyle/>
+          <a:p>
+            <a:r>
+              <a:rPr lang="en-US" dirty="0" err="1"/>
+              <a:t>PresenterTests.cs</a:t>
+            </a:r>
+            <a:endParaRPr lang="en-US" dirty="0"/>
+          </a:p>
+        </p:txBody>
+      </p:sp>
+      <p:sp>
+        <p:nvSpPr>
+          <p:cNvPr id="3" name="Content Placeholder 2">
+            <a:extLst>
+              <a:ext uri="{FF2B5EF4-FFF2-40B4-BE49-F238E27FC236}">
+                <a16:creationId xmlns:a16="http://schemas.microsoft.com/office/drawing/2014/main" id="{BF37F820-D0C4-4210-BD70-2F1CC40BA622}"/>
+              </a:ext>
+            </a:extLst>
+          </p:cNvPr>
+          <p:cNvSpPr>
+            <a:spLocks noGrp="1"/>
+          </p:cNvSpPr>
+          <p:nvPr>
+            <p:ph idx="1"/>
+          </p:nvPr>
+        </p:nvSpPr>
+        <p:spPr/>
+        <p:txBody>
+          <a:bodyPr/>
+          <a:lstStyle/>
+          <a:p>
+            <a:r>
+              <a:rPr lang="en-US" dirty="0"/>
+              <a:t>Setup unit, and mock dependencies</a:t>
+            </a:r>
+          </a:p>
+          <a:p>
+            <a:endParaRPr lang="en-US" dirty="0"/>
+          </a:p>
+          <a:p>
+            <a:endParaRPr lang="en-US" dirty="0"/>
+          </a:p>
+          <a:p>
+            <a:endParaRPr lang="en-US" dirty="0"/>
+          </a:p>
+          <a:p>
+            <a:endParaRPr lang="en-US" dirty="0"/>
+          </a:p>
+          <a:p>
+            <a:endParaRPr lang="en-US" dirty="0"/>
+          </a:p>
+          <a:p>
+            <a:endParaRPr lang="en-US" dirty="0"/>
+          </a:p>
+        </p:txBody>
+      </p:sp>
+      <p:pic>
+        <p:nvPicPr>
+          <p:cNvPr id="4" name="Picture 3">
+            <a:extLst>
+              <a:ext uri="{FF2B5EF4-FFF2-40B4-BE49-F238E27FC236}">
+                <a16:creationId xmlns:a16="http://schemas.microsoft.com/office/drawing/2014/main" id="{DB11B389-8FD4-49EA-BB15-06DE5A00A0A3}"/>
+              </a:ext>
+            </a:extLst>
+          </p:cNvPr>
+          <p:cNvPicPr>
+            <a:picLocks noChangeAspect="1"/>
+          </p:cNvPicPr>
+          <p:nvPr/>
+        </p:nvPicPr>
+        <p:blipFill>
+          <a:blip r:embed="rId2"/>
+          <a:stretch>
+            <a:fillRect/>
+          </a:stretch>
+        </p:blipFill>
+        <p:spPr>
+          <a:xfrm>
+            <a:off x="1805916" y="3044507"/>
+            <a:ext cx="8764223" cy="3172268"/>
+          </a:xfrm>
+          <a:prstGeom prst="rect">
+            <a:avLst/>
+          </a:prstGeom>
+        </p:spPr>
+      </p:pic>
+    </p:spTree>
+    <p:extLst>
+      <p:ext uri="{BB962C8B-B14F-4D97-AF65-F5344CB8AC3E}">
+        <p14:creationId xmlns:p14="http://schemas.microsoft.com/office/powerpoint/2010/main" val="763159629"/>
+      </p:ext>
+    </p:extLst>
+  </p:cSld>
+  <p:clrMapOvr>
+    <a:masterClrMapping/>
+  </p:clrMapOvr>
+</p:sld>
+</file>
+
+<file path=ppt/slides/slide22.xml><?xml version="1.0" encoding="utf-8"?>
+<p:sld xmlns:a="http://schemas.openxmlformats.org/drawingml/2006/main" xmlns:r="http://schemas.openxmlformats.org/officeDocument/2006/relationships" xmlns:p="http://schemas.openxmlformats.org/presentationml/2006/main">
+  <p:cSld>
+    <p:spTree>
+      <p:nvGrpSpPr>
+        <p:cNvPr id="1" name=""/>
+        <p:cNvGrpSpPr/>
+        <p:nvPr/>
+      </p:nvGrpSpPr>
+      <p:grpSpPr>
+        <a:xfrm>
+          <a:off x="0" y="0"/>
+          <a:ext cx="0" cy="0"/>
+          <a:chOff x="0" y="0"/>
+          <a:chExt cx="0" cy="0"/>
+        </a:xfrm>
+      </p:grpSpPr>
+      <p:sp>
+        <p:nvSpPr>
+          <p:cNvPr id="2" name="Title 1">
+            <a:extLst>
+              <a:ext uri="{FF2B5EF4-FFF2-40B4-BE49-F238E27FC236}">
+                <a16:creationId xmlns:a16="http://schemas.microsoft.com/office/drawing/2014/main" id="{6E93C8A4-71B9-479F-AC09-EA28529B66E3}"/>
+              </a:ext>
+            </a:extLst>
+          </p:cNvPr>
+          <p:cNvSpPr>
+            <a:spLocks noGrp="1"/>
+          </p:cNvSpPr>
+          <p:nvPr>
+            <p:ph type="title"/>
+          </p:nvPr>
+        </p:nvSpPr>
+        <p:spPr/>
+        <p:txBody>
+          <a:bodyPr/>
+          <a:lstStyle/>
+          <a:p>
+            <a:r>
+              <a:rPr lang="en-US" dirty="0" err="1"/>
+              <a:t>PresenterTests.cs</a:t>
+            </a:r>
+            <a:endParaRPr lang="en-US" dirty="0"/>
+          </a:p>
+        </p:txBody>
+      </p:sp>
+      <p:sp>
+        <p:nvSpPr>
+          <p:cNvPr id="3" name="Content Placeholder 2">
+            <a:extLst>
+              <a:ext uri="{FF2B5EF4-FFF2-40B4-BE49-F238E27FC236}">
+                <a16:creationId xmlns:a16="http://schemas.microsoft.com/office/drawing/2014/main" id="{BF37F820-D0C4-4210-BD70-2F1CC40BA622}"/>
+              </a:ext>
+            </a:extLst>
+          </p:cNvPr>
+          <p:cNvSpPr>
+            <a:spLocks noGrp="1"/>
+          </p:cNvSpPr>
+          <p:nvPr>
+            <p:ph idx="1"/>
+          </p:nvPr>
+        </p:nvSpPr>
+        <p:spPr/>
+        <p:txBody>
+          <a:bodyPr/>
+          <a:lstStyle/>
+          <a:p>
+            <a:r>
+              <a:rPr lang="en-US" dirty="0"/>
+              <a:t>Verify behavior</a:t>
+            </a:r>
+          </a:p>
+          <a:p>
+            <a:endParaRPr lang="en-US" dirty="0"/>
+          </a:p>
+          <a:p>
+            <a:endParaRPr lang="en-US" dirty="0"/>
+          </a:p>
+          <a:p>
+            <a:endParaRPr lang="en-US" dirty="0"/>
+          </a:p>
+          <a:p>
+            <a:endParaRPr lang="en-US" dirty="0"/>
+          </a:p>
+          <a:p>
+            <a:endParaRPr lang="en-US" dirty="0"/>
+          </a:p>
+          <a:p>
+            <a:endParaRPr lang="en-US" dirty="0"/>
+          </a:p>
+        </p:txBody>
+      </p:sp>
+      <p:pic>
+        <p:nvPicPr>
+          <p:cNvPr id="5" name="Picture 4">
+            <a:extLst>
+              <a:ext uri="{FF2B5EF4-FFF2-40B4-BE49-F238E27FC236}">
+                <a16:creationId xmlns:a16="http://schemas.microsoft.com/office/drawing/2014/main" id="{FBF7555C-447A-4E41-BA2F-B31053724555}"/>
+              </a:ext>
+            </a:extLst>
+          </p:cNvPr>
+          <p:cNvPicPr>
+            <a:picLocks noChangeAspect="1"/>
+          </p:cNvPicPr>
+          <p:nvPr/>
+        </p:nvPicPr>
+        <p:blipFill>
+          <a:blip r:embed="rId2"/>
+          <a:stretch>
+            <a:fillRect/>
+          </a:stretch>
+        </p:blipFill>
+        <p:spPr>
+          <a:xfrm>
+            <a:off x="2773599" y="2704833"/>
+            <a:ext cx="6620799" cy="3829584"/>
+          </a:xfrm>
+          <a:prstGeom prst="rect">
+            <a:avLst/>
+          </a:prstGeom>
+        </p:spPr>
+      </p:pic>
+    </p:spTree>
+    <p:extLst>
+      <p:ext uri="{BB962C8B-B14F-4D97-AF65-F5344CB8AC3E}">
+        <p14:creationId xmlns:p14="http://schemas.microsoft.com/office/powerpoint/2010/main" val="2025620570"/>
+      </p:ext>
+    </p:extLst>
+  </p:cSld>
+  <p:clrMapOvr>
+    <a:masterClrMapping/>
+  </p:clrMapOvr>
+</p:sld>
+</file>
+
+<file path=ppt/slides/slide23.xml><?xml version="1.0" encoding="utf-8"?>
+<p:sld xmlns:a="http://schemas.openxmlformats.org/drawingml/2006/main" xmlns:r="http://schemas.openxmlformats.org/officeDocument/2006/relationships" xmlns:p="http://schemas.openxmlformats.org/presentationml/2006/main">
+  <p:cSld>
+    <p:spTree>
+      <p:nvGrpSpPr>
+        <p:cNvPr id="1" name=""/>
+        <p:cNvGrpSpPr/>
+        <p:nvPr/>
+      </p:nvGrpSpPr>
+      <p:grpSpPr>
+        <a:xfrm>
+          <a:off x="0" y="0"/>
+          <a:ext cx="0" cy="0"/>
+          <a:chOff x="0" y="0"/>
+          <a:chExt cx="0" cy="0"/>
+        </a:xfrm>
+      </p:grpSpPr>
+      <p:sp>
+        <p:nvSpPr>
+          <p:cNvPr id="2" name="Title 1">
+            <a:extLst>
+              <a:ext uri="{FF2B5EF4-FFF2-40B4-BE49-F238E27FC236}">
+                <a16:creationId xmlns:a16="http://schemas.microsoft.com/office/drawing/2014/main" id="{6E93C8A4-71B9-479F-AC09-EA28529B66E3}"/>
+              </a:ext>
+            </a:extLst>
+          </p:cNvPr>
+          <p:cNvSpPr>
+            <a:spLocks noGrp="1"/>
+          </p:cNvSpPr>
+          <p:nvPr>
+            <p:ph type="title"/>
+          </p:nvPr>
+        </p:nvSpPr>
+        <p:spPr/>
+        <p:txBody>
+          <a:bodyPr/>
+          <a:lstStyle/>
+          <a:p>
+            <a:r>
+              <a:rPr lang="en-US" dirty="0" err="1"/>
+              <a:t>PresenterTests.cs</a:t>
+            </a:r>
+            <a:endParaRPr lang="en-US" dirty="0"/>
+          </a:p>
+        </p:txBody>
+      </p:sp>
+      <p:sp>
+        <p:nvSpPr>
+          <p:cNvPr id="3" name="Content Placeholder 2">
+            <a:extLst>
+              <a:ext uri="{FF2B5EF4-FFF2-40B4-BE49-F238E27FC236}">
+                <a16:creationId xmlns:a16="http://schemas.microsoft.com/office/drawing/2014/main" id="{BF37F820-D0C4-4210-BD70-2F1CC40BA622}"/>
+              </a:ext>
+            </a:extLst>
+          </p:cNvPr>
+          <p:cNvSpPr>
+            <a:spLocks noGrp="1"/>
+          </p:cNvSpPr>
+          <p:nvPr>
+            <p:ph idx="1"/>
+          </p:nvPr>
+        </p:nvSpPr>
+        <p:spPr/>
+        <p:txBody>
+          <a:bodyPr/>
+          <a:lstStyle/>
+          <a:p>
+            <a:r>
+              <a:rPr lang="en-US" dirty="0"/>
+              <a:t>Verify behavior</a:t>
+            </a:r>
+          </a:p>
+          <a:p>
+            <a:endParaRPr lang="en-US" dirty="0"/>
+          </a:p>
+          <a:p>
+            <a:endParaRPr lang="en-US" dirty="0"/>
+          </a:p>
+          <a:p>
+            <a:endParaRPr lang="en-US" dirty="0"/>
+          </a:p>
+          <a:p>
+            <a:endParaRPr lang="en-US" dirty="0"/>
+          </a:p>
+          <a:p>
+            <a:endParaRPr lang="en-US" dirty="0"/>
+          </a:p>
+          <a:p>
+            <a:endParaRPr lang="en-US" dirty="0"/>
+          </a:p>
+        </p:txBody>
+      </p:sp>
+      <p:pic>
+        <p:nvPicPr>
+          <p:cNvPr id="4" name="Picture 3">
+            <a:extLst>
+              <a:ext uri="{FF2B5EF4-FFF2-40B4-BE49-F238E27FC236}">
+                <a16:creationId xmlns:a16="http://schemas.microsoft.com/office/drawing/2014/main" id="{933F6722-F91F-41C3-84F7-20F37FA76837}"/>
+              </a:ext>
+            </a:extLst>
+          </p:cNvPr>
+          <p:cNvPicPr>
+            <a:picLocks noChangeAspect="1"/>
+          </p:cNvPicPr>
+          <p:nvPr/>
+        </p:nvPicPr>
+        <p:blipFill>
+          <a:blip r:embed="rId2"/>
+          <a:stretch>
+            <a:fillRect/>
+          </a:stretch>
+        </p:blipFill>
+        <p:spPr>
+          <a:xfrm>
+            <a:off x="2109214" y="2571459"/>
+            <a:ext cx="8221222" cy="4172532"/>
+          </a:xfrm>
+          <a:prstGeom prst="rect">
+            <a:avLst/>
+          </a:prstGeom>
+        </p:spPr>
+      </p:pic>
+    </p:spTree>
+    <p:extLst>
+      <p:ext uri="{BB962C8B-B14F-4D97-AF65-F5344CB8AC3E}">
+        <p14:creationId xmlns:p14="http://schemas.microsoft.com/office/powerpoint/2010/main" val="2667681237"/>
+      </p:ext>
+    </p:extLst>
+  </p:cSld>
+  <p:clrMapOvr>
+    <a:masterClrMapping/>
+  </p:clrMapOvr>
+</p:sld>
+</file>
+
+<file path=ppt/slides/slide24.xml><?xml version="1.0" encoding="utf-8"?>
+<p:sld xmlns:a="http://schemas.openxmlformats.org/drawingml/2006/main" xmlns:r="http://schemas.openxmlformats.org/officeDocument/2006/relationships" xmlns:p="http://schemas.openxmlformats.org/presentationml/2006/main">
+  <p:cSld>
+    <p:spTree>
+      <p:nvGrpSpPr>
+        <p:cNvPr id="1" name=""/>
+        <p:cNvGrpSpPr/>
+        <p:nvPr/>
+      </p:nvGrpSpPr>
+      <p:grpSpPr>
+        <a:xfrm>
+          <a:off x="0" y="0"/>
+          <a:ext cx="0" cy="0"/>
+          <a:chOff x="0" y="0"/>
+          <a:chExt cx="0" cy="0"/>
+        </a:xfrm>
+      </p:grpSpPr>
+      <p:sp>
+        <p:nvSpPr>
+          <p:cNvPr id="2" name="Title 1">
+            <a:extLst>
+              <a:ext uri="{FF2B5EF4-FFF2-40B4-BE49-F238E27FC236}">
+                <a16:creationId xmlns:a16="http://schemas.microsoft.com/office/drawing/2014/main" id="{6E93C8A4-71B9-479F-AC09-EA28529B66E3}"/>
+              </a:ext>
+            </a:extLst>
+          </p:cNvPr>
+          <p:cNvSpPr>
+            <a:spLocks noGrp="1"/>
+          </p:cNvSpPr>
+          <p:nvPr>
+            <p:ph type="title"/>
+          </p:nvPr>
+        </p:nvSpPr>
+        <p:spPr/>
+        <p:txBody>
+          <a:bodyPr/>
+          <a:lstStyle/>
+          <a:p>
+            <a:r>
+              <a:rPr lang="en-US" dirty="0" err="1"/>
+              <a:t>PresenterTests.cs</a:t>
+            </a:r>
+            <a:endParaRPr lang="en-US" dirty="0"/>
+          </a:p>
+        </p:txBody>
+      </p:sp>
+      <p:sp>
+        <p:nvSpPr>
+          <p:cNvPr id="3" name="Content Placeholder 2">
+            <a:extLst>
+              <a:ext uri="{FF2B5EF4-FFF2-40B4-BE49-F238E27FC236}">
+                <a16:creationId xmlns:a16="http://schemas.microsoft.com/office/drawing/2014/main" id="{BF37F820-D0C4-4210-BD70-2F1CC40BA622}"/>
+              </a:ext>
+            </a:extLst>
+          </p:cNvPr>
+          <p:cNvSpPr>
+            <a:spLocks noGrp="1"/>
+          </p:cNvSpPr>
+          <p:nvPr>
+            <p:ph idx="1"/>
+          </p:nvPr>
+        </p:nvSpPr>
+        <p:spPr/>
+        <p:txBody>
+          <a:bodyPr/>
+          <a:lstStyle/>
+          <a:p>
+            <a:r>
+              <a:rPr lang="en-US" dirty="0"/>
+              <a:t>Verify behavior</a:t>
+            </a:r>
+          </a:p>
+          <a:p>
+            <a:endParaRPr lang="en-US" dirty="0"/>
+          </a:p>
+          <a:p>
+            <a:endParaRPr lang="en-US" dirty="0"/>
+          </a:p>
+          <a:p>
+            <a:endParaRPr lang="en-US" dirty="0"/>
+          </a:p>
+          <a:p>
+            <a:endParaRPr lang="en-US" dirty="0"/>
+          </a:p>
+          <a:p>
+            <a:endParaRPr lang="en-US" dirty="0"/>
+          </a:p>
+          <a:p>
+            <a:endParaRPr lang="en-US" dirty="0"/>
+          </a:p>
+        </p:txBody>
+      </p:sp>
+      <p:pic>
+        <p:nvPicPr>
+          <p:cNvPr id="5" name="Picture 4">
+            <a:extLst>
+              <a:ext uri="{FF2B5EF4-FFF2-40B4-BE49-F238E27FC236}">
+                <a16:creationId xmlns:a16="http://schemas.microsoft.com/office/drawing/2014/main" id="{145C2E7C-D979-4607-81F0-58B8A272C279}"/>
+              </a:ext>
+            </a:extLst>
+          </p:cNvPr>
+          <p:cNvPicPr>
+            <a:picLocks noChangeAspect="1"/>
+          </p:cNvPicPr>
+          <p:nvPr/>
+        </p:nvPicPr>
+        <p:blipFill>
+          <a:blip r:embed="rId2"/>
+          <a:stretch>
+            <a:fillRect/>
+          </a:stretch>
+        </p:blipFill>
+        <p:spPr>
+          <a:xfrm>
+            <a:off x="2773599" y="3271706"/>
+            <a:ext cx="6763694" cy="1876687"/>
+          </a:xfrm>
+          <a:prstGeom prst="rect">
+            <a:avLst/>
+          </a:prstGeom>
+        </p:spPr>
+      </p:pic>
+    </p:spTree>
+    <p:extLst>
+      <p:ext uri="{BB962C8B-B14F-4D97-AF65-F5344CB8AC3E}">
+        <p14:creationId xmlns:p14="http://schemas.microsoft.com/office/powerpoint/2010/main" val="2149831859"/>
+      </p:ext>
+    </p:extLst>
+  </p:cSld>
+  <p:clrMapOvr>
+    <a:masterClrMapping/>
+  </p:clrMapOvr>
+</p:sld>
+</file>
+
+<file path=ppt/slides/slide25.xml><?xml version="1.0" encoding="utf-8"?>
 <p:sld xmlns:a="http://schemas.openxmlformats.org/drawingml/2006/main" xmlns:r="http://schemas.openxmlformats.org/officeDocument/2006/relationships" xmlns:p="http://schemas.openxmlformats.org/presentationml/2006/main">
   <p:cSld>
     <p:spTree>
@@ -6124,7 +6782,7 @@
 </p:sld>
 </file>
 
-<file path=ppt/slides/slide21.xml><?xml version="1.0" encoding="utf-8"?>
+<file path=ppt/slides/slide26.xml><?xml version="1.0" encoding="utf-8"?>
 <p:sld xmlns:a="http://schemas.openxmlformats.org/drawingml/2006/main" xmlns:r="http://schemas.openxmlformats.org/officeDocument/2006/relationships" xmlns:p="http://schemas.openxmlformats.org/presentationml/2006/main">
   <p:cSld>
     <p:spTree>
@@ -6264,7 +6922,7 @@
 </p:sld>
 </file>
 
-<file path=ppt/slides/slide22.xml><?xml version="1.0" encoding="utf-8"?>
+<file path=ppt/slides/slide27.xml><?xml version="1.0" encoding="utf-8"?>
 <p:sld xmlns:a="http://schemas.openxmlformats.org/drawingml/2006/main" xmlns:r="http://schemas.openxmlformats.org/officeDocument/2006/relationships" xmlns:p="http://schemas.openxmlformats.org/presentationml/2006/main">
   <p:cSld>
     <p:spTree>
@@ -6338,7 +6996,15 @@
           <a:p>
             <a:r>
               <a:rPr lang="en-US" dirty="0"/>
-              <a:t>Conditionals invoke Collaborators</a:t>
+              <a:t>Conditionals </a:t>
+            </a:r>
+            <a:r>
+              <a:rPr lang="en-US" i="1" dirty="0"/>
+              <a:t>should only</a:t>
+            </a:r>
+            <a:r>
+              <a:rPr lang="en-US" dirty="0"/>
+              <a:t> invoke Collaborators</a:t>
             </a:r>
           </a:p>
           <a:p>
@@ -6404,7 +7070,7 @@
 </p:sld>
 </file>
 
-<file path=ppt/slides/slide23.xml><?xml version="1.0" encoding="utf-8"?>
+<file path=ppt/slides/slide28.xml><?xml version="1.0" encoding="utf-8"?>
 <p:sld xmlns:a="http://schemas.openxmlformats.org/drawingml/2006/main" xmlns:r="http://schemas.openxmlformats.org/officeDocument/2006/relationships" xmlns:p="http://schemas.openxmlformats.org/presentationml/2006/main">
   <p:cSld>
     <p:spTree>
@@ -6426,546 +7092,6 @@
           <p:cNvPr id="2" name="Title 1">
             <a:extLst>
               <a:ext uri="{FF2B5EF4-FFF2-40B4-BE49-F238E27FC236}">
-                <a16:creationId xmlns:a16="http://schemas.microsoft.com/office/drawing/2014/main" id="{6E93C8A4-71B9-479F-AC09-EA28529B66E3}"/>
-              </a:ext>
-            </a:extLst>
-          </p:cNvPr>
-          <p:cNvSpPr>
-            <a:spLocks noGrp="1"/>
-          </p:cNvSpPr>
-          <p:nvPr>
-            <p:ph type="title"/>
-          </p:nvPr>
-        </p:nvSpPr>
-        <p:spPr/>
-        <p:txBody>
-          <a:bodyPr/>
-          <a:lstStyle/>
-          <a:p>
-            <a:r>
-              <a:rPr lang="en-US" dirty="0" err="1"/>
-              <a:t>PresenterTests.cs</a:t>
-            </a:r>
-            <a:endParaRPr lang="en-US" dirty="0"/>
-          </a:p>
-        </p:txBody>
-      </p:sp>
-      <p:sp>
-        <p:nvSpPr>
-          <p:cNvPr id="3" name="Content Placeholder 2">
-            <a:extLst>
-              <a:ext uri="{FF2B5EF4-FFF2-40B4-BE49-F238E27FC236}">
-                <a16:creationId xmlns:a16="http://schemas.microsoft.com/office/drawing/2014/main" id="{BF37F820-D0C4-4210-BD70-2F1CC40BA622}"/>
-              </a:ext>
-            </a:extLst>
-          </p:cNvPr>
-          <p:cNvSpPr>
-            <a:spLocks noGrp="1"/>
-          </p:cNvSpPr>
-          <p:nvPr>
-            <p:ph idx="1"/>
-          </p:nvPr>
-        </p:nvSpPr>
-        <p:spPr/>
-        <p:txBody>
-          <a:bodyPr/>
-          <a:lstStyle/>
-          <a:p>
-            <a:r>
-              <a:rPr lang="en-US" dirty="0"/>
-              <a:t>Setup unit, and mock dependencies</a:t>
-            </a:r>
-          </a:p>
-          <a:p>
-            <a:endParaRPr lang="en-US" dirty="0"/>
-          </a:p>
-          <a:p>
-            <a:endParaRPr lang="en-US" dirty="0"/>
-          </a:p>
-          <a:p>
-            <a:endParaRPr lang="en-US" dirty="0"/>
-          </a:p>
-          <a:p>
-            <a:endParaRPr lang="en-US" dirty="0"/>
-          </a:p>
-          <a:p>
-            <a:endParaRPr lang="en-US" dirty="0"/>
-          </a:p>
-          <a:p>
-            <a:endParaRPr lang="en-US" dirty="0"/>
-          </a:p>
-        </p:txBody>
-      </p:sp>
-      <p:pic>
-        <p:nvPicPr>
-          <p:cNvPr id="4" name="Picture 3">
-            <a:extLst>
-              <a:ext uri="{FF2B5EF4-FFF2-40B4-BE49-F238E27FC236}">
-                <a16:creationId xmlns:a16="http://schemas.microsoft.com/office/drawing/2014/main" id="{DB11B389-8FD4-49EA-BB15-06DE5A00A0A3}"/>
-              </a:ext>
-            </a:extLst>
-          </p:cNvPr>
-          <p:cNvPicPr>
-            <a:picLocks noChangeAspect="1"/>
-          </p:cNvPicPr>
-          <p:nvPr/>
-        </p:nvPicPr>
-        <p:blipFill>
-          <a:blip r:embed="rId2"/>
-          <a:stretch>
-            <a:fillRect/>
-          </a:stretch>
-        </p:blipFill>
-        <p:spPr>
-          <a:xfrm>
-            <a:off x="1805916" y="3044507"/>
-            <a:ext cx="8764223" cy="3172268"/>
-          </a:xfrm>
-          <a:prstGeom prst="rect">
-            <a:avLst/>
-          </a:prstGeom>
-        </p:spPr>
-      </p:pic>
-    </p:spTree>
-    <p:extLst>
-      <p:ext uri="{BB962C8B-B14F-4D97-AF65-F5344CB8AC3E}">
-        <p14:creationId xmlns:p14="http://schemas.microsoft.com/office/powerpoint/2010/main" val="763159629"/>
-      </p:ext>
-    </p:extLst>
-  </p:cSld>
-  <p:clrMapOvr>
-    <a:masterClrMapping/>
-  </p:clrMapOvr>
-</p:sld>
-</file>
-
-<file path=ppt/slides/slide24.xml><?xml version="1.0" encoding="utf-8"?>
-<p:sld xmlns:a="http://schemas.openxmlformats.org/drawingml/2006/main" xmlns:r="http://schemas.openxmlformats.org/officeDocument/2006/relationships" xmlns:p="http://schemas.openxmlformats.org/presentationml/2006/main">
-  <p:cSld>
-    <p:spTree>
-      <p:nvGrpSpPr>
-        <p:cNvPr id="1" name=""/>
-        <p:cNvGrpSpPr/>
-        <p:nvPr/>
-      </p:nvGrpSpPr>
-      <p:grpSpPr>
-        <a:xfrm>
-          <a:off x="0" y="0"/>
-          <a:ext cx="0" cy="0"/>
-          <a:chOff x="0" y="0"/>
-          <a:chExt cx="0" cy="0"/>
-        </a:xfrm>
-      </p:grpSpPr>
-      <p:sp>
-        <p:nvSpPr>
-          <p:cNvPr id="2" name="Title 1">
-            <a:extLst>
-              <a:ext uri="{FF2B5EF4-FFF2-40B4-BE49-F238E27FC236}">
-                <a16:creationId xmlns:a16="http://schemas.microsoft.com/office/drawing/2014/main" id="{6E93C8A4-71B9-479F-AC09-EA28529B66E3}"/>
-              </a:ext>
-            </a:extLst>
-          </p:cNvPr>
-          <p:cNvSpPr>
-            <a:spLocks noGrp="1"/>
-          </p:cNvSpPr>
-          <p:nvPr>
-            <p:ph type="title"/>
-          </p:nvPr>
-        </p:nvSpPr>
-        <p:spPr/>
-        <p:txBody>
-          <a:bodyPr/>
-          <a:lstStyle/>
-          <a:p>
-            <a:r>
-              <a:rPr lang="en-US" dirty="0" err="1"/>
-              <a:t>PresenterTests.cs</a:t>
-            </a:r>
-            <a:endParaRPr lang="en-US" dirty="0"/>
-          </a:p>
-        </p:txBody>
-      </p:sp>
-      <p:sp>
-        <p:nvSpPr>
-          <p:cNvPr id="3" name="Content Placeholder 2">
-            <a:extLst>
-              <a:ext uri="{FF2B5EF4-FFF2-40B4-BE49-F238E27FC236}">
-                <a16:creationId xmlns:a16="http://schemas.microsoft.com/office/drawing/2014/main" id="{BF37F820-D0C4-4210-BD70-2F1CC40BA622}"/>
-              </a:ext>
-            </a:extLst>
-          </p:cNvPr>
-          <p:cNvSpPr>
-            <a:spLocks noGrp="1"/>
-          </p:cNvSpPr>
-          <p:nvPr>
-            <p:ph idx="1"/>
-          </p:nvPr>
-        </p:nvSpPr>
-        <p:spPr/>
-        <p:txBody>
-          <a:bodyPr/>
-          <a:lstStyle/>
-          <a:p>
-            <a:r>
-              <a:rPr lang="en-US" dirty="0"/>
-              <a:t>Verify behavior</a:t>
-            </a:r>
-          </a:p>
-          <a:p>
-            <a:endParaRPr lang="en-US" dirty="0"/>
-          </a:p>
-          <a:p>
-            <a:endParaRPr lang="en-US" dirty="0"/>
-          </a:p>
-          <a:p>
-            <a:endParaRPr lang="en-US" dirty="0"/>
-          </a:p>
-          <a:p>
-            <a:endParaRPr lang="en-US" dirty="0"/>
-          </a:p>
-          <a:p>
-            <a:endParaRPr lang="en-US" dirty="0"/>
-          </a:p>
-          <a:p>
-            <a:endParaRPr lang="en-US" dirty="0"/>
-          </a:p>
-        </p:txBody>
-      </p:sp>
-      <p:pic>
-        <p:nvPicPr>
-          <p:cNvPr id="5" name="Picture 4">
-            <a:extLst>
-              <a:ext uri="{FF2B5EF4-FFF2-40B4-BE49-F238E27FC236}">
-                <a16:creationId xmlns:a16="http://schemas.microsoft.com/office/drawing/2014/main" id="{FBF7555C-447A-4E41-BA2F-B31053724555}"/>
-              </a:ext>
-            </a:extLst>
-          </p:cNvPr>
-          <p:cNvPicPr>
-            <a:picLocks noChangeAspect="1"/>
-          </p:cNvPicPr>
-          <p:nvPr/>
-        </p:nvPicPr>
-        <p:blipFill>
-          <a:blip r:embed="rId2"/>
-          <a:stretch>
-            <a:fillRect/>
-          </a:stretch>
-        </p:blipFill>
-        <p:spPr>
-          <a:xfrm>
-            <a:off x="2773599" y="2704833"/>
-            <a:ext cx="6620799" cy="3829584"/>
-          </a:xfrm>
-          <a:prstGeom prst="rect">
-            <a:avLst/>
-          </a:prstGeom>
-        </p:spPr>
-      </p:pic>
-    </p:spTree>
-    <p:extLst>
-      <p:ext uri="{BB962C8B-B14F-4D97-AF65-F5344CB8AC3E}">
-        <p14:creationId xmlns:p14="http://schemas.microsoft.com/office/powerpoint/2010/main" val="2025620570"/>
-      </p:ext>
-    </p:extLst>
-  </p:cSld>
-  <p:clrMapOvr>
-    <a:masterClrMapping/>
-  </p:clrMapOvr>
-</p:sld>
-</file>
-
-<file path=ppt/slides/slide25.xml><?xml version="1.0" encoding="utf-8"?>
-<p:sld xmlns:a="http://schemas.openxmlformats.org/drawingml/2006/main" xmlns:r="http://schemas.openxmlformats.org/officeDocument/2006/relationships" xmlns:p="http://schemas.openxmlformats.org/presentationml/2006/main">
-  <p:cSld>
-    <p:spTree>
-      <p:nvGrpSpPr>
-        <p:cNvPr id="1" name=""/>
-        <p:cNvGrpSpPr/>
-        <p:nvPr/>
-      </p:nvGrpSpPr>
-      <p:grpSpPr>
-        <a:xfrm>
-          <a:off x="0" y="0"/>
-          <a:ext cx="0" cy="0"/>
-          <a:chOff x="0" y="0"/>
-          <a:chExt cx="0" cy="0"/>
-        </a:xfrm>
-      </p:grpSpPr>
-      <p:sp>
-        <p:nvSpPr>
-          <p:cNvPr id="2" name="Title 1">
-            <a:extLst>
-              <a:ext uri="{FF2B5EF4-FFF2-40B4-BE49-F238E27FC236}">
-                <a16:creationId xmlns:a16="http://schemas.microsoft.com/office/drawing/2014/main" id="{6E93C8A4-71B9-479F-AC09-EA28529B66E3}"/>
-              </a:ext>
-            </a:extLst>
-          </p:cNvPr>
-          <p:cNvSpPr>
-            <a:spLocks noGrp="1"/>
-          </p:cNvSpPr>
-          <p:nvPr>
-            <p:ph type="title"/>
-          </p:nvPr>
-        </p:nvSpPr>
-        <p:spPr/>
-        <p:txBody>
-          <a:bodyPr/>
-          <a:lstStyle/>
-          <a:p>
-            <a:r>
-              <a:rPr lang="en-US" dirty="0" err="1"/>
-              <a:t>PresenterTests.cs</a:t>
-            </a:r>
-            <a:endParaRPr lang="en-US" dirty="0"/>
-          </a:p>
-        </p:txBody>
-      </p:sp>
-      <p:sp>
-        <p:nvSpPr>
-          <p:cNvPr id="3" name="Content Placeholder 2">
-            <a:extLst>
-              <a:ext uri="{FF2B5EF4-FFF2-40B4-BE49-F238E27FC236}">
-                <a16:creationId xmlns:a16="http://schemas.microsoft.com/office/drawing/2014/main" id="{BF37F820-D0C4-4210-BD70-2F1CC40BA622}"/>
-              </a:ext>
-            </a:extLst>
-          </p:cNvPr>
-          <p:cNvSpPr>
-            <a:spLocks noGrp="1"/>
-          </p:cNvSpPr>
-          <p:nvPr>
-            <p:ph idx="1"/>
-          </p:nvPr>
-        </p:nvSpPr>
-        <p:spPr/>
-        <p:txBody>
-          <a:bodyPr/>
-          <a:lstStyle/>
-          <a:p>
-            <a:r>
-              <a:rPr lang="en-US" dirty="0"/>
-              <a:t>Verify behavior</a:t>
-            </a:r>
-          </a:p>
-          <a:p>
-            <a:endParaRPr lang="en-US" dirty="0"/>
-          </a:p>
-          <a:p>
-            <a:endParaRPr lang="en-US" dirty="0"/>
-          </a:p>
-          <a:p>
-            <a:endParaRPr lang="en-US" dirty="0"/>
-          </a:p>
-          <a:p>
-            <a:endParaRPr lang="en-US" dirty="0"/>
-          </a:p>
-          <a:p>
-            <a:endParaRPr lang="en-US" dirty="0"/>
-          </a:p>
-          <a:p>
-            <a:endParaRPr lang="en-US" dirty="0"/>
-          </a:p>
-        </p:txBody>
-      </p:sp>
-      <p:pic>
-        <p:nvPicPr>
-          <p:cNvPr id="4" name="Picture 3">
-            <a:extLst>
-              <a:ext uri="{FF2B5EF4-FFF2-40B4-BE49-F238E27FC236}">
-                <a16:creationId xmlns:a16="http://schemas.microsoft.com/office/drawing/2014/main" id="{933F6722-F91F-41C3-84F7-20F37FA76837}"/>
-              </a:ext>
-            </a:extLst>
-          </p:cNvPr>
-          <p:cNvPicPr>
-            <a:picLocks noChangeAspect="1"/>
-          </p:cNvPicPr>
-          <p:nvPr/>
-        </p:nvPicPr>
-        <p:blipFill>
-          <a:blip r:embed="rId2"/>
-          <a:stretch>
-            <a:fillRect/>
-          </a:stretch>
-        </p:blipFill>
-        <p:spPr>
-          <a:xfrm>
-            <a:off x="2109214" y="2571459"/>
-            <a:ext cx="8221222" cy="4172532"/>
-          </a:xfrm>
-          <a:prstGeom prst="rect">
-            <a:avLst/>
-          </a:prstGeom>
-        </p:spPr>
-      </p:pic>
-    </p:spTree>
-    <p:extLst>
-      <p:ext uri="{BB962C8B-B14F-4D97-AF65-F5344CB8AC3E}">
-        <p14:creationId xmlns:p14="http://schemas.microsoft.com/office/powerpoint/2010/main" val="2667681237"/>
-      </p:ext>
-    </p:extLst>
-  </p:cSld>
-  <p:clrMapOvr>
-    <a:masterClrMapping/>
-  </p:clrMapOvr>
-</p:sld>
-</file>
-
-<file path=ppt/slides/slide26.xml><?xml version="1.0" encoding="utf-8"?>
-<p:sld xmlns:a="http://schemas.openxmlformats.org/drawingml/2006/main" xmlns:r="http://schemas.openxmlformats.org/officeDocument/2006/relationships" xmlns:p="http://schemas.openxmlformats.org/presentationml/2006/main">
-  <p:cSld>
-    <p:spTree>
-      <p:nvGrpSpPr>
-        <p:cNvPr id="1" name=""/>
-        <p:cNvGrpSpPr/>
-        <p:nvPr/>
-      </p:nvGrpSpPr>
-      <p:grpSpPr>
-        <a:xfrm>
-          <a:off x="0" y="0"/>
-          <a:ext cx="0" cy="0"/>
-          <a:chOff x="0" y="0"/>
-          <a:chExt cx="0" cy="0"/>
-        </a:xfrm>
-      </p:grpSpPr>
-      <p:sp>
-        <p:nvSpPr>
-          <p:cNvPr id="2" name="Title 1">
-            <a:extLst>
-              <a:ext uri="{FF2B5EF4-FFF2-40B4-BE49-F238E27FC236}">
-                <a16:creationId xmlns:a16="http://schemas.microsoft.com/office/drawing/2014/main" id="{6E93C8A4-71B9-479F-AC09-EA28529B66E3}"/>
-              </a:ext>
-            </a:extLst>
-          </p:cNvPr>
-          <p:cNvSpPr>
-            <a:spLocks noGrp="1"/>
-          </p:cNvSpPr>
-          <p:nvPr>
-            <p:ph type="title"/>
-          </p:nvPr>
-        </p:nvSpPr>
-        <p:spPr/>
-        <p:txBody>
-          <a:bodyPr/>
-          <a:lstStyle/>
-          <a:p>
-            <a:r>
-              <a:rPr lang="en-US" dirty="0" err="1"/>
-              <a:t>PresenterTests.cs</a:t>
-            </a:r>
-            <a:endParaRPr lang="en-US" dirty="0"/>
-          </a:p>
-        </p:txBody>
-      </p:sp>
-      <p:sp>
-        <p:nvSpPr>
-          <p:cNvPr id="3" name="Content Placeholder 2">
-            <a:extLst>
-              <a:ext uri="{FF2B5EF4-FFF2-40B4-BE49-F238E27FC236}">
-                <a16:creationId xmlns:a16="http://schemas.microsoft.com/office/drawing/2014/main" id="{BF37F820-D0C4-4210-BD70-2F1CC40BA622}"/>
-              </a:ext>
-            </a:extLst>
-          </p:cNvPr>
-          <p:cNvSpPr>
-            <a:spLocks noGrp="1"/>
-          </p:cNvSpPr>
-          <p:nvPr>
-            <p:ph idx="1"/>
-          </p:nvPr>
-        </p:nvSpPr>
-        <p:spPr/>
-        <p:txBody>
-          <a:bodyPr/>
-          <a:lstStyle/>
-          <a:p>
-            <a:r>
-              <a:rPr lang="en-US" dirty="0"/>
-              <a:t>Verify behavior</a:t>
-            </a:r>
-          </a:p>
-          <a:p>
-            <a:endParaRPr lang="en-US" dirty="0"/>
-          </a:p>
-          <a:p>
-            <a:endParaRPr lang="en-US" dirty="0"/>
-          </a:p>
-          <a:p>
-            <a:endParaRPr lang="en-US" dirty="0"/>
-          </a:p>
-          <a:p>
-            <a:endParaRPr lang="en-US" dirty="0"/>
-          </a:p>
-          <a:p>
-            <a:endParaRPr lang="en-US" dirty="0"/>
-          </a:p>
-          <a:p>
-            <a:endParaRPr lang="en-US" dirty="0"/>
-          </a:p>
-        </p:txBody>
-      </p:sp>
-      <p:pic>
-        <p:nvPicPr>
-          <p:cNvPr id="5" name="Picture 4">
-            <a:extLst>
-              <a:ext uri="{FF2B5EF4-FFF2-40B4-BE49-F238E27FC236}">
-                <a16:creationId xmlns:a16="http://schemas.microsoft.com/office/drawing/2014/main" id="{145C2E7C-D979-4607-81F0-58B8A272C279}"/>
-              </a:ext>
-            </a:extLst>
-          </p:cNvPr>
-          <p:cNvPicPr>
-            <a:picLocks noChangeAspect="1"/>
-          </p:cNvPicPr>
-          <p:nvPr/>
-        </p:nvPicPr>
-        <p:blipFill>
-          <a:blip r:embed="rId2"/>
-          <a:stretch>
-            <a:fillRect/>
-          </a:stretch>
-        </p:blipFill>
-        <p:spPr>
-          <a:xfrm>
-            <a:off x="2773599" y="3271706"/>
-            <a:ext cx="6763694" cy="1876687"/>
-          </a:xfrm>
-          <a:prstGeom prst="rect">
-            <a:avLst/>
-          </a:prstGeom>
-        </p:spPr>
-      </p:pic>
-    </p:spTree>
-    <p:extLst>
-      <p:ext uri="{BB962C8B-B14F-4D97-AF65-F5344CB8AC3E}">
-        <p14:creationId xmlns:p14="http://schemas.microsoft.com/office/powerpoint/2010/main" val="2149831859"/>
-      </p:ext>
-    </p:extLst>
-  </p:cSld>
-  <p:clrMapOvr>
-    <a:masterClrMapping/>
-  </p:clrMapOvr>
-</p:sld>
-</file>
-
-<file path=ppt/slides/slide27.xml><?xml version="1.0" encoding="utf-8"?>
-<p:sld xmlns:a="http://schemas.openxmlformats.org/drawingml/2006/main" xmlns:r="http://schemas.openxmlformats.org/officeDocument/2006/relationships" xmlns:p="http://schemas.openxmlformats.org/presentationml/2006/main">
-  <p:cSld>
-    <p:spTree>
-      <p:nvGrpSpPr>
-        <p:cNvPr id="1" name=""/>
-        <p:cNvGrpSpPr/>
-        <p:nvPr/>
-      </p:nvGrpSpPr>
-      <p:grpSpPr>
-        <a:xfrm>
-          <a:off x="0" y="0"/>
-          <a:ext cx="0" cy="0"/>
-          <a:chOff x="0" y="0"/>
-          <a:chExt cx="0" cy="0"/>
-        </a:xfrm>
-      </p:grpSpPr>
-      <p:sp>
-        <p:nvSpPr>
-          <p:cNvPr id="2" name="Title 1">
-            <a:extLst>
-              <a:ext uri="{FF2B5EF4-FFF2-40B4-BE49-F238E27FC236}">
                 <a16:creationId xmlns:a16="http://schemas.microsoft.com/office/drawing/2014/main" id="{303011CE-5A82-41D4-A73E-838B0B4950E3}"/>
               </a:ext>
             </a:extLst>
@@ -7036,7 +7162,7 @@
 </p:sld>
 </file>
 
-<file path=ppt/slides/slide28.xml><?xml version="1.0" encoding="utf-8"?>
+<file path=ppt/slides/slide29.xml><?xml version="1.0" encoding="utf-8"?>
 <p:sld xmlns:a="http://schemas.openxmlformats.org/drawingml/2006/main" xmlns:r="http://schemas.openxmlformats.org/officeDocument/2006/relationships" xmlns:p="http://schemas.openxmlformats.org/presentationml/2006/main">
   <p:cSld>
     <p:spTree>
@@ -7149,92 +7275,6 @@
 </p:sld>
 </file>
 
-<file path=ppt/slides/slide29.xml><?xml version="1.0" encoding="utf-8"?>
-<p:sld xmlns:a="http://schemas.openxmlformats.org/drawingml/2006/main" xmlns:r="http://schemas.openxmlformats.org/officeDocument/2006/relationships" xmlns:p="http://schemas.openxmlformats.org/presentationml/2006/main">
-  <p:cSld>
-    <p:spTree>
-      <p:nvGrpSpPr>
-        <p:cNvPr id="1" name=""/>
-        <p:cNvGrpSpPr/>
-        <p:nvPr/>
-      </p:nvGrpSpPr>
-      <p:grpSpPr>
-        <a:xfrm>
-          <a:off x="0" y="0"/>
-          <a:ext cx="0" cy="0"/>
-          <a:chOff x="0" y="0"/>
-          <a:chExt cx="0" cy="0"/>
-        </a:xfrm>
-      </p:grpSpPr>
-      <p:sp>
-        <p:nvSpPr>
-          <p:cNvPr id="2" name="Title 1">
-            <a:extLst>
-              <a:ext uri="{FF2B5EF4-FFF2-40B4-BE49-F238E27FC236}">
-                <a16:creationId xmlns:a16="http://schemas.microsoft.com/office/drawing/2014/main" id="{BA764339-58E5-4A42-8A5F-A0066AC4FE2B}"/>
-              </a:ext>
-            </a:extLst>
-          </p:cNvPr>
-          <p:cNvSpPr>
-            <a:spLocks noGrp="1"/>
-          </p:cNvSpPr>
-          <p:nvPr>
-            <p:ph type="title"/>
-          </p:nvPr>
-        </p:nvSpPr>
-        <p:spPr/>
-        <p:txBody>
-          <a:bodyPr/>
-          <a:lstStyle/>
-          <a:p>
-            <a:r>
-              <a:rPr lang="en-US" dirty="0"/>
-              <a:t>New Branch</a:t>
-            </a:r>
-          </a:p>
-        </p:txBody>
-      </p:sp>
-      <p:sp>
-        <p:nvSpPr>
-          <p:cNvPr id="3" name="Content Placeholder 2">
-            <a:extLst>
-              <a:ext uri="{FF2B5EF4-FFF2-40B4-BE49-F238E27FC236}">
-                <a16:creationId xmlns:a16="http://schemas.microsoft.com/office/drawing/2014/main" id="{24695556-74F4-48FC-A192-79B10B87EB9D}"/>
-              </a:ext>
-            </a:extLst>
-          </p:cNvPr>
-          <p:cNvSpPr>
-            <a:spLocks noGrp="1"/>
-          </p:cNvSpPr>
-          <p:nvPr>
-            <p:ph idx="1"/>
-          </p:nvPr>
-        </p:nvSpPr>
-        <p:spPr/>
-        <p:txBody>
-          <a:bodyPr/>
-          <a:lstStyle/>
-          <a:p>
-            <a:r>
-              <a:rPr lang="en-US" dirty="0"/>
-              <a:t>git checkout better</a:t>
-            </a:r>
-          </a:p>
-        </p:txBody>
-      </p:sp>
-    </p:spTree>
-    <p:extLst>
-      <p:ext uri="{BB962C8B-B14F-4D97-AF65-F5344CB8AC3E}">
-        <p14:creationId xmlns:p14="http://schemas.microsoft.com/office/powerpoint/2010/main" val="50605895"/>
-      </p:ext>
-    </p:extLst>
-  </p:cSld>
-  <p:clrMapOvr>
-    <a:masterClrMapping/>
-  </p:clrMapOvr>
-</p:sld>
-</file>
-
 <file path=ppt/slides/slide3.xml><?xml version="1.0" encoding="utf-8"?>
 <p:sld xmlns:a="http://schemas.openxmlformats.org/drawingml/2006/main" xmlns:r="http://schemas.openxmlformats.org/officeDocument/2006/relationships" xmlns:p="http://schemas.openxmlformats.org/presentationml/2006/main">
   <p:cSld>
@@ -7257,7 +7297,7 @@
           <p:cNvPr id="2" name="Title 1">
             <a:extLst>
               <a:ext uri="{FF2B5EF4-FFF2-40B4-BE49-F238E27FC236}">
-                <a16:creationId xmlns:a16="http://schemas.microsoft.com/office/drawing/2014/main" id="{419492FD-6758-4DDF-B8D4-CFA131684DCC}"/>
+                <a16:creationId xmlns:a16="http://schemas.microsoft.com/office/drawing/2014/main" id="{FE93B04C-D131-430D-A8FB-B7441E7E2F1E}"/>
               </a:ext>
             </a:extLst>
           </p:cNvPr>
@@ -7275,7 +7315,7 @@
           <a:p>
             <a:r>
               <a:rPr lang="en-US" dirty="0"/>
-              <a:t>Test Modes</a:t>
+              <a:t>STP: Definition</a:t>
             </a:r>
           </a:p>
         </p:txBody>
@@ -7285,7 +7325,7 @@
           <p:cNvPr id="3" name="Content Placeholder 2">
             <a:extLst>
               <a:ext uri="{FF2B5EF4-FFF2-40B4-BE49-F238E27FC236}">
-                <a16:creationId xmlns:a16="http://schemas.microsoft.com/office/drawing/2014/main" id="{8A44A566-EC2A-4F60-BD99-6C1910627105}"/>
+                <a16:creationId xmlns:a16="http://schemas.microsoft.com/office/drawing/2014/main" id="{B12988EF-F01B-4302-AFC3-4BB9D0A82CB8}"/>
               </a:ext>
             </a:extLst>
           </p:cNvPr>
@@ -7296,49 +7336,54 @@
             <p:ph idx="1"/>
           </p:nvPr>
         </p:nvSpPr>
-        <p:spPr/>
-        <p:txBody>
-          <a:bodyPr/>
-          <a:lstStyle/>
-          <a:p>
-            <a:r>
-              <a:rPr lang="en-US" dirty="0"/>
-              <a:t>A testing mode is simply a way in which testing of a unit is completed. </a:t>
-            </a:r>
-          </a:p>
-          <a:p>
-            <a:r>
-              <a:rPr lang="en-US" dirty="0"/>
-              <a:t>Single Testability defines the following modes</a:t>
-            </a:r>
-          </a:p>
-          <a:p>
-            <a:pPr lvl="1"/>
-            <a:r>
-              <a:rPr lang="en-US" dirty="0"/>
-              <a:t>Unit</a:t>
-            </a:r>
-          </a:p>
-          <a:p>
-            <a:pPr lvl="1"/>
-            <a:r>
-              <a:rPr lang="en-US" dirty="0"/>
-              <a:t>Integration – Surprise inside!</a:t>
-            </a:r>
-          </a:p>
-          <a:p>
-            <a:pPr lvl="1"/>
-            <a:r>
-              <a:rPr lang="en-US" dirty="0"/>
-              <a:t>Collaboration</a:t>
-            </a:r>
+        <p:spPr>
+          <a:xfrm>
+            <a:off x="2658326" y="2052116"/>
+            <a:ext cx="7796540" cy="3997828"/>
+          </a:xfrm>
+        </p:spPr>
+        <p:txBody>
+          <a:bodyPr/>
+          <a:lstStyle/>
+          <a:p>
+            <a:r>
+              <a:rPr lang="en-US" dirty="0"/>
+              <a:t>A unit should require only a single mode of testing to be verified.</a:t>
+            </a:r>
+          </a:p>
+          <a:p>
+            <a:endParaRPr lang="en-US" dirty="0"/>
+          </a:p>
+          <a:p>
+            <a:endParaRPr lang="en-US" dirty="0"/>
+          </a:p>
+          <a:p>
+            <a:pPr marL="0" indent="0">
+              <a:buNone/>
+            </a:pPr>
+            <a:endParaRPr lang="en-US" dirty="0"/>
+          </a:p>
+          <a:p>
+            <a:r>
+              <a:rPr lang="en-US" dirty="0"/>
+              <a:t>Multiple modes of testing is an indicator of excessive complexity </a:t>
+            </a:r>
+          </a:p>
+          <a:p>
+            <a:r>
+              <a:rPr lang="en-US" dirty="0"/>
+              <a:t>Indicates the need to decompose a unit</a:t>
+            </a:r>
+          </a:p>
+          <a:p>
+            <a:endParaRPr lang="en-US" dirty="0"/>
           </a:p>
         </p:txBody>
       </p:sp>
     </p:spTree>
     <p:extLst>
       <p:ext uri="{BB962C8B-B14F-4D97-AF65-F5344CB8AC3E}">
-        <p14:creationId xmlns:p14="http://schemas.microsoft.com/office/powerpoint/2010/main" val="229029854"/>
+        <p14:creationId xmlns:p14="http://schemas.microsoft.com/office/powerpoint/2010/main" val="2599262584"/>
       </p:ext>
     </p:extLst>
   </p:cSld>
@@ -7370,7 +7415,7 @@
           <p:cNvPr id="2" name="Title 1">
             <a:extLst>
               <a:ext uri="{FF2B5EF4-FFF2-40B4-BE49-F238E27FC236}">
-                <a16:creationId xmlns:a16="http://schemas.microsoft.com/office/drawing/2014/main" id="{A5F1D11D-630A-4A9C-8AF2-CAD4856C5F23}"/>
+                <a16:creationId xmlns:a16="http://schemas.microsoft.com/office/drawing/2014/main" id="{BA764339-58E5-4A42-8A5F-A0066AC4FE2B}"/>
               </a:ext>
             </a:extLst>
           </p:cNvPr>
@@ -7387,10 +7432,9 @@
           <a:lstStyle/>
           <a:p>
             <a:r>
-              <a:rPr lang="en-US" dirty="0" err="1"/>
-              <a:t>UserInput.cs</a:t>
-            </a:r>
-            <a:endParaRPr lang="en-US" dirty="0"/>
+              <a:rPr lang="en-US" dirty="0"/>
+              <a:t>New Branch</a:t>
+            </a:r>
           </a:p>
         </p:txBody>
       </p:sp>
@@ -7399,7 +7443,7 @@
           <p:cNvPr id="3" name="Content Placeholder 2">
             <a:extLst>
               <a:ext uri="{FF2B5EF4-FFF2-40B4-BE49-F238E27FC236}">
-                <a16:creationId xmlns:a16="http://schemas.microsoft.com/office/drawing/2014/main" id="{2937BBD7-B383-4377-A59E-E4D2F756C24B}"/>
+                <a16:creationId xmlns:a16="http://schemas.microsoft.com/office/drawing/2014/main" id="{24695556-74F4-48FC-A192-79B10B87EB9D}"/>
               </a:ext>
             </a:extLst>
           </p:cNvPr>
@@ -7415,44 +7459,17 @@
           <a:bodyPr/>
           <a:lstStyle/>
           <a:p>
-            <a:endParaRPr lang="en-US"/>
-          </a:p>
-        </p:txBody>
-      </p:sp>
-      <p:pic>
-        <p:nvPicPr>
-          <p:cNvPr id="4" name="Picture 3">
-            <a:extLst>
-              <a:ext uri="{FF2B5EF4-FFF2-40B4-BE49-F238E27FC236}">
-                <a16:creationId xmlns:a16="http://schemas.microsoft.com/office/drawing/2014/main" id="{140F7DE7-8119-4DF2-93D4-B35DC58C7BA4}"/>
-              </a:ext>
-            </a:extLst>
-          </p:cNvPr>
-          <p:cNvPicPr>
-            <a:picLocks noChangeAspect="1"/>
-          </p:cNvPicPr>
-          <p:nvPr/>
-        </p:nvPicPr>
-        <p:blipFill>
-          <a:blip r:embed="rId2"/>
-          <a:stretch>
-            <a:fillRect/>
-          </a:stretch>
-        </p:blipFill>
-        <p:spPr>
-          <a:xfrm>
-            <a:off x="3242864" y="1459868"/>
-            <a:ext cx="5706271" cy="5182323"/>
-          </a:xfrm>
-          <a:prstGeom prst="rect">
-            <a:avLst/>
-          </a:prstGeom>
-        </p:spPr>
-      </p:pic>
+            <a:r>
+              <a:rPr lang="en-US" dirty="0"/>
+              <a:t>git checkout better</a:t>
+            </a:r>
+          </a:p>
+        </p:txBody>
+      </p:sp>
     </p:spTree>
     <p:extLst>
       <p:ext uri="{BB962C8B-B14F-4D97-AF65-F5344CB8AC3E}">
-        <p14:creationId xmlns:p14="http://schemas.microsoft.com/office/powerpoint/2010/main" val="1368232786"/>
+        <p14:creationId xmlns:p14="http://schemas.microsoft.com/office/powerpoint/2010/main" val="50605895"/>
       </p:ext>
     </p:extLst>
   </p:cSld>
@@ -7598,6 +7615,120 @@
           <p:cNvPr id="2" name="Title 1">
             <a:extLst>
               <a:ext uri="{FF2B5EF4-FFF2-40B4-BE49-F238E27FC236}">
+                <a16:creationId xmlns:a16="http://schemas.microsoft.com/office/drawing/2014/main" id="{A5F1D11D-630A-4A9C-8AF2-CAD4856C5F23}"/>
+              </a:ext>
+            </a:extLst>
+          </p:cNvPr>
+          <p:cNvSpPr>
+            <a:spLocks noGrp="1"/>
+          </p:cNvSpPr>
+          <p:nvPr>
+            <p:ph type="title"/>
+          </p:nvPr>
+        </p:nvSpPr>
+        <p:spPr/>
+        <p:txBody>
+          <a:bodyPr/>
+          <a:lstStyle/>
+          <a:p>
+            <a:r>
+              <a:rPr lang="en-US" dirty="0" err="1"/>
+              <a:t>UserInput.cs</a:t>
+            </a:r>
+            <a:endParaRPr lang="en-US" dirty="0"/>
+          </a:p>
+        </p:txBody>
+      </p:sp>
+      <p:sp>
+        <p:nvSpPr>
+          <p:cNvPr id="3" name="Content Placeholder 2">
+            <a:extLst>
+              <a:ext uri="{FF2B5EF4-FFF2-40B4-BE49-F238E27FC236}">
+                <a16:creationId xmlns:a16="http://schemas.microsoft.com/office/drawing/2014/main" id="{2937BBD7-B383-4377-A59E-E4D2F756C24B}"/>
+              </a:ext>
+            </a:extLst>
+          </p:cNvPr>
+          <p:cNvSpPr>
+            <a:spLocks noGrp="1"/>
+          </p:cNvSpPr>
+          <p:nvPr>
+            <p:ph idx="1"/>
+          </p:nvPr>
+        </p:nvSpPr>
+        <p:spPr/>
+        <p:txBody>
+          <a:bodyPr/>
+          <a:lstStyle/>
+          <a:p>
+            <a:endParaRPr lang="en-US"/>
+          </a:p>
+        </p:txBody>
+      </p:sp>
+      <p:pic>
+        <p:nvPicPr>
+          <p:cNvPr id="4" name="Picture 3">
+            <a:extLst>
+              <a:ext uri="{FF2B5EF4-FFF2-40B4-BE49-F238E27FC236}">
+                <a16:creationId xmlns:a16="http://schemas.microsoft.com/office/drawing/2014/main" id="{140F7DE7-8119-4DF2-93D4-B35DC58C7BA4}"/>
+              </a:ext>
+            </a:extLst>
+          </p:cNvPr>
+          <p:cNvPicPr>
+            <a:picLocks noChangeAspect="1"/>
+          </p:cNvPicPr>
+          <p:nvPr/>
+        </p:nvPicPr>
+        <p:blipFill>
+          <a:blip r:embed="rId2"/>
+          <a:stretch>
+            <a:fillRect/>
+          </a:stretch>
+        </p:blipFill>
+        <p:spPr>
+          <a:xfrm>
+            <a:off x="3242864" y="1459868"/>
+            <a:ext cx="5706271" cy="5182323"/>
+          </a:xfrm>
+          <a:prstGeom prst="rect">
+            <a:avLst/>
+          </a:prstGeom>
+        </p:spPr>
+      </p:pic>
+    </p:spTree>
+    <p:extLst>
+      <p:ext uri="{BB962C8B-B14F-4D97-AF65-F5344CB8AC3E}">
+        <p14:creationId xmlns:p14="http://schemas.microsoft.com/office/powerpoint/2010/main" val="1368232786"/>
+      </p:ext>
+    </p:extLst>
+  </p:cSld>
+  <p:clrMapOvr>
+    <a:masterClrMapping/>
+  </p:clrMapOvr>
+</p:sld>
+</file>
+
+<file path=ppt/slides/slide33.xml><?xml version="1.0" encoding="utf-8"?>
+<p:sld xmlns:a="http://schemas.openxmlformats.org/drawingml/2006/main" xmlns:r="http://schemas.openxmlformats.org/officeDocument/2006/relationships" xmlns:p="http://schemas.openxmlformats.org/presentationml/2006/main">
+  <p:cSld>
+    <p:spTree>
+      <p:nvGrpSpPr>
+        <p:cNvPr id="1" name=""/>
+        <p:cNvGrpSpPr/>
+        <p:nvPr/>
+      </p:nvGrpSpPr>
+      <p:grpSpPr>
+        <a:xfrm>
+          <a:off x="0" y="0"/>
+          <a:ext cx="0" cy="0"/>
+          <a:chOff x="0" y="0"/>
+          <a:chExt cx="0" cy="0"/>
+        </a:xfrm>
+      </p:grpSpPr>
+      <p:sp>
+        <p:nvSpPr>
+          <p:cNvPr id="2" name="Title 1">
+            <a:extLst>
+              <a:ext uri="{FF2B5EF4-FFF2-40B4-BE49-F238E27FC236}">
                 <a16:creationId xmlns:a16="http://schemas.microsoft.com/office/drawing/2014/main" id="{51A481F4-DDC1-4F25-868F-97C9F3C5AC44}"/>
               </a:ext>
             </a:extLst>
@@ -7690,7 +7821,7 @@
 </p:sld>
 </file>
 
-<file path=ppt/slides/slide33.xml><?xml version="1.0" encoding="utf-8"?>
+<file path=ppt/slides/slide34.xml><?xml version="1.0" encoding="utf-8"?>
 <p:sld xmlns:a="http://schemas.openxmlformats.org/drawingml/2006/main" xmlns:r="http://schemas.openxmlformats.org/officeDocument/2006/relationships" xmlns:p="http://schemas.openxmlformats.org/presentationml/2006/main">
   <p:cSld>
     <p:spTree>
@@ -7804,7 +7935,7 @@
 </p:sld>
 </file>
 
-<file path=ppt/slides/slide34.xml><?xml version="1.0" encoding="utf-8"?>
+<file path=ppt/slides/slide35.xml><?xml version="1.0" encoding="utf-8"?>
 <p:sld xmlns:a="http://schemas.openxmlformats.org/drawingml/2006/main" xmlns:r="http://schemas.openxmlformats.org/officeDocument/2006/relationships" xmlns:p="http://schemas.openxmlformats.org/presentationml/2006/main">
   <p:cSld>
     <p:spTree>
@@ -7939,7 +8070,7 @@
 </p:sld>
 </file>
 
-<file path=ppt/slides/slide35.xml><?xml version="1.0" encoding="utf-8"?>
+<file path=ppt/slides/slide36.xml><?xml version="1.0" encoding="utf-8"?>
 <p:sld xmlns:a="http://schemas.openxmlformats.org/drawingml/2006/main" xmlns:r="http://schemas.openxmlformats.org/officeDocument/2006/relationships" xmlns:p="http://schemas.openxmlformats.org/presentationml/2006/main">
   <p:cSld>
     <p:spTree>
@@ -8071,116 +8202,6 @@
 </p:sld>
 </file>
 
-<file path=ppt/slides/slide36.xml><?xml version="1.0" encoding="utf-8"?>
-<p:sld xmlns:a="http://schemas.openxmlformats.org/drawingml/2006/main" xmlns:r="http://schemas.openxmlformats.org/officeDocument/2006/relationships" xmlns:p="http://schemas.openxmlformats.org/presentationml/2006/main">
-  <p:cSld>
-    <p:spTree>
-      <p:nvGrpSpPr>
-        <p:cNvPr id="1" name=""/>
-        <p:cNvGrpSpPr/>
-        <p:nvPr/>
-      </p:nvGrpSpPr>
-      <p:grpSpPr>
-        <a:xfrm>
-          <a:off x="0" y="0"/>
-          <a:ext cx="0" cy="0"/>
-          <a:chOff x="0" y="0"/>
-          <a:chExt cx="0" cy="0"/>
-        </a:xfrm>
-      </p:grpSpPr>
-      <p:sp>
-        <p:nvSpPr>
-          <p:cNvPr id="2" name="Title 1">
-            <a:extLst>
-              <a:ext uri="{FF2B5EF4-FFF2-40B4-BE49-F238E27FC236}">
-                <a16:creationId xmlns:a16="http://schemas.microsoft.com/office/drawing/2014/main" id="{9CE869D5-B174-43EA-BEA2-710CAA298370}"/>
-              </a:ext>
-            </a:extLst>
-          </p:cNvPr>
-          <p:cNvSpPr>
-            <a:spLocks noGrp="1"/>
-          </p:cNvSpPr>
-          <p:nvPr>
-            <p:ph type="title"/>
-          </p:nvPr>
-        </p:nvSpPr>
-        <p:spPr/>
-        <p:txBody>
-          <a:bodyPr/>
-          <a:lstStyle/>
-          <a:p>
-            <a:r>
-              <a:rPr lang="en-US" dirty="0"/>
-              <a:t>Order of development</a:t>
-            </a:r>
-          </a:p>
-        </p:txBody>
-      </p:sp>
-      <p:sp>
-        <p:nvSpPr>
-          <p:cNvPr id="3" name="Content Placeholder 2">
-            <a:extLst>
-              <a:ext uri="{FF2B5EF4-FFF2-40B4-BE49-F238E27FC236}">
-                <a16:creationId xmlns:a16="http://schemas.microsoft.com/office/drawing/2014/main" id="{E4BC8F45-D021-4707-B952-B0ED1B9774C6}"/>
-              </a:ext>
-            </a:extLst>
-          </p:cNvPr>
-          <p:cNvSpPr>
-            <a:spLocks noGrp="1"/>
-          </p:cNvSpPr>
-          <p:nvPr>
-            <p:ph idx="1"/>
-          </p:nvPr>
-        </p:nvSpPr>
-        <p:spPr/>
-        <p:txBody>
-          <a:bodyPr/>
-          <a:lstStyle/>
-          <a:p>
-            <a:r>
-              <a:rPr lang="en-US" dirty="0"/>
-              <a:t>0. Think of the units you will build. </a:t>
-            </a:r>
-          </a:p>
-          <a:p>
-            <a:r>
-              <a:rPr lang="en-US" dirty="0"/>
-              <a:t>1. Unit units first. Isolated == Easy, Fast</a:t>
-            </a:r>
-          </a:p>
-          <a:p>
-            <a:r>
-              <a:rPr lang="en-US" dirty="0"/>
-              <a:t>2. Integration units next. Usually will move data from the Units.</a:t>
-            </a:r>
-          </a:p>
-          <a:p>
-            <a:r>
-              <a:rPr lang="en-US" dirty="0"/>
-              <a:t>3. Collaboration units last. Will accept the Unit and Integration units are Collaborators. Code is usually obvious when collaborators are complete.</a:t>
-            </a:r>
-          </a:p>
-          <a:p>
-            <a:r>
-              <a:rPr lang="en-US" dirty="0"/>
-              <a:t>4. Find where you broken the rule!</a:t>
-            </a:r>
-          </a:p>
-        </p:txBody>
-      </p:sp>
-    </p:spTree>
-    <p:extLst>
-      <p:ext uri="{BB962C8B-B14F-4D97-AF65-F5344CB8AC3E}">
-        <p14:creationId xmlns:p14="http://schemas.microsoft.com/office/powerpoint/2010/main" val="2535729040"/>
-      </p:ext>
-    </p:extLst>
-  </p:cSld>
-  <p:clrMapOvr>
-    <a:masterClrMapping/>
-  </p:clrMapOvr>
-</p:sld>
-</file>
-
 <file path=ppt/slides/slide37.xml><?xml version="1.0" encoding="utf-8"?>
 <p:sld xmlns:a="http://schemas.openxmlformats.org/drawingml/2006/main" xmlns:r="http://schemas.openxmlformats.org/officeDocument/2006/relationships" xmlns:p="http://schemas.openxmlformats.org/presentationml/2006/main">
   <p:cSld>
@@ -8203,6 +8224,116 @@
           <p:cNvPr id="2" name="Title 1">
             <a:extLst>
               <a:ext uri="{FF2B5EF4-FFF2-40B4-BE49-F238E27FC236}">
+                <a16:creationId xmlns:a16="http://schemas.microsoft.com/office/drawing/2014/main" id="{9CE869D5-B174-43EA-BEA2-710CAA298370}"/>
+              </a:ext>
+            </a:extLst>
+          </p:cNvPr>
+          <p:cNvSpPr>
+            <a:spLocks noGrp="1"/>
+          </p:cNvSpPr>
+          <p:nvPr>
+            <p:ph type="title"/>
+          </p:nvPr>
+        </p:nvSpPr>
+        <p:spPr/>
+        <p:txBody>
+          <a:bodyPr/>
+          <a:lstStyle/>
+          <a:p>
+            <a:r>
+              <a:rPr lang="en-US" dirty="0"/>
+              <a:t>Order of development</a:t>
+            </a:r>
+          </a:p>
+        </p:txBody>
+      </p:sp>
+      <p:sp>
+        <p:nvSpPr>
+          <p:cNvPr id="3" name="Content Placeholder 2">
+            <a:extLst>
+              <a:ext uri="{FF2B5EF4-FFF2-40B4-BE49-F238E27FC236}">
+                <a16:creationId xmlns:a16="http://schemas.microsoft.com/office/drawing/2014/main" id="{E4BC8F45-D021-4707-B952-B0ED1B9774C6}"/>
+              </a:ext>
+            </a:extLst>
+          </p:cNvPr>
+          <p:cNvSpPr>
+            <a:spLocks noGrp="1"/>
+          </p:cNvSpPr>
+          <p:nvPr>
+            <p:ph idx="1"/>
+          </p:nvPr>
+        </p:nvSpPr>
+        <p:spPr/>
+        <p:txBody>
+          <a:bodyPr/>
+          <a:lstStyle/>
+          <a:p>
+            <a:r>
+              <a:rPr lang="en-US" dirty="0"/>
+              <a:t>0. Think of the units you will build. </a:t>
+            </a:r>
+          </a:p>
+          <a:p>
+            <a:r>
+              <a:rPr lang="en-US" dirty="0"/>
+              <a:t>1. Unit units first. Isolated == Easy, Fast</a:t>
+            </a:r>
+          </a:p>
+          <a:p>
+            <a:r>
+              <a:rPr lang="en-US" dirty="0"/>
+              <a:t>2. Integration units next. Usually will move data from the Units.</a:t>
+            </a:r>
+          </a:p>
+          <a:p>
+            <a:r>
+              <a:rPr lang="en-US" dirty="0"/>
+              <a:t>3. Collaboration units last. Will accept the Unit and Integration units are Collaborators. Code is usually obvious when collaborators are complete.</a:t>
+            </a:r>
+          </a:p>
+          <a:p>
+            <a:r>
+              <a:rPr lang="en-US" dirty="0"/>
+              <a:t>4. Find where you broken the rule!</a:t>
+            </a:r>
+          </a:p>
+        </p:txBody>
+      </p:sp>
+    </p:spTree>
+    <p:extLst>
+      <p:ext uri="{BB962C8B-B14F-4D97-AF65-F5344CB8AC3E}">
+        <p14:creationId xmlns:p14="http://schemas.microsoft.com/office/powerpoint/2010/main" val="2535729040"/>
+      </p:ext>
+    </p:extLst>
+  </p:cSld>
+  <p:clrMapOvr>
+    <a:masterClrMapping/>
+  </p:clrMapOvr>
+</p:sld>
+</file>
+
+<file path=ppt/slides/slide38.xml><?xml version="1.0" encoding="utf-8"?>
+<p:sld xmlns:a="http://schemas.openxmlformats.org/drawingml/2006/main" xmlns:r="http://schemas.openxmlformats.org/officeDocument/2006/relationships" xmlns:p="http://schemas.openxmlformats.org/presentationml/2006/main">
+  <p:cSld>
+    <p:spTree>
+      <p:nvGrpSpPr>
+        <p:cNvPr id="1" name=""/>
+        <p:cNvGrpSpPr/>
+        <p:nvPr/>
+      </p:nvGrpSpPr>
+      <p:grpSpPr>
+        <a:xfrm>
+          <a:off x="0" y="0"/>
+          <a:ext cx="0" cy="0"/>
+          <a:chOff x="0" y="0"/>
+          <a:chExt cx="0" cy="0"/>
+        </a:xfrm>
+      </p:grpSpPr>
+      <p:sp>
+        <p:nvSpPr>
+          <p:cNvPr id="2" name="Title 1">
+            <a:extLst>
+              <a:ext uri="{FF2B5EF4-FFF2-40B4-BE49-F238E27FC236}">
                 <a16:creationId xmlns:a16="http://schemas.microsoft.com/office/drawing/2014/main" id="{5DD8BA46-DB8E-4F19-BF68-5617238AB18F}"/>
               </a:ext>
             </a:extLst>
@@ -8251,11 +8382,8 @@
               <a:rPr lang="en-US" dirty="0">
                 <a:hlinkClick r:id="rId2"/>
               </a:rPr>
-              <a:t>https://github.com/mvphelps</a:t>
-            </a:r>
-            <a:endParaRPr lang="en-US" dirty="0"/>
-          </a:p>
-          <a:p>
+              <a:t>https://github.com/mvphelps/SingleTestabilityPrinciple</a:t>
+            </a:r>
             <a:endParaRPr lang="en-US" dirty="0"/>
           </a:p>
         </p:txBody>
@@ -8264,6 +8392,92 @@
     <p:extLst>
       <p:ext uri="{BB962C8B-B14F-4D97-AF65-F5344CB8AC3E}">
         <p14:creationId xmlns:p14="http://schemas.microsoft.com/office/powerpoint/2010/main" val="3254126608"/>
+      </p:ext>
+    </p:extLst>
+  </p:cSld>
+  <p:clrMapOvr>
+    <a:masterClrMapping/>
+  </p:clrMapOvr>
+</p:sld>
+</file>
+
+<file path=ppt/slides/slide39.xml><?xml version="1.0" encoding="utf-8"?>
+<p:sld xmlns:a="http://schemas.openxmlformats.org/drawingml/2006/main" xmlns:r="http://schemas.openxmlformats.org/officeDocument/2006/relationships" xmlns:p="http://schemas.openxmlformats.org/presentationml/2006/main">
+  <p:cSld>
+    <p:spTree>
+      <p:nvGrpSpPr>
+        <p:cNvPr id="1" name=""/>
+        <p:cNvGrpSpPr/>
+        <p:nvPr/>
+      </p:nvGrpSpPr>
+      <p:grpSpPr>
+        <a:xfrm>
+          <a:off x="0" y="0"/>
+          <a:ext cx="0" cy="0"/>
+          <a:chOff x="0" y="0"/>
+          <a:chExt cx="0" cy="0"/>
+        </a:xfrm>
+      </p:grpSpPr>
+      <p:sp>
+        <p:nvSpPr>
+          <p:cNvPr id="2" name="Title 1">
+            <a:extLst>
+              <a:ext uri="{FF2B5EF4-FFF2-40B4-BE49-F238E27FC236}">
+                <a16:creationId xmlns:a16="http://schemas.microsoft.com/office/drawing/2014/main" id="{561DF2C3-54B0-4C55-ACC2-FB6D7EBE9EEB}"/>
+              </a:ext>
+            </a:extLst>
+          </p:cNvPr>
+          <p:cNvSpPr>
+            <a:spLocks noGrp="1"/>
+          </p:cNvSpPr>
+          <p:nvPr>
+            <p:ph type="title"/>
+          </p:nvPr>
+        </p:nvSpPr>
+        <p:spPr/>
+        <p:txBody>
+          <a:bodyPr/>
+          <a:lstStyle/>
+          <a:p>
+            <a:r>
+              <a:rPr lang="en-US" dirty="0"/>
+              <a:t>Questions?</a:t>
+            </a:r>
+          </a:p>
+        </p:txBody>
+      </p:sp>
+      <p:sp>
+        <p:nvSpPr>
+          <p:cNvPr id="3" name="Content Placeholder 2">
+            <a:extLst>
+              <a:ext uri="{FF2B5EF4-FFF2-40B4-BE49-F238E27FC236}">
+                <a16:creationId xmlns:a16="http://schemas.microsoft.com/office/drawing/2014/main" id="{23E318B5-A800-4C77-904F-ED8FCD1B5A6F}"/>
+              </a:ext>
+            </a:extLst>
+          </p:cNvPr>
+          <p:cNvSpPr>
+            <a:spLocks noGrp="1"/>
+          </p:cNvSpPr>
+          <p:nvPr>
+            <p:ph idx="1"/>
+          </p:nvPr>
+        </p:nvSpPr>
+        <p:spPr/>
+        <p:txBody>
+          <a:bodyPr/>
+          <a:lstStyle/>
+          <a:p>
+            <a:pPr marL="0" indent="0">
+              <a:buNone/>
+            </a:pPr>
+            <a:endParaRPr lang="en-US" dirty="0"/>
+          </a:p>
+        </p:txBody>
+      </p:sp>
+    </p:spTree>
+    <p:extLst>
+      <p:ext uri="{BB962C8B-B14F-4D97-AF65-F5344CB8AC3E}">
+        <p14:creationId xmlns:p14="http://schemas.microsoft.com/office/powerpoint/2010/main" val="1602206456"/>
       </p:ext>
     </p:extLst>
   </p:cSld>
@@ -8295,7 +8509,7 @@
           <p:cNvPr id="2" name="Title 1">
             <a:extLst>
               <a:ext uri="{FF2B5EF4-FFF2-40B4-BE49-F238E27FC236}">
-                <a16:creationId xmlns:a16="http://schemas.microsoft.com/office/drawing/2014/main" id="{CD20C0F3-1B15-4E4D-B995-76BE19582A5F}"/>
+                <a16:creationId xmlns:a16="http://schemas.microsoft.com/office/drawing/2014/main" id="{419492FD-6758-4DDF-B8D4-CFA131684DCC}"/>
               </a:ext>
             </a:extLst>
           </p:cNvPr>
@@ -8313,7 +8527,7 @@
           <a:p>
             <a:r>
               <a:rPr lang="en-US" dirty="0"/>
-              <a:t>Sample App</a:t>
+              <a:t>Test Modes</a:t>
             </a:r>
           </a:p>
         </p:txBody>
@@ -8323,7 +8537,7 @@
           <p:cNvPr id="3" name="Content Placeholder 2">
             <a:extLst>
               <a:ext uri="{FF2B5EF4-FFF2-40B4-BE49-F238E27FC236}">
-                <a16:creationId xmlns:a16="http://schemas.microsoft.com/office/drawing/2014/main" id="{71446F25-2D7B-4A07-A9F3-7E90329BB198}"/>
+                <a16:creationId xmlns:a16="http://schemas.microsoft.com/office/drawing/2014/main" id="{8A44A566-EC2A-4F60-BD99-6C1910627105}"/>
               </a:ext>
             </a:extLst>
           </p:cNvPr>
@@ -8341,19 +8555,34 @@
           <a:p>
             <a:r>
               <a:rPr lang="en-US" dirty="0"/>
-              <a:t>Adds two numbers, entered via the console. Records what happens, and prints the result.</a:t>
-            </a:r>
-          </a:p>
-          <a:p>
-            <a:r>
-              <a:rPr lang="en-US" dirty="0"/>
-              <a:t>Simple and designed to distinguish the testing modes.</a:t>
-            </a:r>
-          </a:p>
-          <a:p>
-            <a:r>
-              <a:rPr lang="en-US" dirty="0"/>
-              <a:t>Is not production code!</a:t>
+              <a:t>A testing mode is simply a way in which testing of a unit is completed. </a:t>
+            </a:r>
+          </a:p>
+          <a:p>
+            <a:r>
+              <a:rPr lang="en-US" dirty="0"/>
+              <a:t>Single Testability defines the following modes</a:t>
+            </a:r>
+          </a:p>
+          <a:p>
+            <a:pPr lvl="1"/>
+            <a:r>
+              <a:rPr lang="en-US" dirty="0"/>
+              <a:t>Unit</a:t>
+            </a:r>
+          </a:p>
+          <a:p>
+            <a:pPr lvl="1"/>
+            <a:r>
+              <a:rPr lang="en-US" dirty="0"/>
+              <a:t>Integration – Surprise inside!</a:t>
+            </a:r>
+          </a:p>
+          <a:p>
+            <a:pPr lvl="1"/>
+            <a:r>
+              <a:rPr lang="en-US" dirty="0"/>
+              <a:t>Collaboration</a:t>
             </a:r>
           </a:p>
         </p:txBody>
@@ -8361,7 +8590,110 @@
     </p:spTree>
     <p:extLst>
       <p:ext uri="{BB962C8B-B14F-4D97-AF65-F5344CB8AC3E}">
-        <p14:creationId xmlns:p14="http://schemas.microsoft.com/office/powerpoint/2010/main" val="1103306714"/>
+        <p14:creationId xmlns:p14="http://schemas.microsoft.com/office/powerpoint/2010/main" val="229029854"/>
+      </p:ext>
+    </p:extLst>
+  </p:cSld>
+  <p:clrMapOvr>
+    <a:masterClrMapping/>
+  </p:clrMapOvr>
+</p:sld>
+</file>
+
+<file path=ppt/slides/slide40.xml><?xml version="1.0" encoding="utf-8"?>
+<p:sld xmlns:a="http://schemas.openxmlformats.org/drawingml/2006/main" xmlns:r="http://schemas.openxmlformats.org/officeDocument/2006/relationships" xmlns:p="http://schemas.openxmlformats.org/presentationml/2006/main">
+  <p:cSld>
+    <p:spTree>
+      <p:nvGrpSpPr>
+        <p:cNvPr id="1" name=""/>
+        <p:cNvGrpSpPr/>
+        <p:nvPr/>
+      </p:nvGrpSpPr>
+      <p:grpSpPr>
+        <a:xfrm>
+          <a:off x="0" y="0"/>
+          <a:ext cx="0" cy="0"/>
+          <a:chOff x="0" y="0"/>
+          <a:chExt cx="0" cy="0"/>
+        </a:xfrm>
+      </p:grpSpPr>
+      <p:sp>
+        <p:nvSpPr>
+          <p:cNvPr id="5" name="Title 4">
+            <a:extLst>
+              <a:ext uri="{FF2B5EF4-FFF2-40B4-BE49-F238E27FC236}">
+                <a16:creationId xmlns:a16="http://schemas.microsoft.com/office/drawing/2014/main" id="{9009201C-7476-47D0-9BCB-143B3540D4EE}"/>
+              </a:ext>
+            </a:extLst>
+          </p:cNvPr>
+          <p:cNvSpPr>
+            <a:spLocks noGrp="1"/>
+          </p:cNvSpPr>
+          <p:nvPr>
+            <p:ph type="title"/>
+          </p:nvPr>
+        </p:nvSpPr>
+        <p:spPr/>
+        <p:txBody>
+          <a:bodyPr/>
+          <a:lstStyle/>
+          <a:p>
+            <a:r>
+              <a:rPr lang="en-US" dirty="0"/>
+              <a:t>Thank you!</a:t>
+            </a:r>
+          </a:p>
+        </p:txBody>
+      </p:sp>
+      <p:sp>
+        <p:nvSpPr>
+          <p:cNvPr id="6" name="Content Placeholder 5">
+            <a:extLst>
+              <a:ext uri="{FF2B5EF4-FFF2-40B4-BE49-F238E27FC236}">
+                <a16:creationId xmlns:a16="http://schemas.microsoft.com/office/drawing/2014/main" id="{ECDD45F8-BE35-4942-B57B-16AE188C7FC0}"/>
+              </a:ext>
+            </a:extLst>
+          </p:cNvPr>
+          <p:cNvSpPr>
+            <a:spLocks noGrp="1"/>
+          </p:cNvSpPr>
+          <p:nvPr>
+            <p:ph idx="1"/>
+          </p:nvPr>
+        </p:nvSpPr>
+        <p:spPr/>
+        <p:txBody>
+          <a:bodyPr/>
+          <a:lstStyle/>
+          <a:p>
+            <a:r>
+              <a:rPr lang="en-US" dirty="0"/>
+              <a:t>Michael Phelps, Phelps Consulting</a:t>
+            </a:r>
+          </a:p>
+          <a:p>
+            <a:r>
+              <a:rPr lang="en-US" dirty="0"/>
+              <a:t>mvphelps@gmail.com</a:t>
+            </a:r>
+          </a:p>
+          <a:p>
+            <a:r>
+              <a:rPr lang="en-US" dirty="0"/>
+              <a:t>Copyright 2020, All </a:t>
+            </a:r>
+            <a:r>
+              <a:rPr lang="en-US"/>
+              <a:t>Rights Reserved</a:t>
+            </a:r>
+            <a:endParaRPr lang="en-US" dirty="0"/>
+          </a:p>
+        </p:txBody>
+      </p:sp>
+    </p:spTree>
+    <p:extLst>
+      <p:ext uri="{BB962C8B-B14F-4D97-AF65-F5344CB8AC3E}">
+        <p14:creationId xmlns:p14="http://schemas.microsoft.com/office/powerpoint/2010/main" val="2428391295"/>
       </p:ext>
     </p:extLst>
   </p:cSld>
@@ -8393,7 +8725,7 @@
           <p:cNvPr id="2" name="Title 1">
             <a:extLst>
               <a:ext uri="{FF2B5EF4-FFF2-40B4-BE49-F238E27FC236}">
-                <a16:creationId xmlns:a16="http://schemas.microsoft.com/office/drawing/2014/main" id="{674287CE-7D3A-4D27-A004-BE5039EEAC61}"/>
+                <a16:creationId xmlns:a16="http://schemas.microsoft.com/office/drawing/2014/main" id="{CD20C0F3-1B15-4E4D-B995-76BE19582A5F}"/>
               </a:ext>
             </a:extLst>
           </p:cNvPr>
@@ -8411,7 +8743,7 @@
           <a:p>
             <a:r>
               <a:rPr lang="en-US" dirty="0"/>
-              <a:t>Unit Tests</a:t>
+              <a:t>Sample App</a:t>
             </a:r>
           </a:p>
         </p:txBody>
@@ -8421,7 +8753,7 @@
           <p:cNvPr id="3" name="Content Placeholder 2">
             <a:extLst>
               <a:ext uri="{FF2B5EF4-FFF2-40B4-BE49-F238E27FC236}">
-                <a16:creationId xmlns:a16="http://schemas.microsoft.com/office/drawing/2014/main" id="{3953BBA2-881B-4EDB-90F5-770B5445FB9E}"/>
+                <a16:creationId xmlns:a16="http://schemas.microsoft.com/office/drawing/2014/main" id="{71446F25-2D7B-4A07-A9F3-7E90329BB198}"/>
               </a:ext>
             </a:extLst>
           </p:cNvPr>
@@ -8439,13 +8771,19 @@
           <a:p>
             <a:r>
               <a:rPr lang="en-US" dirty="0"/>
-              <a:t>What is a unit test?</a:t>
-            </a:r>
-          </a:p>
-          <a:p>
-            <a:r>
-              <a:rPr lang="en-US" dirty="0"/>
-              <a:t>What characteristics are true about a unit tested this way?</a:t>
+              <a:t>Adds two numbers, entered via the console. Records what happens, and prints the result.</a:t>
+            </a:r>
+          </a:p>
+          <a:p>
+            <a:r>
+              <a:rPr lang="en-US" dirty="0"/>
+              <a:t>Simple and designed to distinguish the testing modes.</a:t>
+            </a:r>
+          </a:p>
+          <a:p>
+            <a:r>
+              <a:rPr lang="en-US" dirty="0"/>
+              <a:t>Is not production code!</a:t>
             </a:r>
           </a:p>
         </p:txBody>
@@ -8453,7 +8791,7 @@
     </p:spTree>
     <p:extLst>
       <p:ext uri="{BB962C8B-B14F-4D97-AF65-F5344CB8AC3E}">
-        <p14:creationId xmlns:p14="http://schemas.microsoft.com/office/powerpoint/2010/main" val="2631178314"/>
+        <p14:creationId xmlns:p14="http://schemas.microsoft.com/office/powerpoint/2010/main" val="1103306714"/>
       </p:ext>
     </p:extLst>
   </p:cSld>
@@ -8485,6 +8823,98 @@
           <p:cNvPr id="2" name="Title 1">
             <a:extLst>
               <a:ext uri="{FF2B5EF4-FFF2-40B4-BE49-F238E27FC236}">
+                <a16:creationId xmlns:a16="http://schemas.microsoft.com/office/drawing/2014/main" id="{674287CE-7D3A-4D27-A004-BE5039EEAC61}"/>
+              </a:ext>
+            </a:extLst>
+          </p:cNvPr>
+          <p:cNvSpPr>
+            <a:spLocks noGrp="1"/>
+          </p:cNvSpPr>
+          <p:nvPr>
+            <p:ph type="title"/>
+          </p:nvPr>
+        </p:nvSpPr>
+        <p:spPr/>
+        <p:txBody>
+          <a:bodyPr/>
+          <a:lstStyle/>
+          <a:p>
+            <a:r>
+              <a:rPr lang="en-US" dirty="0"/>
+              <a:t>Unit Tests</a:t>
+            </a:r>
+          </a:p>
+        </p:txBody>
+      </p:sp>
+      <p:sp>
+        <p:nvSpPr>
+          <p:cNvPr id="3" name="Content Placeholder 2">
+            <a:extLst>
+              <a:ext uri="{FF2B5EF4-FFF2-40B4-BE49-F238E27FC236}">
+                <a16:creationId xmlns:a16="http://schemas.microsoft.com/office/drawing/2014/main" id="{3953BBA2-881B-4EDB-90F5-770B5445FB9E}"/>
+              </a:ext>
+            </a:extLst>
+          </p:cNvPr>
+          <p:cNvSpPr>
+            <a:spLocks noGrp="1"/>
+          </p:cNvSpPr>
+          <p:nvPr>
+            <p:ph idx="1"/>
+          </p:nvPr>
+        </p:nvSpPr>
+        <p:spPr/>
+        <p:txBody>
+          <a:bodyPr/>
+          <a:lstStyle/>
+          <a:p>
+            <a:r>
+              <a:rPr lang="en-US" dirty="0"/>
+              <a:t>What is a unit test?</a:t>
+            </a:r>
+          </a:p>
+          <a:p>
+            <a:r>
+              <a:rPr lang="en-US" dirty="0"/>
+              <a:t>What characteristics are true about a unit tested this way?</a:t>
+            </a:r>
+          </a:p>
+        </p:txBody>
+      </p:sp>
+    </p:spTree>
+    <p:extLst>
+      <p:ext uri="{BB962C8B-B14F-4D97-AF65-F5344CB8AC3E}">
+        <p14:creationId xmlns:p14="http://schemas.microsoft.com/office/powerpoint/2010/main" val="2631178314"/>
+      </p:ext>
+    </p:extLst>
+  </p:cSld>
+  <p:clrMapOvr>
+    <a:masterClrMapping/>
+  </p:clrMapOvr>
+</p:sld>
+</file>
+
+<file path=ppt/slides/slide7.xml><?xml version="1.0" encoding="utf-8"?>
+<p:sld xmlns:a="http://schemas.openxmlformats.org/drawingml/2006/main" xmlns:r="http://schemas.openxmlformats.org/officeDocument/2006/relationships" xmlns:p="http://schemas.openxmlformats.org/presentationml/2006/main">
+  <p:cSld>
+    <p:spTree>
+      <p:nvGrpSpPr>
+        <p:cNvPr id="1" name=""/>
+        <p:cNvGrpSpPr/>
+        <p:nvPr/>
+      </p:nvGrpSpPr>
+      <p:grpSpPr>
+        <a:xfrm>
+          <a:off x="0" y="0"/>
+          <a:ext cx="0" cy="0"/>
+          <a:chOff x="0" y="0"/>
+          <a:chExt cx="0" cy="0"/>
+        </a:xfrm>
+      </p:grpSpPr>
+      <p:sp>
+        <p:nvSpPr>
+          <p:cNvPr id="2" name="Title 1">
+            <a:extLst>
+              <a:ext uri="{FF2B5EF4-FFF2-40B4-BE49-F238E27FC236}">
                 <a16:creationId xmlns:a16="http://schemas.microsoft.com/office/drawing/2014/main" id="{13050053-F526-48B8-BA1A-1A23280F8C81}"/>
               </a:ext>
             </a:extLst>
@@ -8573,7 +9003,7 @@
 </p:sld>
 </file>
 
-<file path=ppt/slides/slide7.xml><?xml version="1.0" encoding="utf-8"?>
+<file path=ppt/slides/slide8.xml><?xml version="1.0" encoding="utf-8"?>
 <p:sld xmlns:a="http://schemas.openxmlformats.org/drawingml/2006/main" xmlns:r="http://schemas.openxmlformats.org/officeDocument/2006/relationships" xmlns:p="http://schemas.openxmlformats.org/presentationml/2006/main">
   <p:cSld>
     <p:spTree>
@@ -8705,7 +9135,7 @@
 </p:sld>
 </file>
 
-<file path=ppt/slides/slide8.xml><?xml version="1.0" encoding="utf-8"?>
+<file path=ppt/slides/slide9.xml><?xml version="1.0" encoding="utf-8"?>
 <p:sld xmlns:a="http://schemas.openxmlformats.org/drawingml/2006/main" xmlns:r="http://schemas.openxmlformats.org/officeDocument/2006/relationships" xmlns:p="http://schemas.openxmlformats.org/presentationml/2006/main">
   <p:cSld>
     <p:spTree>
@@ -8785,98 +9215,6 @@
     <p:extLst>
       <p:ext uri="{BB962C8B-B14F-4D97-AF65-F5344CB8AC3E}">
         <p14:creationId xmlns:p14="http://schemas.microsoft.com/office/powerpoint/2010/main" val="3393310590"/>
-      </p:ext>
-    </p:extLst>
-  </p:cSld>
-  <p:clrMapOvr>
-    <a:masterClrMapping/>
-  </p:clrMapOvr>
-</p:sld>
-</file>
-
-<file path=ppt/slides/slide9.xml><?xml version="1.0" encoding="utf-8"?>
-<p:sld xmlns:a="http://schemas.openxmlformats.org/drawingml/2006/main" xmlns:r="http://schemas.openxmlformats.org/officeDocument/2006/relationships" xmlns:p="http://schemas.openxmlformats.org/presentationml/2006/main">
-  <p:cSld>
-    <p:spTree>
-      <p:nvGrpSpPr>
-        <p:cNvPr id="1" name=""/>
-        <p:cNvGrpSpPr/>
-        <p:nvPr/>
-      </p:nvGrpSpPr>
-      <p:grpSpPr>
-        <a:xfrm>
-          <a:off x="0" y="0"/>
-          <a:ext cx="0" cy="0"/>
-          <a:chOff x="0" y="0"/>
-          <a:chExt cx="0" cy="0"/>
-        </a:xfrm>
-      </p:grpSpPr>
-      <p:sp>
-        <p:nvSpPr>
-          <p:cNvPr id="2" name="Title 1">
-            <a:extLst>
-              <a:ext uri="{FF2B5EF4-FFF2-40B4-BE49-F238E27FC236}">
-                <a16:creationId xmlns:a16="http://schemas.microsoft.com/office/drawing/2014/main" id="{674287CE-7D3A-4D27-A004-BE5039EEAC61}"/>
-              </a:ext>
-            </a:extLst>
-          </p:cNvPr>
-          <p:cNvSpPr>
-            <a:spLocks noGrp="1"/>
-          </p:cNvSpPr>
-          <p:nvPr>
-            <p:ph type="title"/>
-          </p:nvPr>
-        </p:nvSpPr>
-        <p:spPr/>
-        <p:txBody>
-          <a:bodyPr/>
-          <a:lstStyle/>
-          <a:p>
-            <a:r>
-              <a:rPr lang="en-US" dirty="0"/>
-              <a:t>Integration Tests</a:t>
-            </a:r>
-          </a:p>
-        </p:txBody>
-      </p:sp>
-      <p:sp>
-        <p:nvSpPr>
-          <p:cNvPr id="3" name="Content Placeholder 2">
-            <a:extLst>
-              <a:ext uri="{FF2B5EF4-FFF2-40B4-BE49-F238E27FC236}">
-                <a16:creationId xmlns:a16="http://schemas.microsoft.com/office/drawing/2014/main" id="{3953BBA2-881B-4EDB-90F5-770B5445FB9E}"/>
-              </a:ext>
-            </a:extLst>
-          </p:cNvPr>
-          <p:cNvSpPr>
-            <a:spLocks noGrp="1"/>
-          </p:cNvSpPr>
-          <p:nvPr>
-            <p:ph idx="1"/>
-          </p:nvPr>
-        </p:nvSpPr>
-        <p:spPr/>
-        <p:txBody>
-          <a:bodyPr/>
-          <a:lstStyle/>
-          <a:p>
-            <a:r>
-              <a:rPr lang="en-US" dirty="0"/>
-              <a:t>What is an Integration test?</a:t>
-            </a:r>
-          </a:p>
-          <a:p>
-            <a:r>
-              <a:rPr lang="en-US" dirty="0"/>
-              <a:t>What characteristics are true about a unit tested this way?</a:t>
-            </a:r>
-          </a:p>
-        </p:txBody>
-      </p:sp>
-    </p:spTree>
-    <p:extLst>
-      <p:ext uri="{BB962C8B-B14F-4D97-AF65-F5344CB8AC3E}">
-        <p14:creationId xmlns:p14="http://schemas.microsoft.com/office/powerpoint/2010/main" val="1229073609"/>
       </p:ext>
     </p:extLst>
   </p:cSld>

</xml_diff>